<commit_message>
update curve fitting and plotting
</commit_message>
<xml_diff>
--- a/docs/fig_setup_labelled.pptx
+++ b/docs/fig_setup_labelled.pptx
@@ -259,7 +259,7 @@
           <a:p>
             <a:fld id="{7AB5CAF8-9327-F54B-8A6F-A50D5568BC9E}" type="datetimeFigureOut">
               <a:rPr lang="en-US" smtClean="0"/>
-              <a:t>10/19/20</a:t>
+              <a:t>11/25/20</a:t>
             </a:fld>
             <a:endParaRPr lang="en-US"/>
           </a:p>
@@ -457,7 +457,7 @@
           <a:p>
             <a:fld id="{7AB5CAF8-9327-F54B-8A6F-A50D5568BC9E}" type="datetimeFigureOut">
               <a:rPr lang="en-US" smtClean="0"/>
-              <a:t>10/19/20</a:t>
+              <a:t>11/25/20</a:t>
             </a:fld>
             <a:endParaRPr lang="en-US"/>
           </a:p>
@@ -665,7 +665,7 @@
           <a:p>
             <a:fld id="{7AB5CAF8-9327-F54B-8A6F-A50D5568BC9E}" type="datetimeFigureOut">
               <a:rPr lang="en-US" smtClean="0"/>
-              <a:t>10/19/20</a:t>
+              <a:t>11/25/20</a:t>
             </a:fld>
             <a:endParaRPr lang="en-US"/>
           </a:p>
@@ -863,7 +863,7 @@
           <a:p>
             <a:fld id="{7AB5CAF8-9327-F54B-8A6F-A50D5568BC9E}" type="datetimeFigureOut">
               <a:rPr lang="en-US" smtClean="0"/>
-              <a:t>10/19/20</a:t>
+              <a:t>11/25/20</a:t>
             </a:fld>
             <a:endParaRPr lang="en-US"/>
           </a:p>
@@ -1138,7 +1138,7 @@
           <a:p>
             <a:fld id="{7AB5CAF8-9327-F54B-8A6F-A50D5568BC9E}" type="datetimeFigureOut">
               <a:rPr lang="en-US" smtClean="0"/>
-              <a:t>10/19/20</a:t>
+              <a:t>11/25/20</a:t>
             </a:fld>
             <a:endParaRPr lang="en-US"/>
           </a:p>
@@ -1403,7 +1403,7 @@
           <a:p>
             <a:fld id="{7AB5CAF8-9327-F54B-8A6F-A50D5568BC9E}" type="datetimeFigureOut">
               <a:rPr lang="en-US" smtClean="0"/>
-              <a:t>10/19/20</a:t>
+              <a:t>11/25/20</a:t>
             </a:fld>
             <a:endParaRPr lang="en-US"/>
           </a:p>
@@ -1815,7 +1815,7 @@
           <a:p>
             <a:fld id="{7AB5CAF8-9327-F54B-8A6F-A50D5568BC9E}" type="datetimeFigureOut">
               <a:rPr lang="en-US" smtClean="0"/>
-              <a:t>10/19/20</a:t>
+              <a:t>11/25/20</a:t>
             </a:fld>
             <a:endParaRPr lang="en-US"/>
           </a:p>
@@ -1956,7 +1956,7 @@
           <a:p>
             <a:fld id="{7AB5CAF8-9327-F54B-8A6F-A50D5568BC9E}" type="datetimeFigureOut">
               <a:rPr lang="en-US" smtClean="0"/>
-              <a:t>10/19/20</a:t>
+              <a:t>11/25/20</a:t>
             </a:fld>
             <a:endParaRPr lang="en-US"/>
           </a:p>
@@ -2069,7 +2069,7 @@
           <a:p>
             <a:fld id="{7AB5CAF8-9327-F54B-8A6F-A50D5568BC9E}" type="datetimeFigureOut">
               <a:rPr lang="en-US" smtClean="0"/>
-              <a:t>10/19/20</a:t>
+              <a:t>11/25/20</a:t>
             </a:fld>
             <a:endParaRPr lang="en-US"/>
           </a:p>
@@ -2380,7 +2380,7 @@
           <a:p>
             <a:fld id="{7AB5CAF8-9327-F54B-8A6F-A50D5568BC9E}" type="datetimeFigureOut">
               <a:rPr lang="en-US" smtClean="0"/>
-              <a:t>10/19/20</a:t>
+              <a:t>11/25/20</a:t>
             </a:fld>
             <a:endParaRPr lang="en-US"/>
           </a:p>
@@ -2668,7 +2668,7 @@
           <a:p>
             <a:fld id="{7AB5CAF8-9327-F54B-8A6F-A50D5568BC9E}" type="datetimeFigureOut">
               <a:rPr lang="en-US" smtClean="0"/>
-              <a:t>10/19/20</a:t>
+              <a:t>11/25/20</a:t>
             </a:fld>
             <a:endParaRPr lang="en-US"/>
           </a:p>
@@ -2909,7 +2909,7 @@
           <a:p>
             <a:fld id="{7AB5CAF8-9327-F54B-8A6F-A50D5568BC9E}" type="datetimeFigureOut">
               <a:rPr lang="en-US" smtClean="0"/>
-              <a:t>10/19/20</a:t>
+              <a:t>11/25/20</a:t>
             </a:fld>
             <a:endParaRPr lang="en-US"/>
           </a:p>
@@ -3336,10 +3336,10 @@
       </p:grpSpPr>
       <p:grpSp>
         <p:nvGrpSpPr>
-          <p:cNvPr id="68" name="Group 67">
-            <a:extLst>
-              <a:ext uri="{FF2B5EF4-FFF2-40B4-BE49-F238E27FC236}">
-                <a16:creationId xmlns:a16="http://schemas.microsoft.com/office/drawing/2014/main" id="{AE5BC9BF-F9B2-BC4A-90AB-181A17970732}"/>
+          <p:cNvPr id="37" name="Group 36">
+            <a:extLst>
+              <a:ext uri="{FF2B5EF4-FFF2-40B4-BE49-F238E27FC236}">
+                <a16:creationId xmlns:a16="http://schemas.microsoft.com/office/drawing/2014/main" id="{49918DF2-B958-8740-9D3C-B8FFB9FEF6E7}"/>
               </a:ext>
             </a:extLst>
           </p:cNvPr>
@@ -3348,18 +3348,839 @@
         </p:nvGrpSpPr>
         <p:grpSpPr>
           <a:xfrm>
-            <a:off x="1744133" y="-304801"/>
+            <a:off x="1744133" y="0"/>
             <a:ext cx="8703733" cy="6858001"/>
-            <a:chOff x="1811867" y="-1"/>
+            <a:chOff x="1744133" y="0"/>
             <a:chExt cx="8703733" cy="6858001"/>
           </a:xfrm>
         </p:grpSpPr>
+        <p:grpSp>
+          <p:nvGrpSpPr>
+            <p:cNvPr id="68" name="Group 67">
+              <a:extLst>
+                <a:ext uri="{FF2B5EF4-FFF2-40B4-BE49-F238E27FC236}">
+                  <a16:creationId xmlns:a16="http://schemas.microsoft.com/office/drawing/2014/main" id="{AE5BC9BF-F9B2-BC4A-90AB-181A17970732}"/>
+                </a:ext>
+              </a:extLst>
+            </p:cNvPr>
+            <p:cNvGrpSpPr/>
+            <p:nvPr/>
+          </p:nvGrpSpPr>
+          <p:grpSpPr>
+            <a:xfrm>
+              <a:off x="1744133" y="0"/>
+              <a:ext cx="8703733" cy="6858001"/>
+              <a:chOff x="1811867" y="-1"/>
+              <a:chExt cx="8703733" cy="6858001"/>
+            </a:xfrm>
+          </p:grpSpPr>
+          <p:sp>
+            <p:nvSpPr>
+              <p:cNvPr id="67" name="Rectangle 66">
+                <a:extLst>
+                  <a:ext uri="{FF2B5EF4-FFF2-40B4-BE49-F238E27FC236}">
+                    <a16:creationId xmlns:a16="http://schemas.microsoft.com/office/drawing/2014/main" id="{6622BC2C-8D37-4E49-BF65-54BF21E65C1E}"/>
+                  </a:ext>
+                </a:extLst>
+              </p:cNvPr>
+              <p:cNvSpPr/>
+              <p:nvPr/>
+            </p:nvSpPr>
+            <p:spPr>
+              <a:xfrm>
+                <a:off x="1811867" y="-1"/>
+                <a:ext cx="8703733" cy="6857999"/>
+              </a:xfrm>
+              <a:prstGeom prst="rect">
+                <a:avLst/>
+              </a:prstGeom>
+              <a:ln>
+                <a:noFill/>
+              </a:ln>
+            </p:spPr>
+            <p:style>
+              <a:lnRef idx="2">
+                <a:schemeClr val="dk1"/>
+              </a:lnRef>
+              <a:fillRef idx="1">
+                <a:schemeClr val="lt1"/>
+              </a:fillRef>
+              <a:effectRef idx="0">
+                <a:schemeClr val="dk1"/>
+              </a:effectRef>
+              <a:fontRef idx="minor">
+                <a:schemeClr val="dk1"/>
+              </a:fontRef>
+            </p:style>
+            <p:txBody>
+              <a:bodyPr rtlCol="0" anchor="ctr"/>
+              <a:lstStyle/>
+              <a:p>
+                <a:pPr algn="ctr"/>
+                <a:endParaRPr lang="en-US" dirty="0"/>
+              </a:p>
+            </p:txBody>
+          </p:sp>
+          <p:grpSp>
+            <p:nvGrpSpPr>
+              <p:cNvPr id="66" name="Group 65">
+                <a:extLst>
+                  <a:ext uri="{FF2B5EF4-FFF2-40B4-BE49-F238E27FC236}">
+                    <a16:creationId xmlns:a16="http://schemas.microsoft.com/office/drawing/2014/main" id="{6F389862-C04F-5A40-9753-0137FFF811B4}"/>
+                  </a:ext>
+                </a:extLst>
+              </p:cNvPr>
+              <p:cNvGrpSpPr/>
+              <p:nvPr/>
+            </p:nvGrpSpPr>
+            <p:grpSpPr>
+              <a:xfrm>
+                <a:off x="2166440" y="0"/>
+                <a:ext cx="7647268" cy="6858000"/>
+                <a:chOff x="2166440" y="0"/>
+                <a:chExt cx="7647268" cy="6858000"/>
+              </a:xfrm>
+              <a:solidFill>
+                <a:schemeClr val="bg1"/>
+              </a:solidFill>
+            </p:grpSpPr>
+            <p:pic>
+              <p:nvPicPr>
+                <p:cNvPr id="11" name="Picture 10" descr="Diagram&#10;&#10;Description automatically generated">
+                  <a:extLst>
+                    <a:ext uri="{FF2B5EF4-FFF2-40B4-BE49-F238E27FC236}">
+                      <a16:creationId xmlns:a16="http://schemas.microsoft.com/office/drawing/2014/main" id="{B9F32238-2041-CF44-9D44-70D88D0E6B93}"/>
+                    </a:ext>
+                  </a:extLst>
+                </p:cNvPr>
+                <p:cNvPicPr>
+                  <a:picLocks noChangeAspect="1"/>
+                </p:cNvPicPr>
+                <p:nvPr/>
+              </p:nvPicPr>
+              <p:blipFill>
+                <a:blip r:embed="rId2"/>
+                <a:stretch>
+                  <a:fillRect/>
+                </a:stretch>
+              </p:blipFill>
+              <p:spPr>
+                <a:xfrm>
+                  <a:off x="3820148" y="0"/>
+                  <a:ext cx="4551703" cy="6858000"/>
+                </a:xfrm>
+                <a:prstGeom prst="rect">
+                  <a:avLst/>
+                </a:prstGeom>
+                <a:grpFill/>
+              </p:spPr>
+            </p:pic>
+            <p:sp>
+              <p:nvSpPr>
+                <p:cNvPr id="12" name="TextBox 11">
+                  <a:extLst>
+                    <a:ext uri="{FF2B5EF4-FFF2-40B4-BE49-F238E27FC236}">
+                      <a16:creationId xmlns:a16="http://schemas.microsoft.com/office/drawing/2014/main" id="{13695F7E-29F2-674B-8510-D23971571FAE}"/>
+                    </a:ext>
+                  </a:extLst>
+                </p:cNvPr>
+                <p:cNvSpPr txBox="1"/>
+                <p:nvPr/>
+              </p:nvSpPr>
+              <p:spPr>
+                <a:xfrm>
+                  <a:off x="2364222" y="4486765"/>
+                  <a:ext cx="1197764" cy="646331"/>
+                </a:xfrm>
+                <a:prstGeom prst="rect">
+                  <a:avLst/>
+                </a:prstGeom>
+                <a:grpFill/>
+              </p:spPr>
+              <p:txBody>
+                <a:bodyPr wrap="none" rtlCol="0">
+                  <a:spAutoFit/>
+                </a:bodyPr>
+                <a:lstStyle/>
+                <a:p>
+                  <a:r>
+                    <a:rPr lang="en-US" dirty="0">
+                      <a:latin typeface="Arial" panose="020B0604020202020204" pitchFamily="34" charset="0"/>
+                      <a:cs typeface="Arial" panose="020B0604020202020204" pitchFamily="34" charset="0"/>
+                    </a:rPr>
+                    <a:t>Extension</a:t>
+                  </a:r>
+                </a:p>
+                <a:p>
+                  <a:r>
+                    <a:rPr lang="en-US" dirty="0">
+                      <a:latin typeface="Arial" panose="020B0604020202020204" pitchFamily="34" charset="0"/>
+                      <a:cs typeface="Arial" panose="020B0604020202020204" pitchFamily="34" charset="0"/>
+                    </a:rPr>
+                    <a:t>springs</a:t>
+                  </a:r>
+                </a:p>
+              </p:txBody>
+            </p:sp>
+            <p:cxnSp>
+              <p:nvCxnSpPr>
+                <p:cNvPr id="14" name="Straight Arrow Connector 13">
+                  <a:extLst>
+                    <a:ext uri="{FF2B5EF4-FFF2-40B4-BE49-F238E27FC236}">
+                      <a16:creationId xmlns:a16="http://schemas.microsoft.com/office/drawing/2014/main" id="{E0F818B4-0AEB-3148-8FF2-0C347D0C03DA}"/>
+                    </a:ext>
+                  </a:extLst>
+                </p:cNvPr>
+                <p:cNvCxnSpPr>
+                  <a:cxnSpLocks/>
+                  <a:stCxn id="12" idx="3"/>
+                </p:cNvCxnSpPr>
+                <p:nvPr/>
+              </p:nvCxnSpPr>
+              <p:spPr>
+                <a:xfrm flipV="1">
+                  <a:off x="3561986" y="4570375"/>
+                  <a:ext cx="844838" cy="239556"/>
+                </a:xfrm>
+                <a:prstGeom prst="straightConnector1">
+                  <a:avLst/>
+                </a:prstGeom>
+                <a:grpFill/>
+                <a:ln>
+                  <a:tailEnd type="triangle"/>
+                </a:ln>
+              </p:spPr>
+              <p:style>
+                <a:lnRef idx="1">
+                  <a:schemeClr val="dk1"/>
+                </a:lnRef>
+                <a:fillRef idx="0">
+                  <a:schemeClr val="dk1"/>
+                </a:fillRef>
+                <a:effectRef idx="0">
+                  <a:schemeClr val="dk1"/>
+                </a:effectRef>
+                <a:fontRef idx="minor">
+                  <a:schemeClr val="tx1"/>
+                </a:fontRef>
+              </p:style>
+            </p:cxnSp>
+            <p:sp>
+              <p:nvSpPr>
+                <p:cNvPr id="19" name="TextBox 18">
+                  <a:extLst>
+                    <a:ext uri="{FF2B5EF4-FFF2-40B4-BE49-F238E27FC236}">
+                      <a16:creationId xmlns:a16="http://schemas.microsoft.com/office/drawing/2014/main" id="{6B848C65-49E3-D544-96FB-B88DBF8AE3D5}"/>
+                    </a:ext>
+                  </a:extLst>
+                </p:cNvPr>
+                <p:cNvSpPr txBox="1"/>
+                <p:nvPr/>
+              </p:nvSpPr>
+              <p:spPr>
+                <a:xfrm>
+                  <a:off x="3221266" y="6050086"/>
+                  <a:ext cx="1236236" cy="369332"/>
+                </a:xfrm>
+                <a:prstGeom prst="rect">
+                  <a:avLst/>
+                </a:prstGeom>
+                <a:grpFill/>
+              </p:spPr>
+              <p:txBody>
+                <a:bodyPr wrap="none" rtlCol="0">
+                  <a:spAutoFit/>
+                </a:bodyPr>
+                <a:lstStyle/>
+                <a:p>
+                  <a:r>
+                    <a:rPr lang="en-US" dirty="0">
+                      <a:latin typeface="Arial" panose="020B0604020202020204" pitchFamily="34" charset="0"/>
+                      <a:cs typeface="Arial" panose="020B0604020202020204" pitchFamily="34" charset="0"/>
+                    </a:rPr>
+                    <a:t>Rear pivot</a:t>
+                  </a:r>
+                </a:p>
+              </p:txBody>
+            </p:sp>
+            <p:cxnSp>
+              <p:nvCxnSpPr>
+                <p:cNvPr id="20" name="Straight Arrow Connector 19">
+                  <a:extLst>
+                    <a:ext uri="{FF2B5EF4-FFF2-40B4-BE49-F238E27FC236}">
+                      <a16:creationId xmlns:a16="http://schemas.microsoft.com/office/drawing/2014/main" id="{28F69CA5-DF22-A146-A87F-4285138FE14E}"/>
+                    </a:ext>
+                  </a:extLst>
+                </p:cNvPr>
+                <p:cNvCxnSpPr>
+                  <a:cxnSpLocks/>
+                  <a:stCxn id="19" idx="3"/>
+                </p:cNvCxnSpPr>
+                <p:nvPr/>
+              </p:nvCxnSpPr>
+              <p:spPr>
+                <a:xfrm flipV="1">
+                  <a:off x="4457502" y="6135369"/>
+                  <a:ext cx="1350632" cy="99383"/>
+                </a:xfrm>
+                <a:prstGeom prst="straightConnector1">
+                  <a:avLst/>
+                </a:prstGeom>
+                <a:grpFill/>
+                <a:ln>
+                  <a:tailEnd type="triangle"/>
+                </a:ln>
+              </p:spPr>
+              <p:style>
+                <a:lnRef idx="1">
+                  <a:schemeClr val="dk1"/>
+                </a:lnRef>
+                <a:fillRef idx="0">
+                  <a:schemeClr val="dk1"/>
+                </a:fillRef>
+                <a:effectRef idx="0">
+                  <a:schemeClr val="dk1"/>
+                </a:effectRef>
+                <a:fontRef idx="minor">
+                  <a:schemeClr val="tx1"/>
+                </a:fontRef>
+              </p:style>
+            </p:cxnSp>
+            <p:sp>
+              <p:nvSpPr>
+                <p:cNvPr id="22" name="TextBox 21">
+                  <a:extLst>
+                    <a:ext uri="{FF2B5EF4-FFF2-40B4-BE49-F238E27FC236}">
+                      <a16:creationId xmlns:a16="http://schemas.microsoft.com/office/drawing/2014/main" id="{A51D89F4-595D-884A-8871-25F3C418040E}"/>
+                    </a:ext>
+                  </a:extLst>
+                </p:cNvPr>
+                <p:cNvSpPr txBox="1"/>
+                <p:nvPr/>
+              </p:nvSpPr>
+              <p:spPr>
+                <a:xfrm>
+                  <a:off x="2166440" y="435748"/>
+                  <a:ext cx="2629759" cy="1200329"/>
+                </a:xfrm>
+                <a:prstGeom prst="rect">
+                  <a:avLst/>
+                </a:prstGeom>
+                <a:grpFill/>
+              </p:spPr>
+              <p:txBody>
+                <a:bodyPr wrap="none" rtlCol="0">
+                  <a:spAutoFit/>
+                </a:bodyPr>
+                <a:lstStyle/>
+                <a:p>
+                  <a:r>
+                    <a:rPr lang="en-US" dirty="0">
+                      <a:latin typeface="Arial" panose="020B0604020202020204" pitchFamily="34" charset="0"/>
+                      <a:cs typeface="Arial" panose="020B0604020202020204" pitchFamily="34" charset="0"/>
+                    </a:rPr>
+                    <a:t>Friction cord </a:t>
+                  </a:r>
+                </a:p>
+                <a:p>
+                  <a:r>
+                    <a:rPr lang="en-US" dirty="0">
+                      <a:latin typeface="Arial" panose="020B0604020202020204" pitchFamily="34" charset="0"/>
+                      <a:cs typeface="Arial" panose="020B0604020202020204" pitchFamily="34" charset="0"/>
+                    </a:rPr>
+                    <a:t>attached to </a:t>
+                  </a:r>
+                </a:p>
+                <a:p>
+                  <a:r>
+                    <a:rPr lang="en-US" dirty="0">
+                      <a:latin typeface="Arial" panose="020B0604020202020204" pitchFamily="34" charset="0"/>
+                      <a:cs typeface="Arial" panose="020B0604020202020204" pitchFamily="34" charset="0"/>
+                    </a:rPr>
+                    <a:t>hanging weight </a:t>
+                  </a:r>
+                </a:p>
+                <a:p>
+                  <a:r>
+                    <a:rPr lang="en-US" dirty="0">
+                      <a:latin typeface="Arial" panose="020B0604020202020204" pitchFamily="34" charset="0"/>
+                      <a:cs typeface="Arial" panose="020B0604020202020204" pitchFamily="34" charset="0"/>
+                    </a:rPr>
+                    <a:t>via wall-mounted pulley</a:t>
+                  </a:r>
+                </a:p>
+              </p:txBody>
+            </p:sp>
+            <p:cxnSp>
+              <p:nvCxnSpPr>
+                <p:cNvPr id="23" name="Straight Arrow Connector 22">
+                  <a:extLst>
+                    <a:ext uri="{FF2B5EF4-FFF2-40B4-BE49-F238E27FC236}">
+                      <a16:creationId xmlns:a16="http://schemas.microsoft.com/office/drawing/2014/main" id="{7909AB01-9488-FE46-A5B6-A609FC99D901}"/>
+                    </a:ext>
+                  </a:extLst>
+                </p:cNvPr>
+                <p:cNvCxnSpPr>
+                  <a:cxnSpLocks/>
+                  <a:stCxn id="22" idx="2"/>
+                  <a:endCxn id="9" idx="0"/>
+                </p:cNvCxnSpPr>
+                <p:nvPr/>
+              </p:nvCxnSpPr>
+              <p:spPr>
+                <a:xfrm flipH="1">
+                  <a:off x="3328550" y="1636077"/>
+                  <a:ext cx="152770" cy="706585"/>
+                </a:xfrm>
+                <a:prstGeom prst="straightConnector1">
+                  <a:avLst/>
+                </a:prstGeom>
+                <a:grpFill/>
+                <a:ln>
+                  <a:tailEnd type="triangle"/>
+                </a:ln>
+              </p:spPr>
+              <p:style>
+                <a:lnRef idx="1">
+                  <a:schemeClr val="dk1"/>
+                </a:lnRef>
+                <a:fillRef idx="0">
+                  <a:schemeClr val="dk1"/>
+                </a:fillRef>
+                <a:effectRef idx="0">
+                  <a:schemeClr val="dk1"/>
+                </a:effectRef>
+                <a:fontRef idx="minor">
+                  <a:schemeClr val="tx1"/>
+                </a:fontRef>
+              </p:style>
+            </p:cxnSp>
+            <p:sp>
+              <p:nvSpPr>
+                <p:cNvPr id="31" name="TextBox 30">
+                  <a:extLst>
+                    <a:ext uri="{FF2B5EF4-FFF2-40B4-BE49-F238E27FC236}">
+                      <a16:creationId xmlns:a16="http://schemas.microsoft.com/office/drawing/2014/main" id="{08F49B01-6AA3-B04B-8249-AB5F362EEECD}"/>
+                    </a:ext>
+                  </a:extLst>
+                </p:cNvPr>
+                <p:cNvSpPr txBox="1"/>
+                <p:nvPr/>
+              </p:nvSpPr>
+              <p:spPr>
+                <a:xfrm>
+                  <a:off x="3321935" y="2830520"/>
+                  <a:ext cx="1095172" cy="369332"/>
+                </a:xfrm>
+                <a:prstGeom prst="rect">
+                  <a:avLst/>
+                </a:prstGeom>
+                <a:grpFill/>
+              </p:spPr>
+              <p:txBody>
+                <a:bodyPr wrap="none" rtlCol="0">
+                  <a:spAutoFit/>
+                </a:bodyPr>
+                <a:lstStyle/>
+                <a:p>
+                  <a:r>
+                    <a:rPr lang="en-US" dirty="0">
+                      <a:latin typeface="Arial" panose="020B0604020202020204" pitchFamily="34" charset="0"/>
+                      <a:cs typeface="Arial" panose="020B0604020202020204" pitchFamily="34" charset="0"/>
+                    </a:rPr>
+                    <a:t>Flywheel</a:t>
+                  </a:r>
+                </a:p>
+              </p:txBody>
+            </p:sp>
+            <p:cxnSp>
+              <p:nvCxnSpPr>
+                <p:cNvPr id="32" name="Straight Arrow Connector 31">
+                  <a:extLst>
+                    <a:ext uri="{FF2B5EF4-FFF2-40B4-BE49-F238E27FC236}">
+                      <a16:creationId xmlns:a16="http://schemas.microsoft.com/office/drawing/2014/main" id="{6D86F9CA-5D41-9240-9292-6CB71D6922FB}"/>
+                    </a:ext>
+                  </a:extLst>
+                </p:cNvPr>
+                <p:cNvCxnSpPr>
+                  <a:cxnSpLocks/>
+                  <a:stCxn id="31" idx="3"/>
+                </p:cNvCxnSpPr>
+                <p:nvPr/>
+              </p:nvCxnSpPr>
+              <p:spPr>
+                <a:xfrm>
+                  <a:off x="4417107" y="3015186"/>
+                  <a:ext cx="1093044" cy="311565"/>
+                </a:xfrm>
+                <a:prstGeom prst="straightConnector1">
+                  <a:avLst/>
+                </a:prstGeom>
+                <a:grpFill/>
+                <a:ln>
+                  <a:tailEnd type="triangle"/>
+                </a:ln>
+              </p:spPr>
+              <p:style>
+                <a:lnRef idx="1">
+                  <a:schemeClr val="dk1"/>
+                </a:lnRef>
+                <a:fillRef idx="0">
+                  <a:schemeClr val="dk1"/>
+                </a:fillRef>
+                <a:effectRef idx="0">
+                  <a:schemeClr val="dk1"/>
+                </a:effectRef>
+                <a:fontRef idx="minor">
+                  <a:schemeClr val="tx1"/>
+                </a:fontRef>
+              </p:style>
+            </p:cxnSp>
+            <p:sp>
+              <p:nvSpPr>
+                <p:cNvPr id="35" name="TextBox 34">
+                  <a:extLst>
+                    <a:ext uri="{FF2B5EF4-FFF2-40B4-BE49-F238E27FC236}">
+                      <a16:creationId xmlns:a16="http://schemas.microsoft.com/office/drawing/2014/main" id="{9B2EF17C-6AC2-4046-913E-AD74CFF6FF2A}"/>
+                    </a:ext>
+                  </a:extLst>
+                </p:cNvPr>
+                <p:cNvSpPr txBox="1"/>
+                <p:nvPr/>
+              </p:nvSpPr>
+              <p:spPr>
+                <a:xfrm>
+                  <a:off x="8255931" y="3292592"/>
+                  <a:ext cx="1428596" cy="369332"/>
+                </a:xfrm>
+                <a:prstGeom prst="rect">
+                  <a:avLst/>
+                </a:prstGeom>
+                <a:grpFill/>
+              </p:spPr>
+              <p:txBody>
+                <a:bodyPr wrap="none" rtlCol="0">
+                  <a:spAutoFit/>
+                </a:bodyPr>
+                <a:lstStyle/>
+                <a:p>
+                  <a:r>
+                    <a:rPr lang="en-US" dirty="0" err="1">
+                      <a:latin typeface="Arial" panose="020B0604020202020204" pitchFamily="34" charset="0"/>
+                      <a:cs typeface="Arial" panose="020B0604020202020204" pitchFamily="34" charset="0"/>
+                    </a:rPr>
+                    <a:t>Powermeter</a:t>
+                  </a:r>
+                  <a:endParaRPr lang="en-US" dirty="0">
+                    <a:latin typeface="Arial" panose="020B0604020202020204" pitchFamily="34" charset="0"/>
+                    <a:cs typeface="Arial" panose="020B0604020202020204" pitchFamily="34" charset="0"/>
+                  </a:endParaRPr>
+                </a:p>
+              </p:txBody>
+            </p:sp>
+            <p:cxnSp>
+              <p:nvCxnSpPr>
+                <p:cNvPr id="36" name="Straight Arrow Connector 35">
+                  <a:extLst>
+                    <a:ext uri="{FF2B5EF4-FFF2-40B4-BE49-F238E27FC236}">
+                      <a16:creationId xmlns:a16="http://schemas.microsoft.com/office/drawing/2014/main" id="{8749F783-6602-4941-B723-08B1E100693D}"/>
+                    </a:ext>
+                  </a:extLst>
+                </p:cNvPr>
+                <p:cNvCxnSpPr>
+                  <a:cxnSpLocks/>
+                  <a:stCxn id="35" idx="1"/>
+                </p:cNvCxnSpPr>
+                <p:nvPr/>
+              </p:nvCxnSpPr>
+              <p:spPr>
+                <a:xfrm flipH="1">
+                  <a:off x="6885223" y="3477258"/>
+                  <a:ext cx="1370708" cy="369332"/>
+                </a:xfrm>
+                <a:prstGeom prst="straightConnector1">
+                  <a:avLst/>
+                </a:prstGeom>
+                <a:grpFill/>
+                <a:ln>
+                  <a:tailEnd type="triangle"/>
+                </a:ln>
+              </p:spPr>
+              <p:style>
+                <a:lnRef idx="1">
+                  <a:schemeClr val="dk1"/>
+                </a:lnRef>
+                <a:fillRef idx="0">
+                  <a:schemeClr val="dk1"/>
+                </a:fillRef>
+                <a:effectRef idx="0">
+                  <a:schemeClr val="dk1"/>
+                </a:effectRef>
+                <a:fontRef idx="minor">
+                  <a:schemeClr val="tx1"/>
+                </a:fontRef>
+              </p:style>
+            </p:cxnSp>
+            <p:sp>
+              <p:nvSpPr>
+                <p:cNvPr id="39" name="TextBox 38">
+                  <a:extLst>
+                    <a:ext uri="{FF2B5EF4-FFF2-40B4-BE49-F238E27FC236}">
+                      <a16:creationId xmlns:a16="http://schemas.microsoft.com/office/drawing/2014/main" id="{6E77C7CF-18CF-284B-9BC7-20F4BD5D5761}"/>
+                    </a:ext>
+                  </a:extLst>
+                </p:cNvPr>
+                <p:cNvSpPr txBox="1"/>
+                <p:nvPr/>
+              </p:nvSpPr>
+              <p:spPr>
+                <a:xfrm>
+                  <a:off x="7667141" y="2881772"/>
+                  <a:ext cx="607859" cy="369332"/>
+                </a:xfrm>
+                <a:prstGeom prst="rect">
+                  <a:avLst/>
+                </a:prstGeom>
+                <a:grpFill/>
+              </p:spPr>
+              <p:txBody>
+                <a:bodyPr wrap="none" rtlCol="0">
+                  <a:spAutoFit/>
+                </a:bodyPr>
+                <a:lstStyle/>
+                <a:p>
+                  <a:r>
+                    <a:rPr lang="en-US" dirty="0">
+                      <a:latin typeface="Arial" panose="020B0604020202020204" pitchFamily="34" charset="0"/>
+                      <a:cs typeface="Arial" panose="020B0604020202020204" pitchFamily="34" charset="0"/>
+                    </a:rPr>
+                    <a:t>IMU</a:t>
+                  </a:r>
+                </a:p>
+              </p:txBody>
+            </p:sp>
+            <p:cxnSp>
+              <p:nvCxnSpPr>
+                <p:cNvPr id="40" name="Straight Arrow Connector 39">
+                  <a:extLst>
+                    <a:ext uri="{FF2B5EF4-FFF2-40B4-BE49-F238E27FC236}">
+                      <a16:creationId xmlns:a16="http://schemas.microsoft.com/office/drawing/2014/main" id="{5B02735B-6E44-4642-8D64-94B5B810CA9A}"/>
+                    </a:ext>
+                  </a:extLst>
+                </p:cNvPr>
+                <p:cNvCxnSpPr>
+                  <a:cxnSpLocks/>
+                  <a:stCxn id="39" idx="1"/>
+                </p:cNvCxnSpPr>
+                <p:nvPr/>
+              </p:nvCxnSpPr>
+              <p:spPr>
+                <a:xfrm flipH="1">
+                  <a:off x="6703033" y="3066438"/>
+                  <a:ext cx="964108" cy="392835"/>
+                </a:xfrm>
+                <a:prstGeom prst="straightConnector1">
+                  <a:avLst/>
+                </a:prstGeom>
+                <a:grpFill/>
+                <a:ln>
+                  <a:tailEnd type="triangle"/>
+                </a:ln>
+              </p:spPr>
+              <p:style>
+                <a:lnRef idx="1">
+                  <a:schemeClr val="dk1"/>
+                </a:lnRef>
+                <a:fillRef idx="0">
+                  <a:schemeClr val="dk1"/>
+                </a:fillRef>
+                <a:effectRef idx="0">
+                  <a:schemeClr val="dk1"/>
+                </a:effectRef>
+                <a:fontRef idx="minor">
+                  <a:schemeClr val="tx1"/>
+                </a:fontRef>
+              </p:style>
+            </p:cxnSp>
+            <p:sp>
+              <p:nvSpPr>
+                <p:cNvPr id="43" name="TextBox 42">
+                  <a:extLst>
+                    <a:ext uri="{FF2B5EF4-FFF2-40B4-BE49-F238E27FC236}">
+                      <a16:creationId xmlns:a16="http://schemas.microsoft.com/office/drawing/2014/main" id="{C00C2080-FDCC-E440-9975-060B321398DD}"/>
+                    </a:ext>
+                  </a:extLst>
+                </p:cNvPr>
+                <p:cNvSpPr txBox="1"/>
+                <p:nvPr/>
+              </p:nvSpPr>
+              <p:spPr>
+                <a:xfrm>
+                  <a:off x="8539000" y="3984709"/>
+                  <a:ext cx="1274708" cy="369332"/>
+                </a:xfrm>
+                <a:prstGeom prst="rect">
+                  <a:avLst/>
+                </a:prstGeom>
+                <a:grpFill/>
+              </p:spPr>
+              <p:txBody>
+                <a:bodyPr wrap="none" rtlCol="0">
+                  <a:spAutoFit/>
+                </a:bodyPr>
+                <a:lstStyle/>
+                <a:p>
+                  <a:r>
+                    <a:rPr lang="en-US" dirty="0">
+                      <a:latin typeface="Arial" panose="020B0604020202020204" pitchFamily="34" charset="0"/>
+                      <a:cs typeface="Arial" panose="020B0604020202020204" pitchFamily="34" charset="0"/>
+                    </a:rPr>
+                    <a:t>Front pivot</a:t>
+                  </a:r>
+                </a:p>
+              </p:txBody>
+            </p:sp>
+            <p:cxnSp>
+              <p:nvCxnSpPr>
+                <p:cNvPr id="44" name="Straight Arrow Connector 43">
+                  <a:extLst>
+                    <a:ext uri="{FF2B5EF4-FFF2-40B4-BE49-F238E27FC236}">
+                      <a16:creationId xmlns:a16="http://schemas.microsoft.com/office/drawing/2014/main" id="{928E3A06-B6C6-E345-86FC-8855662CC835}"/>
+                    </a:ext>
+                  </a:extLst>
+                </p:cNvPr>
+                <p:cNvCxnSpPr>
+                  <a:cxnSpLocks/>
+                  <a:stCxn id="43" idx="1"/>
+                </p:cNvCxnSpPr>
+                <p:nvPr/>
+              </p:nvCxnSpPr>
+              <p:spPr>
+                <a:xfrm flipH="1">
+                  <a:off x="7197739" y="4169375"/>
+                  <a:ext cx="1341261" cy="438251"/>
+                </a:xfrm>
+                <a:prstGeom prst="straightConnector1">
+                  <a:avLst/>
+                </a:prstGeom>
+                <a:grpFill/>
+                <a:ln>
+                  <a:tailEnd type="triangle"/>
+                </a:ln>
+              </p:spPr>
+              <p:style>
+                <a:lnRef idx="1">
+                  <a:schemeClr val="dk1"/>
+                </a:lnRef>
+                <a:fillRef idx="0">
+                  <a:schemeClr val="dk1"/>
+                </a:fillRef>
+                <a:effectRef idx="0">
+                  <a:schemeClr val="dk1"/>
+                </a:effectRef>
+                <a:fontRef idx="minor">
+                  <a:schemeClr val="tx1"/>
+                </a:fontRef>
+              </p:style>
+            </p:cxnSp>
+            <p:sp>
+              <p:nvSpPr>
+                <p:cNvPr id="49" name="TextBox 48">
+                  <a:extLst>
+                    <a:ext uri="{FF2B5EF4-FFF2-40B4-BE49-F238E27FC236}">
+                      <a16:creationId xmlns:a16="http://schemas.microsoft.com/office/drawing/2014/main" id="{6D081479-574B-BB4A-AFD0-3B0DB51117F5}"/>
+                    </a:ext>
+                  </a:extLst>
+                </p:cNvPr>
+                <p:cNvSpPr txBox="1"/>
+                <p:nvPr/>
+              </p:nvSpPr>
+              <p:spPr>
+                <a:xfrm>
+                  <a:off x="8397251" y="5481713"/>
+                  <a:ext cx="1326004" cy="646331"/>
+                </a:xfrm>
+                <a:prstGeom prst="rect">
+                  <a:avLst/>
+                </a:prstGeom>
+                <a:grpFill/>
+              </p:spPr>
+              <p:txBody>
+                <a:bodyPr wrap="none" rtlCol="0">
+                  <a:spAutoFit/>
+                </a:bodyPr>
+                <a:lstStyle/>
+                <a:p>
+                  <a:r>
+                    <a:rPr lang="en-US" dirty="0">
+                      <a:latin typeface="Arial" panose="020B0604020202020204" pitchFamily="34" charset="0"/>
+                      <a:cs typeface="Arial" panose="020B0604020202020204" pitchFamily="34" charset="0"/>
+                    </a:rPr>
+                    <a:t>Ergometer </a:t>
+                  </a:r>
+                </a:p>
+                <a:p>
+                  <a:r>
+                    <a:rPr lang="en-US" dirty="0">
+                      <a:latin typeface="Arial" panose="020B0604020202020204" pitchFamily="34" charset="0"/>
+                      <a:cs typeface="Arial" panose="020B0604020202020204" pitchFamily="34" charset="0"/>
+                    </a:rPr>
+                    <a:t>frame</a:t>
+                  </a:r>
+                </a:p>
+              </p:txBody>
+            </p:sp>
+            <p:cxnSp>
+              <p:nvCxnSpPr>
+                <p:cNvPr id="53" name="Straight Arrow Connector 52">
+                  <a:extLst>
+                    <a:ext uri="{FF2B5EF4-FFF2-40B4-BE49-F238E27FC236}">
+                      <a16:creationId xmlns:a16="http://schemas.microsoft.com/office/drawing/2014/main" id="{898566B5-7BE5-AD48-94C4-29660FA1E5BD}"/>
+                    </a:ext>
+                  </a:extLst>
+                </p:cNvPr>
+                <p:cNvCxnSpPr>
+                  <a:cxnSpLocks/>
+                  <a:stCxn id="49" idx="1"/>
+                </p:cNvCxnSpPr>
+                <p:nvPr/>
+              </p:nvCxnSpPr>
+              <p:spPr>
+                <a:xfrm flipH="1" flipV="1">
+                  <a:off x="6163735" y="5115077"/>
+                  <a:ext cx="2233516" cy="689802"/>
+                </a:xfrm>
+                <a:prstGeom prst="straightConnector1">
+                  <a:avLst/>
+                </a:prstGeom>
+                <a:grpFill/>
+                <a:ln>
+                  <a:tailEnd type="triangle"/>
+                </a:ln>
+              </p:spPr>
+              <p:style>
+                <a:lnRef idx="1">
+                  <a:schemeClr val="dk1"/>
+                </a:lnRef>
+                <a:fillRef idx="0">
+                  <a:schemeClr val="dk1"/>
+                </a:fillRef>
+                <a:effectRef idx="0">
+                  <a:schemeClr val="dk1"/>
+                </a:effectRef>
+                <a:fontRef idx="minor">
+                  <a:schemeClr val="tx1"/>
+                </a:fontRef>
+              </p:style>
+            </p:cxnSp>
+          </p:grpSp>
+        </p:grpSp>
         <p:sp>
           <p:nvSpPr>
-            <p:cNvPr id="67" name="Rectangle 66">
+            <p:cNvPr id="2" name="Oval 1">
               <a:extLst>
                 <a:ext uri="{FF2B5EF4-FFF2-40B4-BE49-F238E27FC236}">
-                  <a16:creationId xmlns:a16="http://schemas.microsoft.com/office/drawing/2014/main" id="{6622BC2C-8D37-4E49-BF65-54BF21E65C1E}"/>
+                  <a16:creationId xmlns:a16="http://schemas.microsoft.com/office/drawing/2014/main" id="{FA4453CB-3335-354A-A6D5-D3BF14347C8C}"/>
                 </a:ext>
               </a:extLst>
             </p:cNvPr>
@@ -3368,28 +4189,35 @@
           </p:nvSpPr>
           <p:spPr>
             <a:xfrm>
-              <a:off x="1811867" y="-1"/>
-              <a:ext cx="8703733" cy="6857999"/>
+              <a:off x="5765800" y="6089650"/>
+              <a:ext cx="45719" cy="45719"/>
             </a:xfrm>
-            <a:prstGeom prst="rect">
+            <a:prstGeom prst="ellipse">
               <a:avLst/>
             </a:prstGeom>
+            <a:solidFill>
+              <a:schemeClr val="tx1"/>
+            </a:solidFill>
             <a:ln>
-              <a:noFill/>
+              <a:solidFill>
+                <a:schemeClr val="tx1"/>
+              </a:solidFill>
             </a:ln>
           </p:spPr>
           <p:style>
             <a:lnRef idx="2">
-              <a:schemeClr val="dk1"/>
+              <a:schemeClr val="dk1">
+                <a:shade val="50000"/>
+              </a:schemeClr>
             </a:lnRef>
             <a:fillRef idx="1">
-              <a:schemeClr val="lt1"/>
+              <a:schemeClr val="dk1"/>
             </a:fillRef>
             <a:effectRef idx="0">
               <a:schemeClr val="dk1"/>
             </a:effectRef>
             <a:fontRef idx="minor">
-              <a:schemeClr val="dk1"/>
+              <a:schemeClr val="lt1"/>
             </a:fontRef>
           </p:style>
           <p:txBody>
@@ -3401,1062 +4229,362 @@
             </a:p>
           </p:txBody>
         </p:sp>
-        <p:grpSp>
-          <p:nvGrpSpPr>
-            <p:cNvPr id="66" name="Group 65">
+        <p:sp>
+          <p:nvSpPr>
+            <p:cNvPr id="5" name="Can 4">
               <a:extLst>
                 <a:ext uri="{FF2B5EF4-FFF2-40B4-BE49-F238E27FC236}">
-                  <a16:creationId xmlns:a16="http://schemas.microsoft.com/office/drawing/2014/main" id="{6F389862-C04F-5A40-9753-0137FFF811B4}"/>
+                  <a16:creationId xmlns:a16="http://schemas.microsoft.com/office/drawing/2014/main" id="{AB3033C5-C6A1-6540-8210-EECC9C88CDE2}"/>
                 </a:ext>
               </a:extLst>
             </p:cNvPr>
-            <p:cNvGrpSpPr/>
+            <p:cNvSpPr/>
             <p:nvPr/>
-          </p:nvGrpSpPr>
-          <p:grpSpPr>
+          </p:nvSpPr>
+          <p:spPr>
+            <a:xfrm rot="5400000">
+              <a:off x="2386678" y="2595117"/>
+              <a:ext cx="630810" cy="311833"/>
+            </a:xfrm>
+            <a:prstGeom prst="can">
+              <a:avLst>
+                <a:gd name="adj" fmla="val 50000"/>
+              </a:avLst>
+            </a:prstGeom>
+            <a:noFill/>
+            <a:ln w="19050">
+              <a:solidFill>
+                <a:schemeClr val="tx1"/>
+              </a:solidFill>
+            </a:ln>
+          </p:spPr>
+          <p:style>
+            <a:lnRef idx="2">
+              <a:schemeClr val="accent1">
+                <a:shade val="50000"/>
+              </a:schemeClr>
+            </a:lnRef>
+            <a:fillRef idx="1">
+              <a:schemeClr val="accent1"/>
+            </a:fillRef>
+            <a:effectRef idx="0">
+              <a:schemeClr val="accent1"/>
+            </a:effectRef>
+            <a:fontRef idx="minor">
+              <a:schemeClr val="lt1"/>
+            </a:fontRef>
+          </p:style>
+          <p:txBody>
+            <a:bodyPr rtlCol="0" anchor="ctr"/>
+            <a:lstStyle/>
+            <a:p>
+              <a:pPr algn="ctr"/>
+              <a:endParaRPr lang="en-US"/>
+            </a:p>
+          </p:txBody>
+        </p:sp>
+        <p:sp>
+          <p:nvSpPr>
+            <p:cNvPr id="8" name="Freeform 7">
+              <a:extLst>
+                <a:ext uri="{FF2B5EF4-FFF2-40B4-BE49-F238E27FC236}">
+                  <a16:creationId xmlns:a16="http://schemas.microsoft.com/office/drawing/2014/main" id="{33193548-9B82-7549-A6A6-6AC5DEC75251}"/>
+                </a:ext>
+              </a:extLst>
+            </p:cNvPr>
+            <p:cNvSpPr/>
+            <p:nvPr/>
+          </p:nvSpPr>
+          <p:spPr>
             <a:xfrm>
-              <a:off x="2066306" y="0"/>
-              <a:ext cx="8342569" cy="6858000"/>
-              <a:chOff x="2066306" y="0"/>
-              <a:chExt cx="8342569" cy="6858000"/>
+              <a:off x="2623350" y="2377021"/>
+              <a:ext cx="1277318" cy="1228493"/>
             </a:xfrm>
+            <a:custGeom>
+              <a:avLst/>
+              <a:gdLst>
+                <a:gd name="connsiteX0" fmla="*/ 1277318 w 1277318"/>
+                <a:gd name="connsiteY0" fmla="*/ 76812 h 1228493"/>
+                <a:gd name="connsiteX1" fmla="*/ 241384 w 1277318"/>
+                <a:gd name="connsiteY1" fmla="*/ 7364 h 1228493"/>
+                <a:gd name="connsiteX2" fmla="*/ 15678 w 1277318"/>
+                <a:gd name="connsiteY2" fmla="*/ 233070 h 1228493"/>
+                <a:gd name="connsiteX3" fmla="*/ 21465 w 1277318"/>
+                <a:gd name="connsiteY3" fmla="*/ 771293 h 1228493"/>
+                <a:gd name="connsiteX4" fmla="*/ 38827 w 1277318"/>
+                <a:gd name="connsiteY4" fmla="*/ 1228493 h 1228493"/>
+              </a:gdLst>
+              <a:ahLst/>
+              <a:cxnLst>
+                <a:cxn ang="0">
+                  <a:pos x="connsiteX0" y="connsiteY0"/>
+                </a:cxn>
+                <a:cxn ang="0">
+                  <a:pos x="connsiteX1" y="connsiteY1"/>
+                </a:cxn>
+                <a:cxn ang="0">
+                  <a:pos x="connsiteX2" y="connsiteY2"/>
+                </a:cxn>
+                <a:cxn ang="0">
+                  <a:pos x="connsiteX3" y="connsiteY3"/>
+                </a:cxn>
+                <a:cxn ang="0">
+                  <a:pos x="connsiteX4" y="connsiteY4"/>
+                </a:cxn>
+              </a:cxnLst>
+              <a:rect l="l" t="t" r="r" b="b"/>
+              <a:pathLst>
+                <a:path w="1277318" h="1228493">
+                  <a:moveTo>
+                    <a:pt x="1277318" y="76812"/>
+                  </a:moveTo>
+                  <a:cubicBezTo>
+                    <a:pt x="864487" y="29066"/>
+                    <a:pt x="451657" y="-18679"/>
+                    <a:pt x="241384" y="7364"/>
+                  </a:cubicBezTo>
+                  <a:cubicBezTo>
+                    <a:pt x="31111" y="33407"/>
+                    <a:pt x="52331" y="105749"/>
+                    <a:pt x="15678" y="233070"/>
+                  </a:cubicBezTo>
+                  <a:cubicBezTo>
+                    <a:pt x="-20975" y="360391"/>
+                    <a:pt x="17607" y="605389"/>
+                    <a:pt x="21465" y="771293"/>
+                  </a:cubicBezTo>
+                  <a:cubicBezTo>
+                    <a:pt x="25323" y="937197"/>
+                    <a:pt x="36898" y="1133967"/>
+                    <a:pt x="38827" y="1228493"/>
+                  </a:cubicBezTo>
+                </a:path>
+              </a:pathLst>
+            </a:custGeom>
+            <a:noFill/>
+            <a:ln>
+              <a:solidFill>
+                <a:schemeClr val="tx1"/>
+              </a:solidFill>
+            </a:ln>
+          </p:spPr>
+          <p:style>
+            <a:lnRef idx="2">
+              <a:schemeClr val="accent1">
+                <a:shade val="50000"/>
+              </a:schemeClr>
+            </a:lnRef>
+            <a:fillRef idx="1">
+              <a:schemeClr val="accent1"/>
+            </a:fillRef>
+            <a:effectRef idx="0">
+              <a:schemeClr val="accent1"/>
+            </a:effectRef>
+            <a:fontRef idx="minor">
+              <a:schemeClr val="lt1"/>
+            </a:fontRef>
+          </p:style>
+          <p:txBody>
+            <a:bodyPr rtlCol="0" anchor="ctr"/>
+            <a:lstStyle/>
+            <a:p>
+              <a:pPr algn="ctr"/>
+              <a:endParaRPr lang="en-US"/>
+            </a:p>
+          </p:txBody>
+        </p:sp>
+        <p:pic>
+          <p:nvPicPr>
+            <p:cNvPr id="9" name="Picture 8">
+              <a:extLst>
+                <a:ext uri="{FF2B5EF4-FFF2-40B4-BE49-F238E27FC236}">
+                  <a16:creationId xmlns:a16="http://schemas.microsoft.com/office/drawing/2014/main" id="{55610D85-376A-5F43-B8D4-8708EE1CF17C}"/>
+                </a:ext>
+              </a:extLst>
+            </p:cNvPr>
+            <p:cNvPicPr>
+              <a:picLocks noChangeAspect="1"/>
+            </p:cNvPicPr>
+            <p:nvPr/>
+          </p:nvPicPr>
+          <p:blipFill>
+            <a:blip r:embed="rId3"/>
+            <a:stretch>
+              <a:fillRect/>
+            </a:stretch>
+          </p:blipFill>
+          <p:spPr>
+            <a:xfrm>
+              <a:off x="2619466" y="2342663"/>
+              <a:ext cx="1282700" cy="1244600"/>
+            </a:xfrm>
+            <a:prstGeom prst="rect">
+              <a:avLst/>
+            </a:prstGeom>
+          </p:spPr>
+        </p:pic>
+        <p:sp>
+          <p:nvSpPr>
+            <p:cNvPr id="10" name="Trapezoid 9">
+              <a:extLst>
+                <a:ext uri="{FF2B5EF4-FFF2-40B4-BE49-F238E27FC236}">
+                  <a16:creationId xmlns:a16="http://schemas.microsoft.com/office/drawing/2014/main" id="{6DD0F687-F4FB-0A4C-84B1-F8E887748EA8}"/>
+                </a:ext>
+              </a:extLst>
+            </p:cNvPr>
+            <p:cNvSpPr/>
+            <p:nvPr/>
+          </p:nvSpPr>
+          <p:spPr>
+            <a:xfrm>
+              <a:off x="2427832" y="3599727"/>
+              <a:ext cx="479744" cy="446514"/>
+            </a:xfrm>
+            <a:prstGeom prst="trapezoid">
+              <a:avLst/>
+            </a:prstGeom>
+            <a:noFill/>
+            <a:ln w="19050">
+              <a:solidFill>
+                <a:schemeClr val="tx1"/>
+              </a:solidFill>
+            </a:ln>
+          </p:spPr>
+          <p:style>
+            <a:lnRef idx="2">
+              <a:schemeClr val="accent1">
+                <a:shade val="50000"/>
+              </a:schemeClr>
+            </a:lnRef>
+            <a:fillRef idx="1">
+              <a:schemeClr val="accent1"/>
+            </a:fillRef>
+            <a:effectRef idx="0">
+              <a:schemeClr val="accent1"/>
+            </a:effectRef>
+            <a:fontRef idx="minor">
+              <a:schemeClr val="lt1"/>
+            </a:fontRef>
+          </p:style>
+          <p:txBody>
+            <a:bodyPr rtlCol="0" anchor="ctr"/>
+            <a:lstStyle/>
+            <a:p>
+              <a:pPr algn="ctr"/>
+              <a:endParaRPr lang="en-US" dirty="0">
+                <a:ln>
+                  <a:solidFill>
+                    <a:schemeClr val="tx1"/>
+                  </a:solidFill>
+                </a:ln>
+                <a:solidFill>
+                  <a:schemeClr val="tx1"/>
+                </a:solidFill>
+                <a:latin typeface="Arial" panose="020B0604020202020204" pitchFamily="34" charset="0"/>
+                <a:cs typeface="Arial" panose="020B0604020202020204" pitchFamily="34" charset="0"/>
+              </a:endParaRPr>
+            </a:p>
+          </p:txBody>
+        </p:sp>
+        <p:sp>
+          <p:nvSpPr>
+            <p:cNvPr id="41" name="TextBox 40">
+              <a:extLst>
+                <a:ext uri="{FF2B5EF4-FFF2-40B4-BE49-F238E27FC236}">
+                  <a16:creationId xmlns:a16="http://schemas.microsoft.com/office/drawing/2014/main" id="{9B75EE3A-3EA0-5A43-BD49-93C7CF38A964}"/>
+                </a:ext>
+              </a:extLst>
+            </p:cNvPr>
+            <p:cNvSpPr txBox="1"/>
+            <p:nvPr/>
+          </p:nvSpPr>
+          <p:spPr>
+            <a:xfrm>
+              <a:off x="2575207" y="3708091"/>
+              <a:ext cx="184994" cy="276999"/>
+            </a:xfrm>
+            <a:prstGeom prst="rect">
+              <a:avLst/>
+            </a:prstGeom>
             <a:solidFill>
               <a:schemeClr val="bg1"/>
             </a:solidFill>
-          </p:grpSpPr>
-          <p:pic>
-            <p:nvPicPr>
-              <p:cNvPr id="11" name="Picture 10" descr="Diagram&#10;&#10;Description automatically generated">
-                <a:extLst>
-                  <a:ext uri="{FF2B5EF4-FFF2-40B4-BE49-F238E27FC236}">
-                    <a16:creationId xmlns:a16="http://schemas.microsoft.com/office/drawing/2014/main" id="{B9F32238-2041-CF44-9D44-70D88D0E6B93}"/>
-                  </a:ext>
-                </a:extLst>
-              </p:cNvPr>
-              <p:cNvPicPr>
-                <a:picLocks noChangeAspect="1"/>
-              </p:cNvPicPr>
-              <p:nvPr/>
-            </p:nvPicPr>
-            <p:blipFill>
-              <a:blip r:embed="rId2"/>
-              <a:stretch>
-                <a:fillRect/>
-              </a:stretch>
-            </p:blipFill>
-            <p:spPr>
-              <a:xfrm>
-                <a:off x="3820148" y="0"/>
-                <a:ext cx="4551703" cy="6858000"/>
-              </a:xfrm>
-              <a:prstGeom prst="rect">
-                <a:avLst/>
-              </a:prstGeom>
-              <a:grpFill/>
-            </p:spPr>
-          </p:pic>
-          <p:sp>
-            <p:nvSpPr>
-              <p:cNvPr id="12" name="TextBox 11">
-                <a:extLst>
-                  <a:ext uri="{FF2B5EF4-FFF2-40B4-BE49-F238E27FC236}">
-                    <a16:creationId xmlns:a16="http://schemas.microsoft.com/office/drawing/2014/main" id="{13695F7E-29F2-674B-8510-D23971571FAE}"/>
-                  </a:ext>
-                </a:extLst>
-              </p:cNvPr>
-              <p:cNvSpPr txBox="1"/>
-              <p:nvPr/>
-            </p:nvSpPr>
-            <p:spPr>
-              <a:xfrm>
-                <a:off x="2066306" y="4607626"/>
-                <a:ext cx="1197764" cy="646331"/>
-              </a:xfrm>
-              <a:prstGeom prst="rect">
-                <a:avLst/>
-              </a:prstGeom>
-              <a:grpFill/>
-            </p:spPr>
-            <p:txBody>
-              <a:bodyPr wrap="none" rtlCol="0">
-                <a:spAutoFit/>
-              </a:bodyPr>
-              <a:lstStyle/>
-              <a:p>
-                <a:r>
-                  <a:rPr lang="en-US" dirty="0">
-                    <a:latin typeface="Arial" panose="020B0604020202020204" pitchFamily="34" charset="0"/>
-                    <a:cs typeface="Arial" panose="020B0604020202020204" pitchFamily="34" charset="0"/>
-                  </a:rPr>
-                  <a:t>Extension</a:t>
-                </a:r>
-              </a:p>
-              <a:p>
-                <a:r>
-                  <a:rPr lang="en-US" dirty="0">
-                    <a:latin typeface="Arial" panose="020B0604020202020204" pitchFamily="34" charset="0"/>
-                    <a:cs typeface="Arial" panose="020B0604020202020204" pitchFamily="34" charset="0"/>
-                  </a:rPr>
-                  <a:t>springs</a:t>
-                </a:r>
-              </a:p>
-            </p:txBody>
-          </p:sp>
-          <p:cxnSp>
-            <p:nvCxnSpPr>
-              <p:cNvPr id="14" name="Straight Arrow Connector 13">
-                <a:extLst>
-                  <a:ext uri="{FF2B5EF4-FFF2-40B4-BE49-F238E27FC236}">
-                    <a16:creationId xmlns:a16="http://schemas.microsoft.com/office/drawing/2014/main" id="{E0F818B4-0AEB-3148-8FF2-0C347D0C03DA}"/>
-                  </a:ext>
-                </a:extLst>
-              </p:cNvPr>
-              <p:cNvCxnSpPr>
-                <a:cxnSpLocks/>
-                <a:stCxn id="12" idx="3"/>
-              </p:cNvCxnSpPr>
-              <p:nvPr/>
-            </p:nvCxnSpPr>
-            <p:spPr>
-              <a:xfrm flipV="1">
-                <a:off x="3264070" y="4417622"/>
-                <a:ext cx="1058548" cy="513170"/>
-              </a:xfrm>
-              <a:prstGeom prst="straightConnector1">
-                <a:avLst/>
-              </a:prstGeom>
-              <a:grpFill/>
-              <a:ln>
-                <a:tailEnd type="triangle"/>
-              </a:ln>
-            </p:spPr>
-            <p:style>
-              <a:lnRef idx="1">
-                <a:schemeClr val="dk1"/>
-              </a:lnRef>
-              <a:fillRef idx="0">
-                <a:schemeClr val="dk1"/>
-              </a:fillRef>
-              <a:effectRef idx="0">
-                <a:schemeClr val="dk1"/>
-              </a:effectRef>
-              <a:fontRef idx="minor">
-                <a:schemeClr val="tx1"/>
-              </a:fontRef>
-            </p:style>
-          </p:cxnSp>
-          <p:cxnSp>
-            <p:nvCxnSpPr>
-              <p:cNvPr id="16" name="Straight Arrow Connector 15">
-                <a:extLst>
-                  <a:ext uri="{FF2B5EF4-FFF2-40B4-BE49-F238E27FC236}">
-                    <a16:creationId xmlns:a16="http://schemas.microsoft.com/office/drawing/2014/main" id="{5160268E-657B-1144-8167-46F57883071E}"/>
-                  </a:ext>
-                </a:extLst>
-              </p:cNvPr>
-              <p:cNvCxnSpPr>
-                <a:cxnSpLocks/>
-                <a:stCxn id="12" idx="3"/>
-              </p:cNvCxnSpPr>
-              <p:nvPr/>
-            </p:nvCxnSpPr>
-            <p:spPr>
-              <a:xfrm>
-                <a:off x="3264070" y="4930792"/>
-                <a:ext cx="4181759" cy="0"/>
-              </a:xfrm>
-              <a:prstGeom prst="straightConnector1">
-                <a:avLst/>
-              </a:prstGeom>
-              <a:grpFill/>
-              <a:ln>
-                <a:tailEnd type="triangle"/>
-              </a:ln>
-            </p:spPr>
-            <p:style>
-              <a:lnRef idx="1">
-                <a:schemeClr val="dk1"/>
-              </a:lnRef>
-              <a:fillRef idx="0">
-                <a:schemeClr val="dk1"/>
-              </a:fillRef>
-              <a:effectRef idx="0">
-                <a:schemeClr val="dk1"/>
-              </a:effectRef>
-              <a:fontRef idx="minor">
-                <a:schemeClr val="tx1"/>
-              </a:fontRef>
-            </p:style>
-          </p:cxnSp>
-          <p:sp>
-            <p:nvSpPr>
-              <p:cNvPr id="19" name="TextBox 18">
-                <a:extLst>
-                  <a:ext uri="{FF2B5EF4-FFF2-40B4-BE49-F238E27FC236}">
-                    <a16:creationId xmlns:a16="http://schemas.microsoft.com/office/drawing/2014/main" id="{6B848C65-49E3-D544-96FB-B88DBF8AE3D5}"/>
-                  </a:ext>
-                </a:extLst>
-              </p:cNvPr>
-              <p:cNvSpPr txBox="1"/>
-              <p:nvPr/>
-            </p:nvSpPr>
-            <p:spPr>
-              <a:xfrm>
-                <a:off x="3221266" y="6050086"/>
-                <a:ext cx="1236236" cy="369332"/>
-              </a:xfrm>
-              <a:prstGeom prst="rect">
-                <a:avLst/>
-              </a:prstGeom>
-              <a:grpFill/>
-            </p:spPr>
-            <p:txBody>
-              <a:bodyPr wrap="none" rtlCol="0">
-                <a:spAutoFit/>
-              </a:bodyPr>
-              <a:lstStyle/>
-              <a:p>
-                <a:r>
-                  <a:rPr lang="en-US" dirty="0">
-                    <a:latin typeface="Arial" panose="020B0604020202020204" pitchFamily="34" charset="0"/>
-                    <a:cs typeface="Arial" panose="020B0604020202020204" pitchFamily="34" charset="0"/>
-                  </a:rPr>
-                  <a:t>Rear pivot</a:t>
-                </a:r>
-              </a:p>
-            </p:txBody>
-          </p:sp>
-          <p:cxnSp>
-            <p:nvCxnSpPr>
-              <p:cNvPr id="20" name="Straight Arrow Connector 19">
-                <a:extLst>
-                  <a:ext uri="{FF2B5EF4-FFF2-40B4-BE49-F238E27FC236}">
-                    <a16:creationId xmlns:a16="http://schemas.microsoft.com/office/drawing/2014/main" id="{28F69CA5-DF22-A146-A87F-4285138FE14E}"/>
-                  </a:ext>
-                </a:extLst>
-              </p:cNvPr>
-              <p:cNvCxnSpPr>
-                <a:cxnSpLocks/>
-                <a:stCxn id="19" idx="3"/>
-              </p:cNvCxnSpPr>
-              <p:nvPr/>
-            </p:nvCxnSpPr>
-            <p:spPr>
-              <a:xfrm flipV="1">
-                <a:off x="4457502" y="6162834"/>
-                <a:ext cx="1323802" cy="71918"/>
-              </a:xfrm>
-              <a:prstGeom prst="straightConnector1">
-                <a:avLst/>
-              </a:prstGeom>
-              <a:grpFill/>
-              <a:ln>
-                <a:tailEnd type="triangle"/>
-              </a:ln>
-            </p:spPr>
-            <p:style>
-              <a:lnRef idx="1">
-                <a:schemeClr val="dk1"/>
-              </a:lnRef>
-              <a:fillRef idx="0">
-                <a:schemeClr val="dk1"/>
-              </a:fillRef>
-              <a:effectRef idx="0">
-                <a:schemeClr val="dk1"/>
-              </a:effectRef>
-              <a:fontRef idx="minor">
-                <a:schemeClr val="tx1"/>
-              </a:fontRef>
-            </p:style>
-          </p:cxnSp>
-          <p:sp>
-            <p:nvSpPr>
-              <p:cNvPr id="22" name="TextBox 21">
-                <a:extLst>
-                  <a:ext uri="{FF2B5EF4-FFF2-40B4-BE49-F238E27FC236}">
-                    <a16:creationId xmlns:a16="http://schemas.microsoft.com/office/drawing/2014/main" id="{A51D89F4-595D-884A-8871-25F3C418040E}"/>
-                  </a:ext>
-                </a:extLst>
-              </p:cNvPr>
-              <p:cNvSpPr txBox="1"/>
-              <p:nvPr/>
-            </p:nvSpPr>
-            <p:spPr>
-              <a:xfrm>
-                <a:off x="3075984" y="865184"/>
-                <a:ext cx="1620957" cy="1200329"/>
-              </a:xfrm>
-              <a:prstGeom prst="rect">
-                <a:avLst/>
-              </a:prstGeom>
-              <a:grpFill/>
-            </p:spPr>
-            <p:txBody>
-              <a:bodyPr wrap="none" rtlCol="0">
-                <a:spAutoFit/>
-              </a:bodyPr>
-              <a:lstStyle/>
-              <a:p>
-                <a:r>
-                  <a:rPr lang="en-US" dirty="0">
-                    <a:latin typeface="Arial" panose="020B0604020202020204" pitchFamily="34" charset="0"/>
-                    <a:cs typeface="Arial" panose="020B0604020202020204" pitchFamily="34" charset="0"/>
-                  </a:rPr>
-                  <a:t>Friction cord </a:t>
-                </a:r>
-              </a:p>
-              <a:p>
-                <a:r>
-                  <a:rPr lang="en-US" dirty="0">
-                    <a:latin typeface="Arial" panose="020B0604020202020204" pitchFamily="34" charset="0"/>
-                    <a:cs typeface="Arial" panose="020B0604020202020204" pitchFamily="34" charset="0"/>
-                  </a:rPr>
-                  <a:t>attached to </a:t>
-                </a:r>
-              </a:p>
-              <a:p>
-                <a:r>
-                  <a:rPr lang="en-US" dirty="0">
-                    <a:latin typeface="Arial" panose="020B0604020202020204" pitchFamily="34" charset="0"/>
-                    <a:cs typeface="Arial" panose="020B0604020202020204" pitchFamily="34" charset="0"/>
-                  </a:rPr>
-                  <a:t>wall-mounted </a:t>
-                </a:r>
-              </a:p>
-              <a:p>
-                <a:r>
-                  <a:rPr lang="en-US" dirty="0">
-                    <a:latin typeface="Arial" panose="020B0604020202020204" pitchFamily="34" charset="0"/>
-                    <a:cs typeface="Arial" panose="020B0604020202020204" pitchFamily="34" charset="0"/>
-                  </a:rPr>
-                  <a:t>pulley</a:t>
-                </a:r>
-              </a:p>
-            </p:txBody>
-          </p:sp>
-          <p:cxnSp>
-            <p:nvCxnSpPr>
-              <p:cNvPr id="23" name="Straight Arrow Connector 22">
-                <a:extLst>
-                  <a:ext uri="{FF2B5EF4-FFF2-40B4-BE49-F238E27FC236}">
-                    <a16:creationId xmlns:a16="http://schemas.microsoft.com/office/drawing/2014/main" id="{7909AB01-9488-FE46-A5B6-A609FC99D901}"/>
-                  </a:ext>
-                </a:extLst>
-              </p:cNvPr>
-              <p:cNvCxnSpPr>
-                <a:cxnSpLocks/>
-                <a:stCxn id="22" idx="3"/>
-              </p:cNvCxnSpPr>
-              <p:nvPr/>
-            </p:nvCxnSpPr>
-            <p:spPr>
-              <a:xfrm>
-                <a:off x="4696941" y="1465349"/>
-                <a:ext cx="203922" cy="1111257"/>
-              </a:xfrm>
-              <a:prstGeom prst="straightConnector1">
-                <a:avLst/>
-              </a:prstGeom>
-              <a:grpFill/>
-              <a:ln>
-                <a:tailEnd type="triangle"/>
-              </a:ln>
-            </p:spPr>
-            <p:style>
-              <a:lnRef idx="1">
-                <a:schemeClr val="dk1"/>
-              </a:lnRef>
-              <a:fillRef idx="0">
-                <a:schemeClr val="dk1"/>
-              </a:fillRef>
-              <a:effectRef idx="0">
-                <a:schemeClr val="dk1"/>
-              </a:effectRef>
-              <a:fontRef idx="minor">
-                <a:schemeClr val="tx1"/>
-              </a:fontRef>
-            </p:style>
-          </p:cxnSp>
-          <p:cxnSp>
-            <p:nvCxnSpPr>
-              <p:cNvPr id="25" name="Straight Arrow Connector 24">
-                <a:extLst>
-                  <a:ext uri="{FF2B5EF4-FFF2-40B4-BE49-F238E27FC236}">
-                    <a16:creationId xmlns:a16="http://schemas.microsoft.com/office/drawing/2014/main" id="{ADA03BFF-4AE5-0E4F-86C9-BC1B447C1FCF}"/>
-                  </a:ext>
-                </a:extLst>
-              </p:cNvPr>
-              <p:cNvCxnSpPr>
-                <a:cxnSpLocks/>
-                <a:stCxn id="22" idx="3"/>
-              </p:cNvCxnSpPr>
-              <p:nvPr/>
-            </p:nvCxnSpPr>
-            <p:spPr>
-              <a:xfrm>
-                <a:off x="4696941" y="1465349"/>
-                <a:ext cx="1015439" cy="1549835"/>
-              </a:xfrm>
-              <a:prstGeom prst="straightConnector1">
-                <a:avLst/>
-              </a:prstGeom>
-              <a:grpFill/>
-              <a:ln>
-                <a:tailEnd type="triangle"/>
-              </a:ln>
-            </p:spPr>
-            <p:style>
-              <a:lnRef idx="1">
-                <a:schemeClr val="dk1"/>
-              </a:lnRef>
-              <a:fillRef idx="0">
-                <a:schemeClr val="dk1"/>
-              </a:fillRef>
-              <a:effectRef idx="0">
-                <a:schemeClr val="dk1"/>
-              </a:effectRef>
-              <a:fontRef idx="minor">
-                <a:schemeClr val="tx1"/>
-              </a:fontRef>
-            </p:style>
-          </p:cxnSp>
-          <p:sp>
-            <p:nvSpPr>
-              <p:cNvPr id="31" name="TextBox 30">
-                <a:extLst>
-                  <a:ext uri="{FF2B5EF4-FFF2-40B4-BE49-F238E27FC236}">
-                    <a16:creationId xmlns:a16="http://schemas.microsoft.com/office/drawing/2014/main" id="{08F49B01-6AA3-B04B-8249-AB5F362EEECD}"/>
-                  </a:ext>
-                </a:extLst>
-              </p:cNvPr>
-              <p:cNvSpPr txBox="1"/>
-              <p:nvPr/>
-            </p:nvSpPr>
-            <p:spPr>
-              <a:xfrm>
-                <a:off x="3321935" y="2830520"/>
-                <a:ext cx="1095172" cy="369332"/>
-              </a:xfrm>
-              <a:prstGeom prst="rect">
-                <a:avLst/>
-              </a:prstGeom>
-              <a:grpFill/>
-            </p:spPr>
-            <p:txBody>
-              <a:bodyPr wrap="none" rtlCol="0">
-                <a:spAutoFit/>
-              </a:bodyPr>
-              <a:lstStyle/>
-              <a:p>
-                <a:r>
-                  <a:rPr lang="en-US" dirty="0">
-                    <a:latin typeface="Arial" panose="020B0604020202020204" pitchFamily="34" charset="0"/>
-                    <a:cs typeface="Arial" panose="020B0604020202020204" pitchFamily="34" charset="0"/>
-                  </a:rPr>
-                  <a:t>Flywheel</a:t>
-                </a:r>
-              </a:p>
-            </p:txBody>
-          </p:sp>
-          <p:cxnSp>
-            <p:nvCxnSpPr>
-              <p:cNvPr id="32" name="Straight Arrow Connector 31">
-                <a:extLst>
-                  <a:ext uri="{FF2B5EF4-FFF2-40B4-BE49-F238E27FC236}">
-                    <a16:creationId xmlns:a16="http://schemas.microsoft.com/office/drawing/2014/main" id="{6D86F9CA-5D41-9240-9292-6CB71D6922FB}"/>
-                  </a:ext>
-                </a:extLst>
-              </p:cNvPr>
-              <p:cNvCxnSpPr>
-                <a:cxnSpLocks/>
-                <a:stCxn id="31" idx="3"/>
-              </p:cNvCxnSpPr>
-              <p:nvPr/>
-            </p:nvCxnSpPr>
-            <p:spPr>
-              <a:xfrm>
-                <a:off x="4417107" y="3015186"/>
-                <a:ext cx="1093044" cy="311565"/>
-              </a:xfrm>
-              <a:prstGeom prst="straightConnector1">
-                <a:avLst/>
-              </a:prstGeom>
-              <a:grpFill/>
-              <a:ln>
-                <a:tailEnd type="triangle"/>
-              </a:ln>
-            </p:spPr>
-            <p:style>
-              <a:lnRef idx="1">
-                <a:schemeClr val="dk1"/>
-              </a:lnRef>
-              <a:fillRef idx="0">
-                <a:schemeClr val="dk1"/>
-              </a:fillRef>
-              <a:effectRef idx="0">
-                <a:schemeClr val="dk1"/>
-              </a:effectRef>
-              <a:fontRef idx="minor">
-                <a:schemeClr val="tx1"/>
-              </a:fontRef>
-            </p:style>
-          </p:cxnSp>
-          <p:sp>
-            <p:nvSpPr>
-              <p:cNvPr id="35" name="TextBox 34">
-                <a:extLst>
-                  <a:ext uri="{FF2B5EF4-FFF2-40B4-BE49-F238E27FC236}">
-                    <a16:creationId xmlns:a16="http://schemas.microsoft.com/office/drawing/2014/main" id="{9B2EF17C-6AC2-4046-913E-AD74CFF6FF2A}"/>
-                  </a:ext>
-                </a:extLst>
-              </p:cNvPr>
-              <p:cNvSpPr txBox="1"/>
-              <p:nvPr/>
-            </p:nvSpPr>
-            <p:spPr>
-              <a:xfrm>
-                <a:off x="7606948" y="3066437"/>
-                <a:ext cx="1428596" cy="369332"/>
-              </a:xfrm>
-              <a:prstGeom prst="rect">
-                <a:avLst/>
-              </a:prstGeom>
-              <a:grpFill/>
-            </p:spPr>
-            <p:txBody>
-              <a:bodyPr wrap="none" rtlCol="0">
-                <a:spAutoFit/>
-              </a:bodyPr>
-              <a:lstStyle/>
-              <a:p>
-                <a:r>
-                  <a:rPr lang="en-US" dirty="0" err="1">
-                    <a:latin typeface="Arial" panose="020B0604020202020204" pitchFamily="34" charset="0"/>
-                    <a:cs typeface="Arial" panose="020B0604020202020204" pitchFamily="34" charset="0"/>
-                  </a:rPr>
-                  <a:t>Powermeter</a:t>
-                </a:r>
-                <a:endParaRPr lang="en-US" dirty="0">
+          </p:spPr>
+          <p:txBody>
+            <a:bodyPr wrap="square" lIns="0" tIns="0" rIns="0" bIns="0" rtlCol="0">
+              <a:spAutoFit/>
+            </a:bodyPr>
+            <a:lstStyle/>
+            <a:p>
+              <a:pPr algn="ctr"/>
+              <a:r>
+                <a:rPr lang="en-US" dirty="0" err="1">
                   <a:latin typeface="Arial" panose="020B0604020202020204" pitchFamily="34" charset="0"/>
                   <a:cs typeface="Arial" panose="020B0604020202020204" pitchFamily="34" charset="0"/>
-                </a:endParaRPr>
-              </a:p>
-            </p:txBody>
-          </p:sp>
-          <p:cxnSp>
-            <p:nvCxnSpPr>
-              <p:cNvPr id="36" name="Straight Arrow Connector 35">
-                <a:extLst>
-                  <a:ext uri="{FF2B5EF4-FFF2-40B4-BE49-F238E27FC236}">
-                    <a16:creationId xmlns:a16="http://schemas.microsoft.com/office/drawing/2014/main" id="{8749F783-6602-4941-B723-08B1E100693D}"/>
-                  </a:ext>
-                </a:extLst>
-              </p:cNvPr>
-              <p:cNvCxnSpPr>
-                <a:cxnSpLocks/>
-              </p:cNvCxnSpPr>
-              <p:nvPr/>
-            </p:nvCxnSpPr>
-            <p:spPr>
-              <a:xfrm flipH="1">
-                <a:off x="6780810" y="3251103"/>
-                <a:ext cx="826139" cy="630288"/>
-              </a:xfrm>
-              <a:prstGeom prst="straightConnector1">
-                <a:avLst/>
-              </a:prstGeom>
-              <a:grpFill/>
-              <a:ln>
-                <a:tailEnd type="triangle"/>
-              </a:ln>
-            </p:spPr>
-            <p:style>
-              <a:lnRef idx="1">
-                <a:schemeClr val="dk1"/>
-              </a:lnRef>
-              <a:fillRef idx="0">
-                <a:schemeClr val="dk1"/>
-              </a:fillRef>
-              <a:effectRef idx="0">
-                <a:schemeClr val="dk1"/>
-              </a:effectRef>
-              <a:fontRef idx="minor">
+                </a:rPr>
+                <a:t>lb</a:t>
+              </a:r>
+              <a:endParaRPr lang="en-US" sz="1600" dirty="0">
+                <a:latin typeface="Arial" panose="020B0604020202020204" pitchFamily="34" charset="0"/>
+                <a:cs typeface="Arial" panose="020B0604020202020204" pitchFamily="34" charset="0"/>
+              </a:endParaRPr>
+            </a:p>
+          </p:txBody>
+        </p:sp>
+        <p:sp>
+          <p:nvSpPr>
+            <p:cNvPr id="52" name="Oval 51">
+              <a:extLst>
+                <a:ext uri="{FF2B5EF4-FFF2-40B4-BE49-F238E27FC236}">
+                  <a16:creationId xmlns:a16="http://schemas.microsoft.com/office/drawing/2014/main" id="{A7850DC4-63F5-E743-AED9-7186569FAE60}"/>
+                </a:ext>
+              </a:extLst>
+            </p:cNvPr>
+            <p:cNvSpPr/>
+            <p:nvPr/>
+          </p:nvSpPr>
+          <p:spPr>
+            <a:xfrm>
+              <a:off x="7080560" y="4570376"/>
+              <a:ext cx="27432" cy="27432"/>
+            </a:xfrm>
+            <a:prstGeom prst="ellipse">
+              <a:avLst/>
+            </a:prstGeom>
+            <a:solidFill>
+              <a:schemeClr val="tx1"/>
+            </a:solidFill>
+            <a:ln>
+              <a:solidFill>
                 <a:schemeClr val="tx1"/>
-              </a:fontRef>
-            </p:style>
-          </p:cxnSp>
-          <p:sp>
-            <p:nvSpPr>
-              <p:cNvPr id="39" name="TextBox 38">
-                <a:extLst>
-                  <a:ext uri="{FF2B5EF4-FFF2-40B4-BE49-F238E27FC236}">
-                    <a16:creationId xmlns:a16="http://schemas.microsoft.com/office/drawing/2014/main" id="{6E77C7CF-18CF-284B-9BC7-20F4BD5D5761}"/>
-                  </a:ext>
-                </a:extLst>
-              </p:cNvPr>
-              <p:cNvSpPr txBox="1"/>
-              <p:nvPr/>
-            </p:nvSpPr>
-            <p:spPr>
-              <a:xfrm>
-                <a:off x="7610501" y="2461188"/>
-                <a:ext cx="607859" cy="369332"/>
-              </a:xfrm>
-              <a:prstGeom prst="rect">
-                <a:avLst/>
-              </a:prstGeom>
-              <a:grpFill/>
-            </p:spPr>
-            <p:txBody>
-              <a:bodyPr wrap="none" rtlCol="0">
-                <a:spAutoFit/>
-              </a:bodyPr>
-              <a:lstStyle/>
-              <a:p>
-                <a:r>
-                  <a:rPr lang="en-US" dirty="0">
-                    <a:latin typeface="Arial" panose="020B0604020202020204" pitchFamily="34" charset="0"/>
-                    <a:cs typeface="Arial" panose="020B0604020202020204" pitchFamily="34" charset="0"/>
-                  </a:rPr>
-                  <a:t>IMU</a:t>
-                </a:r>
-              </a:p>
-            </p:txBody>
-          </p:sp>
-          <p:cxnSp>
-            <p:nvCxnSpPr>
-              <p:cNvPr id="40" name="Straight Arrow Connector 39">
-                <a:extLst>
-                  <a:ext uri="{FF2B5EF4-FFF2-40B4-BE49-F238E27FC236}">
-                    <a16:creationId xmlns:a16="http://schemas.microsoft.com/office/drawing/2014/main" id="{5B02735B-6E44-4642-8D64-94B5B810CA9A}"/>
-                  </a:ext>
-                </a:extLst>
-              </p:cNvPr>
-              <p:cNvCxnSpPr>
-                <a:cxnSpLocks/>
-                <a:stCxn id="39" idx="1"/>
-              </p:cNvCxnSpPr>
-              <p:nvPr/>
-            </p:nvCxnSpPr>
-            <p:spPr>
-              <a:xfrm flipH="1">
-                <a:off x="6681851" y="2645854"/>
-                <a:ext cx="928650" cy="783146"/>
-              </a:xfrm>
-              <a:prstGeom prst="straightConnector1">
-                <a:avLst/>
-              </a:prstGeom>
-              <a:grpFill/>
-              <a:ln>
-                <a:tailEnd type="triangle"/>
-              </a:ln>
-            </p:spPr>
-            <p:style>
-              <a:lnRef idx="1">
-                <a:schemeClr val="dk1"/>
-              </a:lnRef>
-              <a:fillRef idx="0">
-                <a:schemeClr val="dk1"/>
-              </a:fillRef>
-              <a:effectRef idx="0">
-                <a:schemeClr val="dk1"/>
-              </a:effectRef>
-              <a:fontRef idx="minor">
-                <a:schemeClr val="tx1"/>
-              </a:fontRef>
-            </p:style>
-          </p:cxnSp>
-          <p:sp>
-            <p:nvSpPr>
-              <p:cNvPr id="43" name="TextBox 42">
-                <a:extLst>
-                  <a:ext uri="{FF2B5EF4-FFF2-40B4-BE49-F238E27FC236}">
-                    <a16:creationId xmlns:a16="http://schemas.microsoft.com/office/drawing/2014/main" id="{C00C2080-FDCC-E440-9975-060B321398DD}"/>
-                  </a:ext>
-                </a:extLst>
-              </p:cNvPr>
-              <p:cNvSpPr txBox="1"/>
-              <p:nvPr/>
-            </p:nvSpPr>
-            <p:spPr>
-              <a:xfrm>
-                <a:off x="8290575" y="3787678"/>
-                <a:ext cx="1274708" cy="369332"/>
-              </a:xfrm>
-              <a:prstGeom prst="rect">
-                <a:avLst/>
-              </a:prstGeom>
-              <a:grpFill/>
-            </p:spPr>
-            <p:txBody>
-              <a:bodyPr wrap="none" rtlCol="0">
-                <a:spAutoFit/>
-              </a:bodyPr>
-              <a:lstStyle/>
-              <a:p>
-                <a:r>
-                  <a:rPr lang="en-US" dirty="0">
-                    <a:latin typeface="Arial" panose="020B0604020202020204" pitchFamily="34" charset="0"/>
-                    <a:cs typeface="Arial" panose="020B0604020202020204" pitchFamily="34" charset="0"/>
-                  </a:rPr>
-                  <a:t>Front pivot</a:t>
-                </a:r>
-              </a:p>
-            </p:txBody>
-          </p:sp>
-          <p:cxnSp>
-            <p:nvCxnSpPr>
-              <p:cNvPr id="44" name="Straight Arrow Connector 43">
-                <a:extLst>
-                  <a:ext uri="{FF2B5EF4-FFF2-40B4-BE49-F238E27FC236}">
-                    <a16:creationId xmlns:a16="http://schemas.microsoft.com/office/drawing/2014/main" id="{928E3A06-B6C6-E345-86FC-8855662CC835}"/>
-                  </a:ext>
-                </a:extLst>
-              </p:cNvPr>
-              <p:cNvCxnSpPr>
-                <a:cxnSpLocks/>
-                <a:stCxn id="43" idx="1"/>
-              </p:cNvCxnSpPr>
-              <p:nvPr/>
-            </p:nvCxnSpPr>
-            <p:spPr>
-              <a:xfrm flipH="1">
-                <a:off x="7184571" y="3972344"/>
-                <a:ext cx="1106004" cy="589116"/>
-              </a:xfrm>
-              <a:prstGeom prst="straightConnector1">
-                <a:avLst/>
-              </a:prstGeom>
-              <a:grpFill/>
-              <a:ln>
-                <a:tailEnd type="triangle"/>
-              </a:ln>
-            </p:spPr>
-            <p:style>
-              <a:lnRef idx="1">
-                <a:schemeClr val="dk1"/>
-              </a:lnRef>
-              <a:fillRef idx="0">
-                <a:schemeClr val="dk1"/>
-              </a:fillRef>
-              <a:effectRef idx="0">
-                <a:schemeClr val="dk1"/>
-              </a:effectRef>
-              <a:fontRef idx="minor">
-                <a:schemeClr val="tx1"/>
-              </a:fontRef>
-            </p:style>
-          </p:cxnSp>
-          <p:sp>
-            <p:nvSpPr>
-              <p:cNvPr id="49" name="TextBox 48">
-                <a:extLst>
-                  <a:ext uri="{FF2B5EF4-FFF2-40B4-BE49-F238E27FC236}">
-                    <a16:creationId xmlns:a16="http://schemas.microsoft.com/office/drawing/2014/main" id="{6D081479-574B-BB4A-AFD0-3B0DB51117F5}"/>
-                  </a:ext>
-                </a:extLst>
-              </p:cNvPr>
-              <p:cNvSpPr txBox="1"/>
-              <p:nvPr/>
-            </p:nvSpPr>
-            <p:spPr>
-              <a:xfrm>
-                <a:off x="8358398" y="4463098"/>
-                <a:ext cx="1890261" cy="646331"/>
-              </a:xfrm>
-              <a:prstGeom prst="rect">
-                <a:avLst/>
-              </a:prstGeom>
-              <a:grpFill/>
-            </p:spPr>
-            <p:txBody>
-              <a:bodyPr wrap="none" rtlCol="0">
-                <a:spAutoFit/>
-              </a:bodyPr>
-              <a:lstStyle/>
-              <a:p>
-                <a:r>
-                  <a:rPr lang="en-US" dirty="0">
-                    <a:latin typeface="Arial" panose="020B0604020202020204" pitchFamily="34" charset="0"/>
-                    <a:cs typeface="Arial" panose="020B0604020202020204" pitchFamily="34" charset="0"/>
-                  </a:rPr>
-                  <a:t>Original </a:t>
-                </a:r>
-              </a:p>
-              <a:p>
-                <a:r>
-                  <a:rPr lang="en-US" dirty="0">
-                    <a:latin typeface="Arial" panose="020B0604020202020204" pitchFamily="34" charset="0"/>
-                    <a:cs typeface="Arial" panose="020B0604020202020204" pitchFamily="34" charset="0"/>
-                  </a:rPr>
-                  <a:t>ergometer frame</a:t>
-                </a:r>
-              </a:p>
-            </p:txBody>
-          </p:sp>
-          <p:cxnSp>
-            <p:nvCxnSpPr>
-              <p:cNvPr id="50" name="Straight Arrow Connector 49">
-                <a:extLst>
-                  <a:ext uri="{FF2B5EF4-FFF2-40B4-BE49-F238E27FC236}">
-                    <a16:creationId xmlns:a16="http://schemas.microsoft.com/office/drawing/2014/main" id="{CEA623C9-4F19-D844-806B-09D465E71E01}"/>
-                  </a:ext>
-                </a:extLst>
-              </p:cNvPr>
-              <p:cNvCxnSpPr>
-                <a:cxnSpLocks/>
-                <a:stCxn id="49" idx="1"/>
-              </p:cNvCxnSpPr>
-              <p:nvPr/>
-            </p:nvCxnSpPr>
-            <p:spPr>
-              <a:xfrm flipH="1">
-                <a:off x="6495803" y="4786264"/>
-                <a:ext cx="1862595" cy="629253"/>
-              </a:xfrm>
-              <a:prstGeom prst="straightConnector1">
-                <a:avLst/>
-              </a:prstGeom>
-              <a:grpFill/>
-              <a:ln>
-                <a:tailEnd type="triangle"/>
-              </a:ln>
-            </p:spPr>
-            <p:style>
-              <a:lnRef idx="1">
-                <a:schemeClr val="dk1"/>
-              </a:lnRef>
-              <a:fillRef idx="0">
-                <a:schemeClr val="dk1"/>
-              </a:fillRef>
-              <a:effectRef idx="0">
-                <a:schemeClr val="dk1"/>
-              </a:effectRef>
-              <a:fontRef idx="minor">
-                <a:schemeClr val="tx1"/>
-              </a:fontRef>
-            </p:style>
-          </p:cxnSp>
-          <p:cxnSp>
-            <p:nvCxnSpPr>
-              <p:cNvPr id="53" name="Straight Arrow Connector 52">
-                <a:extLst>
-                  <a:ext uri="{FF2B5EF4-FFF2-40B4-BE49-F238E27FC236}">
-                    <a16:creationId xmlns:a16="http://schemas.microsoft.com/office/drawing/2014/main" id="{898566B5-7BE5-AD48-94C4-29660FA1E5BD}"/>
-                  </a:ext>
-                </a:extLst>
-              </p:cNvPr>
-              <p:cNvCxnSpPr>
-                <a:cxnSpLocks/>
-                <a:stCxn id="49" idx="1"/>
-              </p:cNvCxnSpPr>
-              <p:nvPr/>
-            </p:nvCxnSpPr>
-            <p:spPr>
-              <a:xfrm flipH="1">
-                <a:off x="6187044" y="4786264"/>
-                <a:ext cx="2171354" cy="258655"/>
-              </a:xfrm>
-              <a:prstGeom prst="straightConnector1">
-                <a:avLst/>
-              </a:prstGeom>
-              <a:grpFill/>
-              <a:ln>
-                <a:tailEnd type="triangle"/>
-              </a:ln>
-            </p:spPr>
-            <p:style>
-              <a:lnRef idx="1">
-                <a:schemeClr val="dk1"/>
-              </a:lnRef>
-              <a:fillRef idx="0">
-                <a:schemeClr val="dk1"/>
-              </a:fillRef>
-              <a:effectRef idx="0">
-                <a:schemeClr val="dk1"/>
-              </a:effectRef>
-              <a:fontRef idx="minor">
-                <a:schemeClr val="tx1"/>
-              </a:fontRef>
-            </p:style>
-          </p:cxnSp>
-          <p:sp>
-            <p:nvSpPr>
-              <p:cNvPr id="56" name="TextBox 55">
-                <a:extLst>
-                  <a:ext uri="{FF2B5EF4-FFF2-40B4-BE49-F238E27FC236}">
-                    <a16:creationId xmlns:a16="http://schemas.microsoft.com/office/drawing/2014/main" id="{E3D5BA65-B3FD-6D46-8383-D66733F29A42}"/>
-                  </a:ext>
-                </a:extLst>
-              </p:cNvPr>
-              <p:cNvSpPr txBox="1"/>
-              <p:nvPr/>
-            </p:nvSpPr>
-            <p:spPr>
-              <a:xfrm>
-                <a:off x="8428846" y="5403755"/>
-                <a:ext cx="1980029" cy="646331"/>
-              </a:xfrm>
-              <a:prstGeom prst="rect">
-                <a:avLst/>
-              </a:prstGeom>
-              <a:grpFill/>
-            </p:spPr>
-            <p:txBody>
-              <a:bodyPr wrap="none" rtlCol="0">
-                <a:spAutoFit/>
-              </a:bodyPr>
-              <a:lstStyle/>
-              <a:p>
-                <a:r>
-                  <a:rPr lang="en-US" dirty="0">
-                    <a:latin typeface="Arial" panose="020B0604020202020204" pitchFamily="34" charset="0"/>
-                    <a:cs typeface="Arial" panose="020B0604020202020204" pitchFamily="34" charset="0"/>
-                  </a:rPr>
-                  <a:t>Additional </a:t>
-                </a:r>
-              </a:p>
-              <a:p>
-                <a:r>
-                  <a:rPr lang="en-US" dirty="0">
-                    <a:latin typeface="Arial" panose="020B0604020202020204" pitchFamily="34" charset="0"/>
-                    <a:cs typeface="Arial" panose="020B0604020202020204" pitchFamily="34" charset="0"/>
-                  </a:rPr>
-                  <a:t>80/20 base frame</a:t>
-                </a:r>
-              </a:p>
-            </p:txBody>
-          </p:sp>
-          <p:cxnSp>
-            <p:nvCxnSpPr>
-              <p:cNvPr id="57" name="Straight Arrow Connector 56">
-                <a:extLst>
-                  <a:ext uri="{FF2B5EF4-FFF2-40B4-BE49-F238E27FC236}">
-                    <a16:creationId xmlns:a16="http://schemas.microsoft.com/office/drawing/2014/main" id="{4FBD0E35-07E2-6043-9B11-4A2B52317A70}"/>
-                  </a:ext>
-                </a:extLst>
-              </p:cNvPr>
-              <p:cNvCxnSpPr>
-                <a:cxnSpLocks/>
-                <a:stCxn id="56" idx="1"/>
-              </p:cNvCxnSpPr>
-              <p:nvPr/>
-            </p:nvCxnSpPr>
-            <p:spPr>
-              <a:xfrm flipH="1">
-                <a:off x="6495803" y="5726921"/>
-                <a:ext cx="1933043" cy="81310"/>
-              </a:xfrm>
-              <a:prstGeom prst="straightConnector1">
-                <a:avLst/>
-              </a:prstGeom>
-              <a:grpFill/>
-              <a:ln>
-                <a:tailEnd type="triangle"/>
-              </a:ln>
-            </p:spPr>
-            <p:style>
-              <a:lnRef idx="1">
-                <a:schemeClr val="dk1"/>
-              </a:lnRef>
-              <a:fillRef idx="0">
-                <a:schemeClr val="dk1"/>
-              </a:fillRef>
-              <a:effectRef idx="0">
-                <a:schemeClr val="dk1"/>
-              </a:effectRef>
-              <a:fontRef idx="minor">
-                <a:schemeClr val="tx1"/>
-              </a:fontRef>
-            </p:style>
-          </p:cxnSp>
-          <p:cxnSp>
-            <p:nvCxnSpPr>
-              <p:cNvPr id="60" name="Straight Arrow Connector 59">
-                <a:extLst>
-                  <a:ext uri="{FF2B5EF4-FFF2-40B4-BE49-F238E27FC236}">
-                    <a16:creationId xmlns:a16="http://schemas.microsoft.com/office/drawing/2014/main" id="{5BE4F9AF-1FE5-2046-A90C-F883C99E625F}"/>
-                  </a:ext>
-                </a:extLst>
-              </p:cNvPr>
-              <p:cNvCxnSpPr>
-                <a:cxnSpLocks/>
-                <a:stCxn id="56" idx="1"/>
-              </p:cNvCxnSpPr>
-              <p:nvPr/>
-            </p:nvCxnSpPr>
-            <p:spPr>
-              <a:xfrm flipH="1">
-                <a:off x="7272721" y="5726921"/>
-                <a:ext cx="1156125" cy="617491"/>
-              </a:xfrm>
-              <a:prstGeom prst="straightConnector1">
-                <a:avLst/>
-              </a:prstGeom>
-              <a:grpFill/>
-              <a:ln>
-                <a:tailEnd type="triangle"/>
-              </a:ln>
-            </p:spPr>
-            <p:style>
-              <a:lnRef idx="1">
-                <a:schemeClr val="dk1"/>
-              </a:lnRef>
-              <a:fillRef idx="0">
-                <a:schemeClr val="dk1"/>
-              </a:fillRef>
-              <a:effectRef idx="0">
-                <a:schemeClr val="dk1"/>
-              </a:effectRef>
-              <a:fontRef idx="minor">
-                <a:schemeClr val="tx1"/>
-              </a:fontRef>
-            </p:style>
-          </p:cxnSp>
-          <p:cxnSp>
-            <p:nvCxnSpPr>
-              <p:cNvPr id="63" name="Straight Arrow Connector 62">
-                <a:extLst>
-                  <a:ext uri="{FF2B5EF4-FFF2-40B4-BE49-F238E27FC236}">
-                    <a16:creationId xmlns:a16="http://schemas.microsoft.com/office/drawing/2014/main" id="{B3DC8F51-C9A3-F844-A80E-A644F53C6167}"/>
-                  </a:ext>
-                </a:extLst>
-              </p:cNvPr>
-              <p:cNvCxnSpPr>
-                <a:cxnSpLocks/>
-                <a:stCxn id="56" idx="1"/>
-              </p:cNvCxnSpPr>
-              <p:nvPr/>
-            </p:nvCxnSpPr>
-            <p:spPr>
-              <a:xfrm flipH="1" flipV="1">
-                <a:off x="8087096" y="5269723"/>
-                <a:ext cx="341750" cy="457198"/>
-              </a:xfrm>
-              <a:prstGeom prst="straightConnector1">
-                <a:avLst/>
-              </a:prstGeom>
-              <a:grpFill/>
-              <a:ln>
-                <a:tailEnd type="triangle"/>
-              </a:ln>
-            </p:spPr>
-            <p:style>
-              <a:lnRef idx="1">
-                <a:schemeClr val="dk1"/>
-              </a:lnRef>
-              <a:fillRef idx="0">
-                <a:schemeClr val="dk1"/>
-              </a:fillRef>
-              <a:effectRef idx="0">
-                <a:schemeClr val="dk1"/>
-              </a:effectRef>
-              <a:fontRef idx="minor">
-                <a:schemeClr val="tx1"/>
-              </a:fontRef>
-            </p:style>
-          </p:cxnSp>
-        </p:grpSp>
+              </a:solidFill>
+            </a:ln>
+          </p:spPr>
+          <p:style>
+            <a:lnRef idx="2">
+              <a:schemeClr val="dk1">
+                <a:shade val="50000"/>
+              </a:schemeClr>
+            </a:lnRef>
+            <a:fillRef idx="1">
+              <a:schemeClr val="dk1"/>
+            </a:fillRef>
+            <a:effectRef idx="0">
+              <a:schemeClr val="dk1"/>
+            </a:effectRef>
+            <a:fontRef idx="minor">
+              <a:schemeClr val="lt1"/>
+            </a:fontRef>
+          </p:style>
+          <p:txBody>
+            <a:bodyPr rtlCol="0" anchor="ctr"/>
+            <a:lstStyle/>
+            <a:p>
+              <a:pPr algn="ctr"/>
+              <a:endParaRPr lang="en-US"/>
+            </a:p>
+          </p:txBody>
+        </p:sp>
       </p:grpSp>
     </p:spTree>
     <p:extLst>

</xml_diff>

<commit_message>
add goodness of fit analysis
</commit_message>
<xml_diff>
--- a/docs/fig_setup_labelled.pptx
+++ b/docs/fig_setup_labelled.pptx
@@ -259,7 +259,7 @@
           <a:p>
             <a:fld id="{7AB5CAF8-9327-F54B-8A6F-A50D5568BC9E}" type="datetimeFigureOut">
               <a:rPr lang="en-US" smtClean="0"/>
-              <a:t>11/25/20</a:t>
+              <a:t>12/1/20</a:t>
             </a:fld>
             <a:endParaRPr lang="en-US"/>
           </a:p>
@@ -457,7 +457,7 @@
           <a:p>
             <a:fld id="{7AB5CAF8-9327-F54B-8A6F-A50D5568BC9E}" type="datetimeFigureOut">
               <a:rPr lang="en-US" smtClean="0"/>
-              <a:t>11/25/20</a:t>
+              <a:t>12/1/20</a:t>
             </a:fld>
             <a:endParaRPr lang="en-US"/>
           </a:p>
@@ -665,7 +665,7 @@
           <a:p>
             <a:fld id="{7AB5CAF8-9327-F54B-8A6F-A50D5568BC9E}" type="datetimeFigureOut">
               <a:rPr lang="en-US" smtClean="0"/>
-              <a:t>11/25/20</a:t>
+              <a:t>12/1/20</a:t>
             </a:fld>
             <a:endParaRPr lang="en-US"/>
           </a:p>
@@ -863,7 +863,7 @@
           <a:p>
             <a:fld id="{7AB5CAF8-9327-F54B-8A6F-A50D5568BC9E}" type="datetimeFigureOut">
               <a:rPr lang="en-US" smtClean="0"/>
-              <a:t>11/25/20</a:t>
+              <a:t>12/1/20</a:t>
             </a:fld>
             <a:endParaRPr lang="en-US"/>
           </a:p>
@@ -1138,7 +1138,7 @@
           <a:p>
             <a:fld id="{7AB5CAF8-9327-F54B-8A6F-A50D5568BC9E}" type="datetimeFigureOut">
               <a:rPr lang="en-US" smtClean="0"/>
-              <a:t>11/25/20</a:t>
+              <a:t>12/1/20</a:t>
             </a:fld>
             <a:endParaRPr lang="en-US"/>
           </a:p>
@@ -1403,7 +1403,7 @@
           <a:p>
             <a:fld id="{7AB5CAF8-9327-F54B-8A6F-A50D5568BC9E}" type="datetimeFigureOut">
               <a:rPr lang="en-US" smtClean="0"/>
-              <a:t>11/25/20</a:t>
+              <a:t>12/1/20</a:t>
             </a:fld>
             <a:endParaRPr lang="en-US"/>
           </a:p>
@@ -1815,7 +1815,7 @@
           <a:p>
             <a:fld id="{7AB5CAF8-9327-F54B-8A6F-A50D5568BC9E}" type="datetimeFigureOut">
               <a:rPr lang="en-US" smtClean="0"/>
-              <a:t>11/25/20</a:t>
+              <a:t>12/1/20</a:t>
             </a:fld>
             <a:endParaRPr lang="en-US"/>
           </a:p>
@@ -1956,7 +1956,7 @@
           <a:p>
             <a:fld id="{7AB5CAF8-9327-F54B-8A6F-A50D5568BC9E}" type="datetimeFigureOut">
               <a:rPr lang="en-US" smtClean="0"/>
-              <a:t>11/25/20</a:t>
+              <a:t>12/1/20</a:t>
             </a:fld>
             <a:endParaRPr lang="en-US"/>
           </a:p>
@@ -2069,7 +2069,7 @@
           <a:p>
             <a:fld id="{7AB5CAF8-9327-F54B-8A6F-A50D5568BC9E}" type="datetimeFigureOut">
               <a:rPr lang="en-US" smtClean="0"/>
-              <a:t>11/25/20</a:t>
+              <a:t>12/1/20</a:t>
             </a:fld>
             <a:endParaRPr lang="en-US"/>
           </a:p>
@@ -2380,7 +2380,7 @@
           <a:p>
             <a:fld id="{7AB5CAF8-9327-F54B-8A6F-A50D5568BC9E}" type="datetimeFigureOut">
               <a:rPr lang="en-US" smtClean="0"/>
-              <a:t>11/25/20</a:t>
+              <a:t>12/1/20</a:t>
             </a:fld>
             <a:endParaRPr lang="en-US"/>
           </a:p>
@@ -2668,7 +2668,7 @@
           <a:p>
             <a:fld id="{7AB5CAF8-9327-F54B-8A6F-A50D5568BC9E}" type="datetimeFigureOut">
               <a:rPr lang="en-US" smtClean="0"/>
-              <a:t>11/25/20</a:t>
+              <a:t>12/1/20</a:t>
             </a:fld>
             <a:endParaRPr lang="en-US"/>
           </a:p>
@@ -2909,7 +2909,7 @@
           <a:p>
             <a:fld id="{7AB5CAF8-9327-F54B-8A6F-A50D5568BC9E}" type="datetimeFigureOut">
               <a:rPr lang="en-US" smtClean="0"/>
-              <a:t>11/25/20</a:t>
+              <a:t>12/1/20</a:t>
             </a:fld>
             <a:endParaRPr lang="en-US"/>
           </a:p>
@@ -3336,10 +3336,10 @@
       </p:grpSpPr>
       <p:grpSp>
         <p:nvGrpSpPr>
-          <p:cNvPr id="37" name="Group 36">
-            <a:extLst>
-              <a:ext uri="{FF2B5EF4-FFF2-40B4-BE49-F238E27FC236}">
-                <a16:creationId xmlns:a16="http://schemas.microsoft.com/office/drawing/2014/main" id="{49918DF2-B958-8740-9D3C-B8FFB9FEF6E7}"/>
+          <p:cNvPr id="74" name="Group 73">
+            <a:extLst>
+              <a:ext uri="{FF2B5EF4-FFF2-40B4-BE49-F238E27FC236}">
+                <a16:creationId xmlns:a16="http://schemas.microsoft.com/office/drawing/2014/main" id="{61710B90-1675-BE4B-8A50-AE0C1CC603B8}"/>
               </a:ext>
             </a:extLst>
           </p:cNvPr>
@@ -3348,18 +3348,18 @@
         </p:nvGrpSpPr>
         <p:grpSpPr>
           <a:xfrm>
-            <a:off x="1744133" y="0"/>
+            <a:off x="1744133" y="158750"/>
             <a:ext cx="8703733" cy="6858001"/>
-            <a:chOff x="1744133" y="0"/>
+            <a:chOff x="1744133" y="158750"/>
             <a:chExt cx="8703733" cy="6858001"/>
           </a:xfrm>
         </p:grpSpPr>
         <p:grpSp>
           <p:nvGrpSpPr>
-            <p:cNvPr id="68" name="Group 67">
+            <p:cNvPr id="56" name="Group 55">
               <a:extLst>
                 <a:ext uri="{FF2B5EF4-FFF2-40B4-BE49-F238E27FC236}">
-                  <a16:creationId xmlns:a16="http://schemas.microsoft.com/office/drawing/2014/main" id="{AE5BC9BF-F9B2-BC4A-90AB-181A17970732}"/>
+                  <a16:creationId xmlns:a16="http://schemas.microsoft.com/office/drawing/2014/main" id="{216EB7A8-692C-D14C-BAD4-1D012D03BF31}"/>
                 </a:ext>
               </a:extLst>
             </p:cNvPr>
@@ -3368,65 +3368,18 @@
           </p:nvGrpSpPr>
           <p:grpSpPr>
             <a:xfrm>
-              <a:off x="1744133" y="0"/>
+              <a:off x="1744133" y="158750"/>
               <a:ext cx="8703733" cy="6858001"/>
-              <a:chOff x="1811867" y="-1"/>
+              <a:chOff x="1744133" y="158750"/>
               <a:chExt cx="8703733" cy="6858001"/>
             </a:xfrm>
           </p:grpSpPr>
-          <p:sp>
-            <p:nvSpPr>
-              <p:cNvPr id="67" name="Rectangle 66">
+          <p:grpSp>
+            <p:nvGrpSpPr>
+              <p:cNvPr id="7" name="Group 6">
                 <a:extLst>
                   <a:ext uri="{FF2B5EF4-FFF2-40B4-BE49-F238E27FC236}">
-                    <a16:creationId xmlns:a16="http://schemas.microsoft.com/office/drawing/2014/main" id="{6622BC2C-8D37-4E49-BF65-54BF21E65C1E}"/>
-                  </a:ext>
-                </a:extLst>
-              </p:cNvPr>
-              <p:cNvSpPr/>
-              <p:nvPr/>
-            </p:nvSpPr>
-            <p:spPr>
-              <a:xfrm>
-                <a:off x="1811867" y="-1"/>
-                <a:ext cx="8703733" cy="6857999"/>
-              </a:xfrm>
-              <a:prstGeom prst="rect">
-                <a:avLst/>
-              </a:prstGeom>
-              <a:ln>
-                <a:noFill/>
-              </a:ln>
-            </p:spPr>
-            <p:style>
-              <a:lnRef idx="2">
-                <a:schemeClr val="dk1"/>
-              </a:lnRef>
-              <a:fillRef idx="1">
-                <a:schemeClr val="lt1"/>
-              </a:fillRef>
-              <a:effectRef idx="0">
-                <a:schemeClr val="dk1"/>
-              </a:effectRef>
-              <a:fontRef idx="minor">
-                <a:schemeClr val="dk1"/>
-              </a:fontRef>
-            </p:style>
-            <p:txBody>
-              <a:bodyPr rtlCol="0" anchor="ctr"/>
-              <a:lstStyle/>
-              <a:p>
-                <a:pPr algn="ctr"/>
-                <a:endParaRPr lang="en-US" dirty="0"/>
-              </a:p>
-            </p:txBody>
-          </p:sp>
-          <p:grpSp>
-            <p:nvGrpSpPr>
-              <p:cNvPr id="66" name="Group 65">
-                <a:extLst>
-                  <a:ext uri="{FF2B5EF4-FFF2-40B4-BE49-F238E27FC236}">
-                    <a16:creationId xmlns:a16="http://schemas.microsoft.com/office/drawing/2014/main" id="{6F389862-C04F-5A40-9753-0137FFF811B4}"/>
+                    <a16:creationId xmlns:a16="http://schemas.microsoft.com/office/drawing/2014/main" id="{33E61353-A506-FC43-A57F-C64BEF826D72}"/>
                   </a:ext>
                 </a:extLst>
               </p:cNvPr>
@@ -3435,52 +3388,1400 @@
             </p:nvGrpSpPr>
             <p:grpSpPr>
               <a:xfrm>
-                <a:off x="2166440" y="0"/>
-                <a:ext cx="7647268" cy="6858000"/>
-                <a:chOff x="2166440" y="0"/>
-                <a:chExt cx="7647268" cy="6858000"/>
+                <a:off x="1744133" y="158750"/>
+                <a:ext cx="8703733" cy="6858001"/>
+                <a:chOff x="1744133" y="0"/>
+                <a:chExt cx="8703733" cy="6858001"/>
               </a:xfrm>
-              <a:solidFill>
-                <a:schemeClr val="bg1"/>
-              </a:solidFill>
             </p:grpSpPr>
-            <p:pic>
-              <p:nvPicPr>
-                <p:cNvPr id="11" name="Picture 10" descr="Diagram&#10;&#10;Description automatically generated">
+            <p:grpSp>
+              <p:nvGrpSpPr>
+                <p:cNvPr id="37" name="Group 36">
                   <a:extLst>
                     <a:ext uri="{FF2B5EF4-FFF2-40B4-BE49-F238E27FC236}">
-                      <a16:creationId xmlns:a16="http://schemas.microsoft.com/office/drawing/2014/main" id="{B9F32238-2041-CF44-9D44-70D88D0E6B93}"/>
+                      <a16:creationId xmlns:a16="http://schemas.microsoft.com/office/drawing/2014/main" id="{49918DF2-B958-8740-9D3C-B8FFB9FEF6E7}"/>
                     </a:ext>
                   </a:extLst>
                 </p:cNvPr>
-                <p:cNvPicPr>
-                  <a:picLocks noChangeAspect="1"/>
-                </p:cNvPicPr>
+                <p:cNvGrpSpPr/>
                 <p:nvPr/>
-              </p:nvPicPr>
-              <p:blipFill>
-                <a:blip r:embed="rId2"/>
-                <a:stretch>
-                  <a:fillRect/>
-                </a:stretch>
-              </p:blipFill>
+              </p:nvGrpSpPr>
+              <p:grpSpPr>
+                <a:xfrm>
+                  <a:off x="1744133" y="0"/>
+                  <a:ext cx="8703733" cy="6858001"/>
+                  <a:chOff x="1744133" y="0"/>
+                  <a:chExt cx="8703733" cy="6858001"/>
+                </a:xfrm>
+              </p:grpSpPr>
+              <p:grpSp>
+                <p:nvGrpSpPr>
+                  <p:cNvPr id="68" name="Group 67">
+                    <a:extLst>
+                      <a:ext uri="{FF2B5EF4-FFF2-40B4-BE49-F238E27FC236}">
+                        <a16:creationId xmlns:a16="http://schemas.microsoft.com/office/drawing/2014/main" id="{AE5BC9BF-F9B2-BC4A-90AB-181A17970732}"/>
+                      </a:ext>
+                    </a:extLst>
+                  </p:cNvPr>
+                  <p:cNvGrpSpPr/>
+                  <p:nvPr/>
+                </p:nvGrpSpPr>
+                <p:grpSpPr>
+                  <a:xfrm>
+                    <a:off x="1744133" y="0"/>
+                    <a:ext cx="8703733" cy="6858001"/>
+                    <a:chOff x="1811867" y="-1"/>
+                    <a:chExt cx="8703733" cy="6858001"/>
+                  </a:xfrm>
+                </p:grpSpPr>
+                <p:sp>
+                  <p:nvSpPr>
+                    <p:cNvPr id="67" name="Rectangle 66">
+                      <a:extLst>
+                        <a:ext uri="{FF2B5EF4-FFF2-40B4-BE49-F238E27FC236}">
+                          <a16:creationId xmlns:a16="http://schemas.microsoft.com/office/drawing/2014/main" id="{6622BC2C-8D37-4E49-BF65-54BF21E65C1E}"/>
+                        </a:ext>
+                      </a:extLst>
+                    </p:cNvPr>
+                    <p:cNvSpPr/>
+                    <p:nvPr/>
+                  </p:nvSpPr>
+                  <p:spPr>
+                    <a:xfrm>
+                      <a:off x="1811867" y="-1"/>
+                      <a:ext cx="8703733" cy="6857999"/>
+                    </a:xfrm>
+                    <a:prstGeom prst="rect">
+                      <a:avLst/>
+                    </a:prstGeom>
+                    <a:ln>
+                      <a:noFill/>
+                    </a:ln>
+                  </p:spPr>
+                  <p:style>
+                    <a:lnRef idx="2">
+                      <a:schemeClr val="dk1"/>
+                    </a:lnRef>
+                    <a:fillRef idx="1">
+                      <a:schemeClr val="lt1"/>
+                    </a:fillRef>
+                    <a:effectRef idx="0">
+                      <a:schemeClr val="dk1"/>
+                    </a:effectRef>
+                    <a:fontRef idx="minor">
+                      <a:schemeClr val="dk1"/>
+                    </a:fontRef>
+                  </p:style>
+                  <p:txBody>
+                    <a:bodyPr rtlCol="0" anchor="ctr"/>
+                    <a:lstStyle/>
+                    <a:p>
+                      <a:pPr algn="ctr"/>
+                      <a:endParaRPr lang="en-US" dirty="0"/>
+                    </a:p>
+                  </p:txBody>
+                </p:sp>
+                <p:grpSp>
+                  <p:nvGrpSpPr>
+                    <p:cNvPr id="66" name="Group 65">
+                      <a:extLst>
+                        <a:ext uri="{FF2B5EF4-FFF2-40B4-BE49-F238E27FC236}">
+                          <a16:creationId xmlns:a16="http://schemas.microsoft.com/office/drawing/2014/main" id="{6F389862-C04F-5A40-9753-0137FFF811B4}"/>
+                        </a:ext>
+                      </a:extLst>
+                    </p:cNvPr>
+                    <p:cNvGrpSpPr/>
+                    <p:nvPr/>
+                  </p:nvGrpSpPr>
+                  <p:grpSpPr>
+                    <a:xfrm>
+                      <a:off x="2166440" y="0"/>
+                      <a:ext cx="7647268" cy="6858000"/>
+                      <a:chOff x="2166440" y="0"/>
+                      <a:chExt cx="7647268" cy="6858000"/>
+                    </a:xfrm>
+                    <a:solidFill>
+                      <a:schemeClr val="bg1"/>
+                    </a:solidFill>
+                  </p:grpSpPr>
+                  <p:pic>
+                    <p:nvPicPr>
+                      <p:cNvPr id="11" name="Picture 10" descr="Diagram&#10;&#10;Description automatically generated">
+                        <a:extLst>
+                          <a:ext uri="{FF2B5EF4-FFF2-40B4-BE49-F238E27FC236}">
+                            <a16:creationId xmlns:a16="http://schemas.microsoft.com/office/drawing/2014/main" id="{B9F32238-2041-CF44-9D44-70D88D0E6B93}"/>
+                          </a:ext>
+                        </a:extLst>
+                      </p:cNvPr>
+                      <p:cNvPicPr>
+                        <a:picLocks noChangeAspect="1"/>
+                      </p:cNvPicPr>
+                      <p:nvPr/>
+                    </p:nvPicPr>
+                    <p:blipFill>
+                      <a:blip r:embed="rId2"/>
+                      <a:stretch>
+                        <a:fillRect/>
+                      </a:stretch>
+                    </p:blipFill>
+                    <p:spPr>
+                      <a:xfrm>
+                        <a:off x="3820148" y="0"/>
+                        <a:ext cx="4551703" cy="6858000"/>
+                      </a:xfrm>
+                      <a:prstGeom prst="rect">
+                        <a:avLst/>
+                      </a:prstGeom>
+                      <a:grpFill/>
+                    </p:spPr>
+                  </p:pic>
+                  <p:sp>
+                    <p:nvSpPr>
+                      <p:cNvPr id="12" name="TextBox 11">
+                        <a:extLst>
+                          <a:ext uri="{FF2B5EF4-FFF2-40B4-BE49-F238E27FC236}">
+                            <a16:creationId xmlns:a16="http://schemas.microsoft.com/office/drawing/2014/main" id="{13695F7E-29F2-674B-8510-D23971571FAE}"/>
+                          </a:ext>
+                        </a:extLst>
+                      </p:cNvPr>
+                      <p:cNvSpPr txBox="1"/>
+                      <p:nvPr/>
+                    </p:nvSpPr>
+                    <p:spPr>
+                      <a:xfrm>
+                        <a:off x="2364222" y="4486765"/>
+                        <a:ext cx="1197764" cy="646331"/>
+                      </a:xfrm>
+                      <a:prstGeom prst="rect">
+                        <a:avLst/>
+                      </a:prstGeom>
+                      <a:grpFill/>
+                    </p:spPr>
+                    <p:txBody>
+                      <a:bodyPr wrap="none" rtlCol="0">
+                        <a:spAutoFit/>
+                      </a:bodyPr>
+                      <a:lstStyle/>
+                      <a:p>
+                        <a:r>
+                          <a:rPr lang="en-US" dirty="0">
+                            <a:latin typeface="Arial" panose="020B0604020202020204" pitchFamily="34" charset="0"/>
+                            <a:cs typeface="Arial" panose="020B0604020202020204" pitchFamily="34" charset="0"/>
+                          </a:rPr>
+                          <a:t>Extension</a:t>
+                        </a:r>
+                      </a:p>
+                      <a:p>
+                        <a:r>
+                          <a:rPr lang="en-US" dirty="0">
+                            <a:latin typeface="Arial" panose="020B0604020202020204" pitchFamily="34" charset="0"/>
+                            <a:cs typeface="Arial" panose="020B0604020202020204" pitchFamily="34" charset="0"/>
+                          </a:rPr>
+                          <a:t>springs</a:t>
+                        </a:r>
+                      </a:p>
+                    </p:txBody>
+                  </p:sp>
+                  <p:cxnSp>
+                    <p:nvCxnSpPr>
+                      <p:cNvPr id="14" name="Straight Arrow Connector 13">
+                        <a:extLst>
+                          <a:ext uri="{FF2B5EF4-FFF2-40B4-BE49-F238E27FC236}">
+                            <a16:creationId xmlns:a16="http://schemas.microsoft.com/office/drawing/2014/main" id="{E0F818B4-0AEB-3148-8FF2-0C347D0C03DA}"/>
+                          </a:ext>
+                        </a:extLst>
+                      </p:cNvPr>
+                      <p:cNvCxnSpPr>
+                        <a:cxnSpLocks/>
+                        <a:stCxn id="12" idx="3"/>
+                      </p:cNvCxnSpPr>
+                      <p:nvPr/>
+                    </p:nvCxnSpPr>
+                    <p:spPr>
+                      <a:xfrm flipV="1">
+                        <a:off x="3561986" y="4570375"/>
+                        <a:ext cx="844838" cy="239556"/>
+                      </a:xfrm>
+                      <a:prstGeom prst="straightConnector1">
+                        <a:avLst/>
+                      </a:prstGeom>
+                      <a:grpFill/>
+                      <a:ln>
+                        <a:tailEnd type="triangle"/>
+                      </a:ln>
+                    </p:spPr>
+                    <p:style>
+                      <a:lnRef idx="1">
+                        <a:schemeClr val="dk1"/>
+                      </a:lnRef>
+                      <a:fillRef idx="0">
+                        <a:schemeClr val="dk1"/>
+                      </a:fillRef>
+                      <a:effectRef idx="0">
+                        <a:schemeClr val="dk1"/>
+                      </a:effectRef>
+                      <a:fontRef idx="minor">
+                        <a:schemeClr val="tx1"/>
+                      </a:fontRef>
+                    </p:style>
+                  </p:cxnSp>
+                  <p:sp>
+                    <p:nvSpPr>
+                      <p:cNvPr id="19" name="TextBox 18">
+                        <a:extLst>
+                          <a:ext uri="{FF2B5EF4-FFF2-40B4-BE49-F238E27FC236}">
+                            <a16:creationId xmlns:a16="http://schemas.microsoft.com/office/drawing/2014/main" id="{6B848C65-49E3-D544-96FB-B88DBF8AE3D5}"/>
+                          </a:ext>
+                        </a:extLst>
+                      </p:cNvPr>
+                      <p:cNvSpPr txBox="1"/>
+                      <p:nvPr/>
+                    </p:nvSpPr>
+                    <p:spPr>
+                      <a:xfrm>
+                        <a:off x="3221266" y="6050086"/>
+                        <a:ext cx="1236236" cy="369332"/>
+                      </a:xfrm>
+                      <a:prstGeom prst="rect">
+                        <a:avLst/>
+                      </a:prstGeom>
+                      <a:grpFill/>
+                    </p:spPr>
+                    <p:txBody>
+                      <a:bodyPr wrap="none" rtlCol="0">
+                        <a:spAutoFit/>
+                      </a:bodyPr>
+                      <a:lstStyle/>
+                      <a:p>
+                        <a:r>
+                          <a:rPr lang="en-US" dirty="0">
+                            <a:latin typeface="Arial" panose="020B0604020202020204" pitchFamily="34" charset="0"/>
+                            <a:cs typeface="Arial" panose="020B0604020202020204" pitchFamily="34" charset="0"/>
+                          </a:rPr>
+                          <a:t>Rear pivot</a:t>
+                        </a:r>
+                      </a:p>
+                    </p:txBody>
+                  </p:sp>
+                  <p:cxnSp>
+                    <p:nvCxnSpPr>
+                      <p:cNvPr id="20" name="Straight Arrow Connector 19">
+                        <a:extLst>
+                          <a:ext uri="{FF2B5EF4-FFF2-40B4-BE49-F238E27FC236}">
+                            <a16:creationId xmlns:a16="http://schemas.microsoft.com/office/drawing/2014/main" id="{28F69CA5-DF22-A146-A87F-4285138FE14E}"/>
+                          </a:ext>
+                        </a:extLst>
+                      </p:cNvPr>
+                      <p:cNvCxnSpPr>
+                        <a:cxnSpLocks/>
+                        <a:stCxn id="19" idx="3"/>
+                      </p:cNvCxnSpPr>
+                      <p:nvPr/>
+                    </p:nvCxnSpPr>
+                    <p:spPr>
+                      <a:xfrm flipV="1">
+                        <a:off x="4457502" y="6135369"/>
+                        <a:ext cx="1350632" cy="99383"/>
+                      </a:xfrm>
+                      <a:prstGeom prst="straightConnector1">
+                        <a:avLst/>
+                      </a:prstGeom>
+                      <a:grpFill/>
+                      <a:ln>
+                        <a:tailEnd type="triangle"/>
+                      </a:ln>
+                    </p:spPr>
+                    <p:style>
+                      <a:lnRef idx="1">
+                        <a:schemeClr val="dk1"/>
+                      </a:lnRef>
+                      <a:fillRef idx="0">
+                        <a:schemeClr val="dk1"/>
+                      </a:fillRef>
+                      <a:effectRef idx="0">
+                        <a:schemeClr val="dk1"/>
+                      </a:effectRef>
+                      <a:fontRef idx="minor">
+                        <a:schemeClr val="tx1"/>
+                      </a:fontRef>
+                    </p:style>
+                  </p:cxnSp>
+                  <p:sp>
+                    <p:nvSpPr>
+                      <p:cNvPr id="22" name="TextBox 21">
+                        <a:extLst>
+                          <a:ext uri="{FF2B5EF4-FFF2-40B4-BE49-F238E27FC236}">
+                            <a16:creationId xmlns:a16="http://schemas.microsoft.com/office/drawing/2014/main" id="{A51D89F4-595D-884A-8871-25F3C418040E}"/>
+                          </a:ext>
+                        </a:extLst>
+                      </p:cNvPr>
+                      <p:cNvSpPr txBox="1"/>
+                      <p:nvPr/>
+                    </p:nvSpPr>
+                    <p:spPr>
+                      <a:xfrm>
+                        <a:off x="2166440" y="435748"/>
+                        <a:ext cx="2223686" cy="1200329"/>
+                      </a:xfrm>
+                      <a:prstGeom prst="rect">
+                        <a:avLst/>
+                      </a:prstGeom>
+                      <a:grpFill/>
+                    </p:spPr>
+                    <p:txBody>
+                      <a:bodyPr wrap="none" rtlCol="0">
+                        <a:spAutoFit/>
+                      </a:bodyPr>
+                      <a:lstStyle/>
+                      <a:p>
+                        <a:r>
+                          <a:rPr lang="en-US" dirty="0">
+                            <a:latin typeface="Arial" panose="020B0604020202020204" pitchFamily="34" charset="0"/>
+                            <a:cs typeface="Arial" panose="020B0604020202020204" pitchFamily="34" charset="0"/>
+                          </a:rPr>
+                          <a:t>Friction cord </a:t>
+                        </a:r>
+                      </a:p>
+                      <a:p>
+                        <a:r>
+                          <a:rPr lang="en-US" dirty="0">
+                            <a:latin typeface="Arial" panose="020B0604020202020204" pitchFamily="34" charset="0"/>
+                            <a:cs typeface="Arial" panose="020B0604020202020204" pitchFamily="34" charset="0"/>
+                          </a:rPr>
+                          <a:t>attached to </a:t>
+                        </a:r>
+                      </a:p>
+                      <a:p>
+                        <a:r>
+                          <a:rPr lang="en-US" dirty="0">
+                            <a:latin typeface="Arial" panose="020B0604020202020204" pitchFamily="34" charset="0"/>
+                            <a:cs typeface="Arial" panose="020B0604020202020204" pitchFamily="34" charset="0"/>
+                          </a:rPr>
+                          <a:t>hanging mass via </a:t>
+                        </a:r>
+                      </a:p>
+                      <a:p>
+                        <a:r>
+                          <a:rPr lang="en-US" dirty="0">
+                            <a:latin typeface="Arial" panose="020B0604020202020204" pitchFamily="34" charset="0"/>
+                            <a:cs typeface="Arial" panose="020B0604020202020204" pitchFamily="34" charset="0"/>
+                          </a:rPr>
+                          <a:t>wall-mounted pulley</a:t>
+                        </a:r>
+                      </a:p>
+                    </p:txBody>
+                  </p:sp>
+                  <p:cxnSp>
+                    <p:nvCxnSpPr>
+                      <p:cNvPr id="23" name="Straight Arrow Connector 22">
+                        <a:extLst>
+                          <a:ext uri="{FF2B5EF4-FFF2-40B4-BE49-F238E27FC236}">
+                            <a16:creationId xmlns:a16="http://schemas.microsoft.com/office/drawing/2014/main" id="{7909AB01-9488-FE46-A5B6-A609FC99D901}"/>
+                          </a:ext>
+                        </a:extLst>
+                      </p:cNvPr>
+                      <p:cNvCxnSpPr>
+                        <a:cxnSpLocks/>
+                        <a:stCxn id="22" idx="2"/>
+                        <a:endCxn id="9" idx="0"/>
+                      </p:cNvCxnSpPr>
+                      <p:nvPr/>
+                    </p:nvCxnSpPr>
+                    <p:spPr>
+                      <a:xfrm>
+                        <a:off x="3278283" y="1636077"/>
+                        <a:ext cx="50267" cy="706585"/>
+                      </a:xfrm>
+                      <a:prstGeom prst="straightConnector1">
+                        <a:avLst/>
+                      </a:prstGeom>
+                      <a:grpFill/>
+                      <a:ln>
+                        <a:tailEnd type="triangle"/>
+                      </a:ln>
+                    </p:spPr>
+                    <p:style>
+                      <a:lnRef idx="1">
+                        <a:schemeClr val="dk1"/>
+                      </a:lnRef>
+                      <a:fillRef idx="0">
+                        <a:schemeClr val="dk1"/>
+                      </a:fillRef>
+                      <a:effectRef idx="0">
+                        <a:schemeClr val="dk1"/>
+                      </a:effectRef>
+                      <a:fontRef idx="minor">
+                        <a:schemeClr val="tx1"/>
+                      </a:fontRef>
+                    </p:style>
+                  </p:cxnSp>
+                  <p:sp>
+                    <p:nvSpPr>
+                      <p:cNvPr id="31" name="TextBox 30">
+                        <a:extLst>
+                          <a:ext uri="{FF2B5EF4-FFF2-40B4-BE49-F238E27FC236}">
+                            <a16:creationId xmlns:a16="http://schemas.microsoft.com/office/drawing/2014/main" id="{08F49B01-6AA3-B04B-8249-AB5F362EEECD}"/>
+                          </a:ext>
+                        </a:extLst>
+                      </p:cNvPr>
+                      <p:cNvSpPr txBox="1"/>
+                      <p:nvPr/>
+                    </p:nvSpPr>
+                    <p:spPr>
+                      <a:xfrm>
+                        <a:off x="3321935" y="2830520"/>
+                        <a:ext cx="1095172" cy="369332"/>
+                      </a:xfrm>
+                      <a:prstGeom prst="rect">
+                        <a:avLst/>
+                      </a:prstGeom>
+                      <a:grpFill/>
+                    </p:spPr>
+                    <p:txBody>
+                      <a:bodyPr wrap="none" rtlCol="0">
+                        <a:spAutoFit/>
+                      </a:bodyPr>
+                      <a:lstStyle/>
+                      <a:p>
+                        <a:r>
+                          <a:rPr lang="en-US" dirty="0">
+                            <a:latin typeface="Arial" panose="020B0604020202020204" pitchFamily="34" charset="0"/>
+                            <a:cs typeface="Arial" panose="020B0604020202020204" pitchFamily="34" charset="0"/>
+                          </a:rPr>
+                          <a:t>Flywheel</a:t>
+                        </a:r>
+                      </a:p>
+                    </p:txBody>
+                  </p:sp>
+                  <p:cxnSp>
+                    <p:nvCxnSpPr>
+                      <p:cNvPr id="32" name="Straight Arrow Connector 31">
+                        <a:extLst>
+                          <a:ext uri="{FF2B5EF4-FFF2-40B4-BE49-F238E27FC236}">
+                            <a16:creationId xmlns:a16="http://schemas.microsoft.com/office/drawing/2014/main" id="{6D86F9CA-5D41-9240-9292-6CB71D6922FB}"/>
+                          </a:ext>
+                        </a:extLst>
+                      </p:cNvPr>
+                      <p:cNvCxnSpPr>
+                        <a:cxnSpLocks/>
+                        <a:stCxn id="31" idx="3"/>
+                      </p:cNvCxnSpPr>
+                      <p:nvPr/>
+                    </p:nvCxnSpPr>
+                    <p:spPr>
+                      <a:xfrm>
+                        <a:off x="4417107" y="3015186"/>
+                        <a:ext cx="1093044" cy="311565"/>
+                      </a:xfrm>
+                      <a:prstGeom prst="straightConnector1">
+                        <a:avLst/>
+                      </a:prstGeom>
+                      <a:grpFill/>
+                      <a:ln>
+                        <a:tailEnd type="triangle"/>
+                      </a:ln>
+                    </p:spPr>
+                    <p:style>
+                      <a:lnRef idx="1">
+                        <a:schemeClr val="dk1"/>
+                      </a:lnRef>
+                      <a:fillRef idx="0">
+                        <a:schemeClr val="dk1"/>
+                      </a:fillRef>
+                      <a:effectRef idx="0">
+                        <a:schemeClr val="dk1"/>
+                      </a:effectRef>
+                      <a:fontRef idx="minor">
+                        <a:schemeClr val="tx1"/>
+                      </a:fontRef>
+                    </p:style>
+                  </p:cxnSp>
+                  <p:sp>
+                    <p:nvSpPr>
+                      <p:cNvPr id="35" name="TextBox 34">
+                        <a:extLst>
+                          <a:ext uri="{FF2B5EF4-FFF2-40B4-BE49-F238E27FC236}">
+                            <a16:creationId xmlns:a16="http://schemas.microsoft.com/office/drawing/2014/main" id="{9B2EF17C-6AC2-4046-913E-AD74CFF6FF2A}"/>
+                          </a:ext>
+                        </a:extLst>
+                      </p:cNvPr>
+                      <p:cNvSpPr txBox="1"/>
+                      <p:nvPr/>
+                    </p:nvSpPr>
+                    <p:spPr>
+                      <a:xfrm>
+                        <a:off x="8255931" y="3292592"/>
+                        <a:ext cx="1428596" cy="369332"/>
+                      </a:xfrm>
+                      <a:prstGeom prst="rect">
+                        <a:avLst/>
+                      </a:prstGeom>
+                      <a:grpFill/>
+                    </p:spPr>
+                    <p:txBody>
+                      <a:bodyPr wrap="none" rtlCol="0">
+                        <a:spAutoFit/>
+                      </a:bodyPr>
+                      <a:lstStyle/>
+                      <a:p>
+                        <a:r>
+                          <a:rPr lang="en-US" dirty="0" err="1">
+                            <a:latin typeface="Arial" panose="020B0604020202020204" pitchFamily="34" charset="0"/>
+                            <a:cs typeface="Arial" panose="020B0604020202020204" pitchFamily="34" charset="0"/>
+                          </a:rPr>
+                          <a:t>Powermeter</a:t>
+                        </a:r>
+                        <a:endParaRPr lang="en-US" dirty="0">
+                          <a:latin typeface="Arial" panose="020B0604020202020204" pitchFamily="34" charset="0"/>
+                          <a:cs typeface="Arial" panose="020B0604020202020204" pitchFamily="34" charset="0"/>
+                        </a:endParaRPr>
+                      </a:p>
+                    </p:txBody>
+                  </p:sp>
+                  <p:cxnSp>
+                    <p:nvCxnSpPr>
+                      <p:cNvPr id="36" name="Straight Arrow Connector 35">
+                        <a:extLst>
+                          <a:ext uri="{FF2B5EF4-FFF2-40B4-BE49-F238E27FC236}">
+                            <a16:creationId xmlns:a16="http://schemas.microsoft.com/office/drawing/2014/main" id="{8749F783-6602-4941-B723-08B1E100693D}"/>
+                          </a:ext>
+                        </a:extLst>
+                      </p:cNvPr>
+                      <p:cNvCxnSpPr>
+                        <a:cxnSpLocks/>
+                        <a:stCxn id="35" idx="1"/>
+                      </p:cNvCxnSpPr>
+                      <p:nvPr/>
+                    </p:nvCxnSpPr>
+                    <p:spPr>
+                      <a:xfrm flipH="1">
+                        <a:off x="6885223" y="3477258"/>
+                        <a:ext cx="1370708" cy="369332"/>
+                      </a:xfrm>
+                      <a:prstGeom prst="straightConnector1">
+                        <a:avLst/>
+                      </a:prstGeom>
+                      <a:grpFill/>
+                      <a:ln>
+                        <a:tailEnd type="triangle"/>
+                      </a:ln>
+                    </p:spPr>
+                    <p:style>
+                      <a:lnRef idx="1">
+                        <a:schemeClr val="dk1"/>
+                      </a:lnRef>
+                      <a:fillRef idx="0">
+                        <a:schemeClr val="dk1"/>
+                      </a:fillRef>
+                      <a:effectRef idx="0">
+                        <a:schemeClr val="dk1"/>
+                      </a:effectRef>
+                      <a:fontRef idx="minor">
+                        <a:schemeClr val="tx1"/>
+                      </a:fontRef>
+                    </p:style>
+                  </p:cxnSp>
+                  <p:sp>
+                    <p:nvSpPr>
+                      <p:cNvPr id="39" name="TextBox 38">
+                        <a:extLst>
+                          <a:ext uri="{FF2B5EF4-FFF2-40B4-BE49-F238E27FC236}">
+                            <a16:creationId xmlns:a16="http://schemas.microsoft.com/office/drawing/2014/main" id="{6E77C7CF-18CF-284B-9BC7-20F4BD5D5761}"/>
+                          </a:ext>
+                        </a:extLst>
+                      </p:cNvPr>
+                      <p:cNvSpPr txBox="1"/>
+                      <p:nvPr/>
+                    </p:nvSpPr>
+                    <p:spPr>
+                      <a:xfrm>
+                        <a:off x="7667141" y="2881772"/>
+                        <a:ext cx="607859" cy="369332"/>
+                      </a:xfrm>
+                      <a:prstGeom prst="rect">
+                        <a:avLst/>
+                      </a:prstGeom>
+                      <a:grpFill/>
+                    </p:spPr>
+                    <p:txBody>
+                      <a:bodyPr wrap="none" rtlCol="0">
+                        <a:spAutoFit/>
+                      </a:bodyPr>
+                      <a:lstStyle/>
+                      <a:p>
+                        <a:r>
+                          <a:rPr lang="en-US" dirty="0">
+                            <a:latin typeface="Arial" panose="020B0604020202020204" pitchFamily="34" charset="0"/>
+                            <a:cs typeface="Arial" panose="020B0604020202020204" pitchFamily="34" charset="0"/>
+                          </a:rPr>
+                          <a:t>IMU</a:t>
+                        </a:r>
+                      </a:p>
+                    </p:txBody>
+                  </p:sp>
+                  <p:cxnSp>
+                    <p:nvCxnSpPr>
+                      <p:cNvPr id="40" name="Straight Arrow Connector 39">
+                        <a:extLst>
+                          <a:ext uri="{FF2B5EF4-FFF2-40B4-BE49-F238E27FC236}">
+                            <a16:creationId xmlns:a16="http://schemas.microsoft.com/office/drawing/2014/main" id="{5B02735B-6E44-4642-8D64-94B5B810CA9A}"/>
+                          </a:ext>
+                        </a:extLst>
+                      </p:cNvPr>
+                      <p:cNvCxnSpPr>
+                        <a:cxnSpLocks/>
+                        <a:stCxn id="39" idx="1"/>
+                      </p:cNvCxnSpPr>
+                      <p:nvPr/>
+                    </p:nvCxnSpPr>
+                    <p:spPr>
+                      <a:xfrm flipH="1">
+                        <a:off x="6703033" y="3066438"/>
+                        <a:ext cx="964108" cy="392835"/>
+                      </a:xfrm>
+                      <a:prstGeom prst="straightConnector1">
+                        <a:avLst/>
+                      </a:prstGeom>
+                      <a:grpFill/>
+                      <a:ln>
+                        <a:tailEnd type="triangle"/>
+                      </a:ln>
+                    </p:spPr>
+                    <p:style>
+                      <a:lnRef idx="1">
+                        <a:schemeClr val="dk1"/>
+                      </a:lnRef>
+                      <a:fillRef idx="0">
+                        <a:schemeClr val="dk1"/>
+                      </a:fillRef>
+                      <a:effectRef idx="0">
+                        <a:schemeClr val="dk1"/>
+                      </a:effectRef>
+                      <a:fontRef idx="minor">
+                        <a:schemeClr val="tx1"/>
+                      </a:fontRef>
+                    </p:style>
+                  </p:cxnSp>
+                  <p:sp>
+                    <p:nvSpPr>
+                      <p:cNvPr id="43" name="TextBox 42">
+                        <a:extLst>
+                          <a:ext uri="{FF2B5EF4-FFF2-40B4-BE49-F238E27FC236}">
+                            <a16:creationId xmlns:a16="http://schemas.microsoft.com/office/drawing/2014/main" id="{C00C2080-FDCC-E440-9975-060B321398DD}"/>
+                          </a:ext>
+                        </a:extLst>
+                      </p:cNvPr>
+                      <p:cNvSpPr txBox="1"/>
+                      <p:nvPr/>
+                    </p:nvSpPr>
+                    <p:spPr>
+                      <a:xfrm>
+                        <a:off x="8539000" y="3984709"/>
+                        <a:ext cx="1274708" cy="369332"/>
+                      </a:xfrm>
+                      <a:prstGeom prst="rect">
+                        <a:avLst/>
+                      </a:prstGeom>
+                      <a:grpFill/>
+                    </p:spPr>
+                    <p:txBody>
+                      <a:bodyPr wrap="none" rtlCol="0">
+                        <a:spAutoFit/>
+                      </a:bodyPr>
+                      <a:lstStyle/>
+                      <a:p>
+                        <a:r>
+                          <a:rPr lang="en-US" dirty="0">
+                            <a:latin typeface="Arial" panose="020B0604020202020204" pitchFamily="34" charset="0"/>
+                            <a:cs typeface="Arial" panose="020B0604020202020204" pitchFamily="34" charset="0"/>
+                          </a:rPr>
+                          <a:t>Front pivot</a:t>
+                        </a:r>
+                      </a:p>
+                    </p:txBody>
+                  </p:sp>
+                  <p:cxnSp>
+                    <p:nvCxnSpPr>
+                      <p:cNvPr id="44" name="Straight Arrow Connector 43">
+                        <a:extLst>
+                          <a:ext uri="{FF2B5EF4-FFF2-40B4-BE49-F238E27FC236}">
+                            <a16:creationId xmlns:a16="http://schemas.microsoft.com/office/drawing/2014/main" id="{928E3A06-B6C6-E345-86FC-8855662CC835}"/>
+                          </a:ext>
+                        </a:extLst>
+                      </p:cNvPr>
+                      <p:cNvCxnSpPr>
+                        <a:cxnSpLocks/>
+                        <a:stCxn id="43" idx="1"/>
+                      </p:cNvCxnSpPr>
+                      <p:nvPr/>
+                    </p:nvCxnSpPr>
+                    <p:spPr>
+                      <a:xfrm flipH="1">
+                        <a:off x="7197739" y="4169375"/>
+                        <a:ext cx="1341261" cy="438251"/>
+                      </a:xfrm>
+                      <a:prstGeom prst="straightConnector1">
+                        <a:avLst/>
+                      </a:prstGeom>
+                      <a:grpFill/>
+                      <a:ln>
+                        <a:tailEnd type="triangle"/>
+                      </a:ln>
+                    </p:spPr>
+                    <p:style>
+                      <a:lnRef idx="1">
+                        <a:schemeClr val="dk1"/>
+                      </a:lnRef>
+                      <a:fillRef idx="0">
+                        <a:schemeClr val="dk1"/>
+                      </a:fillRef>
+                      <a:effectRef idx="0">
+                        <a:schemeClr val="dk1"/>
+                      </a:effectRef>
+                      <a:fontRef idx="minor">
+                        <a:schemeClr val="tx1"/>
+                      </a:fontRef>
+                    </p:style>
+                  </p:cxnSp>
+                  <p:sp>
+                    <p:nvSpPr>
+                      <p:cNvPr id="49" name="TextBox 48">
+                        <a:extLst>
+                          <a:ext uri="{FF2B5EF4-FFF2-40B4-BE49-F238E27FC236}">
+                            <a16:creationId xmlns:a16="http://schemas.microsoft.com/office/drawing/2014/main" id="{6D081479-574B-BB4A-AFD0-3B0DB51117F5}"/>
+                          </a:ext>
+                        </a:extLst>
+                      </p:cNvPr>
+                      <p:cNvSpPr txBox="1"/>
+                      <p:nvPr/>
+                    </p:nvSpPr>
+                    <p:spPr>
+                      <a:xfrm>
+                        <a:off x="8397251" y="5481713"/>
+                        <a:ext cx="1326004" cy="646331"/>
+                      </a:xfrm>
+                      <a:prstGeom prst="rect">
+                        <a:avLst/>
+                      </a:prstGeom>
+                      <a:grpFill/>
+                    </p:spPr>
+                    <p:txBody>
+                      <a:bodyPr wrap="none" rtlCol="0">
+                        <a:spAutoFit/>
+                      </a:bodyPr>
+                      <a:lstStyle/>
+                      <a:p>
+                        <a:r>
+                          <a:rPr lang="en-US" dirty="0">
+                            <a:latin typeface="Arial" panose="020B0604020202020204" pitchFamily="34" charset="0"/>
+                            <a:cs typeface="Arial" panose="020B0604020202020204" pitchFamily="34" charset="0"/>
+                          </a:rPr>
+                          <a:t>Ergometer </a:t>
+                        </a:r>
+                      </a:p>
+                      <a:p>
+                        <a:r>
+                          <a:rPr lang="en-US" dirty="0">
+                            <a:latin typeface="Arial" panose="020B0604020202020204" pitchFamily="34" charset="0"/>
+                            <a:cs typeface="Arial" panose="020B0604020202020204" pitchFamily="34" charset="0"/>
+                          </a:rPr>
+                          <a:t>frame</a:t>
+                        </a:r>
+                      </a:p>
+                    </p:txBody>
+                  </p:sp>
+                  <p:cxnSp>
+                    <p:nvCxnSpPr>
+                      <p:cNvPr id="53" name="Straight Arrow Connector 52">
+                        <a:extLst>
+                          <a:ext uri="{FF2B5EF4-FFF2-40B4-BE49-F238E27FC236}">
+                            <a16:creationId xmlns:a16="http://schemas.microsoft.com/office/drawing/2014/main" id="{898566B5-7BE5-AD48-94C4-29660FA1E5BD}"/>
+                          </a:ext>
+                        </a:extLst>
+                      </p:cNvPr>
+                      <p:cNvCxnSpPr>
+                        <a:cxnSpLocks/>
+                        <a:stCxn id="49" idx="1"/>
+                      </p:cNvCxnSpPr>
+                      <p:nvPr/>
+                    </p:nvCxnSpPr>
+                    <p:spPr>
+                      <a:xfrm flipH="1" flipV="1">
+                        <a:off x="6163735" y="5115077"/>
+                        <a:ext cx="2233516" cy="689802"/>
+                      </a:xfrm>
+                      <a:prstGeom prst="straightConnector1">
+                        <a:avLst/>
+                      </a:prstGeom>
+                      <a:grpFill/>
+                      <a:ln>
+                        <a:tailEnd type="triangle"/>
+                      </a:ln>
+                    </p:spPr>
+                    <p:style>
+                      <a:lnRef idx="1">
+                        <a:schemeClr val="dk1"/>
+                      </a:lnRef>
+                      <a:fillRef idx="0">
+                        <a:schemeClr val="dk1"/>
+                      </a:fillRef>
+                      <a:effectRef idx="0">
+                        <a:schemeClr val="dk1"/>
+                      </a:effectRef>
+                      <a:fontRef idx="minor">
+                        <a:schemeClr val="tx1"/>
+                      </a:fontRef>
+                    </p:style>
+                  </p:cxnSp>
+                </p:grpSp>
+              </p:grpSp>
+              <p:sp>
+                <p:nvSpPr>
+                  <p:cNvPr id="2" name="Oval 1">
+                    <a:extLst>
+                      <a:ext uri="{FF2B5EF4-FFF2-40B4-BE49-F238E27FC236}">
+                        <a16:creationId xmlns:a16="http://schemas.microsoft.com/office/drawing/2014/main" id="{FA4453CB-3335-354A-A6D5-D3BF14347C8C}"/>
+                      </a:ext>
+                    </a:extLst>
+                  </p:cNvPr>
+                  <p:cNvSpPr/>
+                  <p:nvPr/>
+                </p:nvSpPr>
+                <p:spPr>
+                  <a:xfrm>
+                    <a:off x="5765800" y="6089650"/>
+                    <a:ext cx="45719" cy="45719"/>
+                  </a:xfrm>
+                  <a:prstGeom prst="ellipse">
+                    <a:avLst/>
+                  </a:prstGeom>
+                  <a:solidFill>
+                    <a:schemeClr val="tx1"/>
+                  </a:solidFill>
+                  <a:ln>
+                    <a:solidFill>
+                      <a:schemeClr val="tx1"/>
+                    </a:solidFill>
+                  </a:ln>
+                </p:spPr>
+                <p:style>
+                  <a:lnRef idx="2">
+                    <a:schemeClr val="dk1">
+                      <a:shade val="50000"/>
+                    </a:schemeClr>
+                  </a:lnRef>
+                  <a:fillRef idx="1">
+                    <a:schemeClr val="dk1"/>
+                  </a:fillRef>
+                  <a:effectRef idx="0">
+                    <a:schemeClr val="dk1"/>
+                  </a:effectRef>
+                  <a:fontRef idx="minor">
+                    <a:schemeClr val="lt1"/>
+                  </a:fontRef>
+                </p:style>
+                <p:txBody>
+                  <a:bodyPr rtlCol="0" anchor="ctr"/>
+                  <a:lstStyle/>
+                  <a:p>
+                    <a:pPr algn="ctr"/>
+                    <a:endParaRPr lang="en-US"/>
+                  </a:p>
+                </p:txBody>
+              </p:sp>
+              <p:sp>
+                <p:nvSpPr>
+                  <p:cNvPr id="5" name="Can 4">
+                    <a:extLst>
+                      <a:ext uri="{FF2B5EF4-FFF2-40B4-BE49-F238E27FC236}">
+                        <a16:creationId xmlns:a16="http://schemas.microsoft.com/office/drawing/2014/main" id="{AB3033C5-C6A1-6540-8210-EECC9C88CDE2}"/>
+                      </a:ext>
+                    </a:extLst>
+                  </p:cNvPr>
+                  <p:cNvSpPr/>
+                  <p:nvPr/>
+                </p:nvSpPr>
+                <p:spPr>
+                  <a:xfrm rot="5400000">
+                    <a:off x="2386678" y="2595117"/>
+                    <a:ext cx="630810" cy="311833"/>
+                  </a:xfrm>
+                  <a:prstGeom prst="can">
+                    <a:avLst>
+                      <a:gd name="adj" fmla="val 50000"/>
+                    </a:avLst>
+                  </a:prstGeom>
+                  <a:noFill/>
+                  <a:ln w="19050">
+                    <a:solidFill>
+                      <a:schemeClr val="tx1"/>
+                    </a:solidFill>
+                  </a:ln>
+                </p:spPr>
+                <p:style>
+                  <a:lnRef idx="2">
+                    <a:schemeClr val="accent1">
+                      <a:shade val="50000"/>
+                    </a:schemeClr>
+                  </a:lnRef>
+                  <a:fillRef idx="1">
+                    <a:schemeClr val="accent1"/>
+                  </a:fillRef>
+                  <a:effectRef idx="0">
+                    <a:schemeClr val="accent1"/>
+                  </a:effectRef>
+                  <a:fontRef idx="minor">
+                    <a:schemeClr val="lt1"/>
+                  </a:fontRef>
+                </p:style>
+                <p:txBody>
+                  <a:bodyPr rtlCol="0" anchor="ctr"/>
+                  <a:lstStyle/>
+                  <a:p>
+                    <a:pPr algn="ctr"/>
+                    <a:endParaRPr lang="en-US"/>
+                  </a:p>
+                </p:txBody>
+              </p:sp>
+              <p:sp>
+                <p:nvSpPr>
+                  <p:cNvPr id="8" name="Freeform 7">
+                    <a:extLst>
+                      <a:ext uri="{FF2B5EF4-FFF2-40B4-BE49-F238E27FC236}">
+                        <a16:creationId xmlns:a16="http://schemas.microsoft.com/office/drawing/2014/main" id="{33193548-9B82-7549-A6A6-6AC5DEC75251}"/>
+                      </a:ext>
+                    </a:extLst>
+                  </p:cNvPr>
+                  <p:cNvSpPr/>
+                  <p:nvPr/>
+                </p:nvSpPr>
+                <p:spPr>
+                  <a:xfrm>
+                    <a:off x="2623350" y="2377021"/>
+                    <a:ext cx="1277318" cy="1228493"/>
+                  </a:xfrm>
+                  <a:custGeom>
+                    <a:avLst/>
+                    <a:gdLst>
+                      <a:gd name="connsiteX0" fmla="*/ 1277318 w 1277318"/>
+                      <a:gd name="connsiteY0" fmla="*/ 76812 h 1228493"/>
+                      <a:gd name="connsiteX1" fmla="*/ 241384 w 1277318"/>
+                      <a:gd name="connsiteY1" fmla="*/ 7364 h 1228493"/>
+                      <a:gd name="connsiteX2" fmla="*/ 15678 w 1277318"/>
+                      <a:gd name="connsiteY2" fmla="*/ 233070 h 1228493"/>
+                      <a:gd name="connsiteX3" fmla="*/ 21465 w 1277318"/>
+                      <a:gd name="connsiteY3" fmla="*/ 771293 h 1228493"/>
+                      <a:gd name="connsiteX4" fmla="*/ 38827 w 1277318"/>
+                      <a:gd name="connsiteY4" fmla="*/ 1228493 h 1228493"/>
+                    </a:gdLst>
+                    <a:ahLst/>
+                    <a:cxnLst>
+                      <a:cxn ang="0">
+                        <a:pos x="connsiteX0" y="connsiteY0"/>
+                      </a:cxn>
+                      <a:cxn ang="0">
+                        <a:pos x="connsiteX1" y="connsiteY1"/>
+                      </a:cxn>
+                      <a:cxn ang="0">
+                        <a:pos x="connsiteX2" y="connsiteY2"/>
+                      </a:cxn>
+                      <a:cxn ang="0">
+                        <a:pos x="connsiteX3" y="connsiteY3"/>
+                      </a:cxn>
+                      <a:cxn ang="0">
+                        <a:pos x="connsiteX4" y="connsiteY4"/>
+                      </a:cxn>
+                    </a:cxnLst>
+                    <a:rect l="l" t="t" r="r" b="b"/>
+                    <a:pathLst>
+                      <a:path w="1277318" h="1228493">
+                        <a:moveTo>
+                          <a:pt x="1277318" y="76812"/>
+                        </a:moveTo>
+                        <a:cubicBezTo>
+                          <a:pt x="864487" y="29066"/>
+                          <a:pt x="451657" y="-18679"/>
+                          <a:pt x="241384" y="7364"/>
+                        </a:cubicBezTo>
+                        <a:cubicBezTo>
+                          <a:pt x="31111" y="33407"/>
+                          <a:pt x="52331" y="105749"/>
+                          <a:pt x="15678" y="233070"/>
+                        </a:cubicBezTo>
+                        <a:cubicBezTo>
+                          <a:pt x="-20975" y="360391"/>
+                          <a:pt x="17607" y="605389"/>
+                          <a:pt x="21465" y="771293"/>
+                        </a:cubicBezTo>
+                        <a:cubicBezTo>
+                          <a:pt x="25323" y="937197"/>
+                          <a:pt x="36898" y="1133967"/>
+                          <a:pt x="38827" y="1228493"/>
+                        </a:cubicBezTo>
+                      </a:path>
+                    </a:pathLst>
+                  </a:custGeom>
+                  <a:noFill/>
+                  <a:ln>
+                    <a:solidFill>
+                      <a:schemeClr val="tx1"/>
+                    </a:solidFill>
+                  </a:ln>
+                </p:spPr>
+                <p:style>
+                  <a:lnRef idx="2">
+                    <a:schemeClr val="accent1">
+                      <a:shade val="50000"/>
+                    </a:schemeClr>
+                  </a:lnRef>
+                  <a:fillRef idx="1">
+                    <a:schemeClr val="accent1"/>
+                  </a:fillRef>
+                  <a:effectRef idx="0">
+                    <a:schemeClr val="accent1"/>
+                  </a:effectRef>
+                  <a:fontRef idx="minor">
+                    <a:schemeClr val="lt1"/>
+                  </a:fontRef>
+                </p:style>
+                <p:txBody>
+                  <a:bodyPr rtlCol="0" anchor="ctr"/>
+                  <a:lstStyle/>
+                  <a:p>
+                    <a:pPr algn="ctr"/>
+                    <a:endParaRPr lang="en-US"/>
+                  </a:p>
+                </p:txBody>
+              </p:sp>
+              <p:pic>
+                <p:nvPicPr>
+                  <p:cNvPr id="9" name="Picture 8">
+                    <a:extLst>
+                      <a:ext uri="{FF2B5EF4-FFF2-40B4-BE49-F238E27FC236}">
+                        <a16:creationId xmlns:a16="http://schemas.microsoft.com/office/drawing/2014/main" id="{55610D85-376A-5F43-B8D4-8708EE1CF17C}"/>
+                      </a:ext>
+                    </a:extLst>
+                  </p:cNvPr>
+                  <p:cNvPicPr>
+                    <a:picLocks noChangeAspect="1"/>
+                  </p:cNvPicPr>
+                  <p:nvPr/>
+                </p:nvPicPr>
+                <p:blipFill>
+                  <a:blip r:embed="rId3"/>
+                  <a:stretch>
+                    <a:fillRect/>
+                  </a:stretch>
+                </p:blipFill>
+                <p:spPr>
+                  <a:xfrm>
+                    <a:off x="2619466" y="2342663"/>
+                    <a:ext cx="1282700" cy="1244600"/>
+                  </a:xfrm>
+                  <a:prstGeom prst="rect">
+                    <a:avLst/>
+                  </a:prstGeom>
+                </p:spPr>
+              </p:pic>
+              <p:sp>
+                <p:nvSpPr>
+                  <p:cNvPr id="10" name="Trapezoid 9">
+                    <a:extLst>
+                      <a:ext uri="{FF2B5EF4-FFF2-40B4-BE49-F238E27FC236}">
+                        <a16:creationId xmlns:a16="http://schemas.microsoft.com/office/drawing/2014/main" id="{6DD0F687-F4FB-0A4C-84B1-F8E887748EA8}"/>
+                      </a:ext>
+                    </a:extLst>
+                  </p:cNvPr>
+                  <p:cNvSpPr/>
+                  <p:nvPr/>
+                </p:nvSpPr>
+                <p:spPr>
+                  <a:xfrm>
+                    <a:off x="2427832" y="3599727"/>
+                    <a:ext cx="479744" cy="446514"/>
+                  </a:xfrm>
+                  <a:prstGeom prst="trapezoid">
+                    <a:avLst/>
+                  </a:prstGeom>
+                  <a:noFill/>
+                  <a:ln w="19050">
+                    <a:solidFill>
+                      <a:schemeClr val="tx1"/>
+                    </a:solidFill>
+                  </a:ln>
+                </p:spPr>
+                <p:style>
+                  <a:lnRef idx="2">
+                    <a:schemeClr val="accent1">
+                      <a:shade val="50000"/>
+                    </a:schemeClr>
+                  </a:lnRef>
+                  <a:fillRef idx="1">
+                    <a:schemeClr val="accent1"/>
+                  </a:fillRef>
+                  <a:effectRef idx="0">
+                    <a:schemeClr val="accent1"/>
+                  </a:effectRef>
+                  <a:fontRef idx="minor">
+                    <a:schemeClr val="lt1"/>
+                  </a:fontRef>
+                </p:style>
+                <p:txBody>
+                  <a:bodyPr rtlCol="0" anchor="ctr"/>
+                  <a:lstStyle/>
+                  <a:p>
+                    <a:pPr algn="ctr"/>
+                    <a:endParaRPr lang="en-US" dirty="0">
+                      <a:ln>
+                        <a:solidFill>
+                          <a:schemeClr val="tx1"/>
+                        </a:solidFill>
+                      </a:ln>
+                      <a:solidFill>
+                        <a:schemeClr val="tx1"/>
+                      </a:solidFill>
+                      <a:latin typeface="Arial" panose="020B0604020202020204" pitchFamily="34" charset="0"/>
+                      <a:cs typeface="Arial" panose="020B0604020202020204" pitchFamily="34" charset="0"/>
+                    </a:endParaRPr>
+                  </a:p>
+                </p:txBody>
+              </p:sp>
+              <p:sp>
+                <p:nvSpPr>
+                  <p:cNvPr id="41" name="TextBox 40">
+                    <a:extLst>
+                      <a:ext uri="{FF2B5EF4-FFF2-40B4-BE49-F238E27FC236}">
+                        <a16:creationId xmlns:a16="http://schemas.microsoft.com/office/drawing/2014/main" id="{9B75EE3A-3EA0-5A43-BD49-93C7CF38A964}"/>
+                      </a:ext>
+                    </a:extLst>
+                  </p:cNvPr>
+                  <p:cNvSpPr txBox="1"/>
+                  <p:nvPr/>
+                </p:nvSpPr>
+                <p:spPr>
+                  <a:xfrm>
+                    <a:off x="2575207" y="3708091"/>
+                    <a:ext cx="184994" cy="276999"/>
+                  </a:xfrm>
+                  <a:prstGeom prst="rect">
+                    <a:avLst/>
+                  </a:prstGeom>
+                  <a:solidFill>
+                    <a:schemeClr val="bg1"/>
+                  </a:solidFill>
+                </p:spPr>
+                <p:txBody>
+                  <a:bodyPr wrap="square" lIns="0" tIns="0" rIns="0" bIns="0" rtlCol="0">
+                    <a:spAutoFit/>
+                  </a:bodyPr>
+                  <a:lstStyle/>
+                  <a:p>
+                    <a:pPr algn="ctr"/>
+                    <a:r>
+                      <a:rPr lang="en-US" dirty="0" err="1">
+                        <a:latin typeface="Arial" panose="020B0604020202020204" pitchFamily="34" charset="0"/>
+                        <a:cs typeface="Arial" panose="020B0604020202020204" pitchFamily="34" charset="0"/>
+                      </a:rPr>
+                      <a:t>lb</a:t>
+                    </a:r>
+                    <a:endParaRPr lang="en-US" sz="1600" dirty="0">
+                      <a:latin typeface="Arial" panose="020B0604020202020204" pitchFamily="34" charset="0"/>
+                      <a:cs typeface="Arial" panose="020B0604020202020204" pitchFamily="34" charset="0"/>
+                    </a:endParaRPr>
+                  </a:p>
+                </p:txBody>
+              </p:sp>
+              <p:sp>
+                <p:nvSpPr>
+                  <p:cNvPr id="52" name="Oval 51">
+                    <a:extLst>
+                      <a:ext uri="{FF2B5EF4-FFF2-40B4-BE49-F238E27FC236}">
+                        <a16:creationId xmlns:a16="http://schemas.microsoft.com/office/drawing/2014/main" id="{A7850DC4-63F5-E743-AED9-7186569FAE60}"/>
+                      </a:ext>
+                    </a:extLst>
+                  </p:cNvPr>
+                  <p:cNvSpPr/>
+                  <p:nvPr/>
+                </p:nvSpPr>
+                <p:spPr>
+                  <a:xfrm>
+                    <a:off x="7080560" y="4570376"/>
+                    <a:ext cx="27432" cy="27432"/>
+                  </a:xfrm>
+                  <a:prstGeom prst="ellipse">
+                    <a:avLst/>
+                  </a:prstGeom>
+                  <a:solidFill>
+                    <a:schemeClr val="tx1"/>
+                  </a:solidFill>
+                  <a:ln>
+                    <a:solidFill>
+                      <a:schemeClr val="tx1"/>
+                    </a:solidFill>
+                  </a:ln>
+                </p:spPr>
+                <p:style>
+                  <a:lnRef idx="2">
+                    <a:schemeClr val="dk1">
+                      <a:shade val="50000"/>
+                    </a:schemeClr>
+                  </a:lnRef>
+                  <a:fillRef idx="1">
+                    <a:schemeClr val="dk1"/>
+                  </a:fillRef>
+                  <a:effectRef idx="0">
+                    <a:schemeClr val="dk1"/>
+                  </a:effectRef>
+                  <a:fontRef idx="minor">
+                    <a:schemeClr val="lt1"/>
+                  </a:fontRef>
+                </p:style>
+                <p:txBody>
+                  <a:bodyPr rtlCol="0" anchor="ctr"/>
+                  <a:lstStyle/>
+                  <a:p>
+                    <a:pPr algn="ctr"/>
+                    <a:endParaRPr lang="en-US"/>
+                  </a:p>
+                </p:txBody>
+              </p:sp>
+            </p:grpSp>
+            <p:cxnSp>
+              <p:nvCxnSpPr>
+                <p:cNvPr id="4" name="Straight Arrow Connector 3">
+                  <a:extLst>
+                    <a:ext uri="{FF2B5EF4-FFF2-40B4-BE49-F238E27FC236}">
+                      <a16:creationId xmlns:a16="http://schemas.microsoft.com/office/drawing/2014/main" id="{9D8CBA5D-B6FB-3A4F-88EA-EE198B562F9F}"/>
+                    </a:ext>
+                  </a:extLst>
+                </p:cNvPr>
+                <p:cNvCxnSpPr/>
+                <p:nvPr/>
+              </p:nvCxnSpPr>
               <p:spPr>
-                <a:xfrm>
-                  <a:off x="3820148" y="0"/>
-                  <a:ext cx="4551703" cy="6858000"/>
+                <a:xfrm flipV="1">
+                  <a:off x="2226627" y="5733043"/>
+                  <a:ext cx="0" cy="653143"/>
                 </a:xfrm>
-                <a:prstGeom prst="rect">
+                <a:prstGeom prst="straightConnector1">
                   <a:avLst/>
                 </a:prstGeom>
-                <a:grpFill/>
+                <a:ln w="12700">
+                  <a:solidFill>
+                    <a:srgbClr val="00B050"/>
+                  </a:solidFill>
+                  <a:tailEnd type="triangle"/>
+                </a:ln>
               </p:spPr>
-            </p:pic>
+              <p:style>
+                <a:lnRef idx="1">
+                  <a:schemeClr val="accent6"/>
+                </a:lnRef>
+                <a:fillRef idx="0">
+                  <a:schemeClr val="accent6"/>
+                </a:fillRef>
+                <a:effectRef idx="0">
+                  <a:schemeClr val="accent6"/>
+                </a:effectRef>
+                <a:fontRef idx="minor">
+                  <a:schemeClr val="tx1"/>
+                </a:fontRef>
+              </p:style>
+            </p:cxnSp>
+            <p:cxnSp>
+              <p:nvCxnSpPr>
+                <p:cNvPr id="33" name="Straight Arrow Connector 32">
+                  <a:extLst>
+                    <a:ext uri="{FF2B5EF4-FFF2-40B4-BE49-F238E27FC236}">
+                      <a16:creationId xmlns:a16="http://schemas.microsoft.com/office/drawing/2014/main" id="{CA8025B3-8BDB-8949-952E-355AA97F675A}"/>
+                    </a:ext>
+                  </a:extLst>
+                </p:cNvPr>
+                <p:cNvCxnSpPr>
+                  <a:cxnSpLocks/>
+                </p:cNvCxnSpPr>
+                <p:nvPr/>
+              </p:nvCxnSpPr>
+              <p:spPr>
+                <a:xfrm rot="6180000" flipV="1">
+                  <a:off x="2543139" y="6136105"/>
+                  <a:ext cx="0" cy="653143"/>
+                </a:xfrm>
+                <a:prstGeom prst="straightConnector1">
+                  <a:avLst/>
+                </a:prstGeom>
+                <a:ln w="12700">
+                  <a:solidFill>
+                    <a:srgbClr val="0070C0"/>
+                  </a:solidFill>
+                  <a:tailEnd type="triangle"/>
+                </a:ln>
+              </p:spPr>
+              <p:style>
+                <a:lnRef idx="1">
+                  <a:schemeClr val="accent1"/>
+                </a:lnRef>
+                <a:fillRef idx="0">
+                  <a:schemeClr val="accent1"/>
+                </a:fillRef>
+                <a:effectRef idx="0">
+                  <a:schemeClr val="accent1"/>
+                </a:effectRef>
+                <a:fontRef idx="minor">
+                  <a:schemeClr val="tx1"/>
+                </a:fontRef>
+              </p:style>
+            </p:cxnSp>
+            <p:cxnSp>
+              <p:nvCxnSpPr>
+                <p:cNvPr id="34" name="Straight Arrow Connector 33">
+                  <a:extLst>
+                    <a:ext uri="{FF2B5EF4-FFF2-40B4-BE49-F238E27FC236}">
+                      <a16:creationId xmlns:a16="http://schemas.microsoft.com/office/drawing/2014/main" id="{F83542F5-AAF6-3D46-8EFE-0F99D1BF40A8}"/>
+                    </a:ext>
+                  </a:extLst>
+                </p:cNvPr>
+                <p:cNvCxnSpPr>
+                  <a:cxnSpLocks/>
+                </p:cNvCxnSpPr>
+                <p:nvPr/>
+              </p:nvCxnSpPr>
+              <p:spPr>
+                <a:xfrm rot="2340000" flipV="1">
+                  <a:off x="2436367" y="5805623"/>
+                  <a:ext cx="0" cy="653143"/>
+                </a:xfrm>
+                <a:prstGeom prst="straightConnector1">
+                  <a:avLst/>
+                </a:prstGeom>
+                <a:ln w="12700">
+                  <a:solidFill>
+                    <a:srgbClr val="FF0000"/>
+                  </a:solidFill>
+                  <a:tailEnd type="triangle"/>
+                </a:ln>
+              </p:spPr>
+              <p:style>
+                <a:lnRef idx="1">
+                  <a:schemeClr val="accent1"/>
+                </a:lnRef>
+                <a:fillRef idx="0">
+                  <a:schemeClr val="accent1"/>
+                </a:fillRef>
+                <a:effectRef idx="0">
+                  <a:schemeClr val="accent1"/>
+                </a:effectRef>
+                <a:fontRef idx="minor">
+                  <a:schemeClr val="tx1"/>
+                </a:fontRef>
+              </p:style>
+            </p:cxnSp>
             <p:sp>
               <p:nvSpPr>
-                <p:cNvPr id="12" name="TextBox 11">
+                <p:cNvPr id="6" name="TextBox 5">
                   <a:extLst>
                     <a:ext uri="{FF2B5EF4-FFF2-40B4-BE49-F238E27FC236}">
-                      <a16:creationId xmlns:a16="http://schemas.microsoft.com/office/drawing/2014/main" id="{13695F7E-29F2-674B-8510-D23971571FAE}"/>
+                      <a16:creationId xmlns:a16="http://schemas.microsoft.com/office/drawing/2014/main" id="{72988D4B-99B3-5348-ADEE-906E3D77AD68}"/>
                     </a:ext>
                   </a:extLst>
                 </p:cNvPr>
@@ -3489,88 +4790,37 @@
               </p:nvSpPr>
               <p:spPr>
                 <a:xfrm>
-                  <a:off x="2364222" y="4486765"/>
-                  <a:ext cx="1197764" cy="646331"/>
+                  <a:off x="2133497" y="5457111"/>
+                  <a:ext cx="182880" cy="274320"/>
                 </a:xfrm>
                 <a:prstGeom prst="rect">
                   <a:avLst/>
                 </a:prstGeom>
-                <a:grpFill/>
+                <a:noFill/>
               </p:spPr>
               <p:txBody>
-                <a:bodyPr wrap="none" rtlCol="0">
+                <a:bodyPr wrap="square" lIns="0" tIns="0" rIns="0" bIns="0" rtlCol="0" anchor="ctr">
                   <a:spAutoFit/>
                 </a:bodyPr>
                 <a:lstStyle/>
                 <a:p>
+                  <a:pPr algn="ctr"/>
                   <a:r>
-                    <a:rPr lang="en-US" dirty="0">
+                    <a:rPr lang="en-US" i="1" dirty="0">
                       <a:latin typeface="Arial" panose="020B0604020202020204" pitchFamily="34" charset="0"/>
                       <a:cs typeface="Arial" panose="020B0604020202020204" pitchFamily="34" charset="0"/>
                     </a:rPr>
-                    <a:t>Extension</a:t>
-                  </a:r>
-                </a:p>
-                <a:p>
-                  <a:r>
-                    <a:rPr lang="en-US" dirty="0">
-                      <a:latin typeface="Arial" panose="020B0604020202020204" pitchFamily="34" charset="0"/>
-                      <a:cs typeface="Arial" panose="020B0604020202020204" pitchFamily="34" charset="0"/>
-                    </a:rPr>
-                    <a:t>springs</a:t>
+                    <a:t>z</a:t>
                   </a:r>
                 </a:p>
               </p:txBody>
             </p:sp>
-            <p:cxnSp>
-              <p:nvCxnSpPr>
-                <p:cNvPr id="14" name="Straight Arrow Connector 13">
+            <p:sp>
+              <p:nvSpPr>
+                <p:cNvPr id="38" name="TextBox 37">
                   <a:extLst>
                     <a:ext uri="{FF2B5EF4-FFF2-40B4-BE49-F238E27FC236}">
-                      <a16:creationId xmlns:a16="http://schemas.microsoft.com/office/drawing/2014/main" id="{E0F818B4-0AEB-3148-8FF2-0C347D0C03DA}"/>
-                    </a:ext>
-                  </a:extLst>
-                </p:cNvPr>
-                <p:cNvCxnSpPr>
-                  <a:cxnSpLocks/>
-                  <a:stCxn id="12" idx="3"/>
-                </p:cNvCxnSpPr>
-                <p:nvPr/>
-              </p:nvCxnSpPr>
-              <p:spPr>
-                <a:xfrm flipV="1">
-                  <a:off x="3561986" y="4570375"/>
-                  <a:ext cx="844838" cy="239556"/>
-                </a:xfrm>
-                <a:prstGeom prst="straightConnector1">
-                  <a:avLst/>
-                </a:prstGeom>
-                <a:grpFill/>
-                <a:ln>
-                  <a:tailEnd type="triangle"/>
-                </a:ln>
-              </p:spPr>
-              <p:style>
-                <a:lnRef idx="1">
-                  <a:schemeClr val="dk1"/>
-                </a:lnRef>
-                <a:fillRef idx="0">
-                  <a:schemeClr val="dk1"/>
-                </a:fillRef>
-                <a:effectRef idx="0">
-                  <a:schemeClr val="dk1"/>
-                </a:effectRef>
-                <a:fontRef idx="minor">
-                  <a:schemeClr val="tx1"/>
-                </a:fontRef>
-              </p:style>
-            </p:cxnSp>
-            <p:sp>
-              <p:nvSpPr>
-                <p:cNvPr id="19" name="TextBox 18">
-                  <a:extLst>
-                    <a:ext uri="{FF2B5EF4-FFF2-40B4-BE49-F238E27FC236}">
-                      <a16:creationId xmlns:a16="http://schemas.microsoft.com/office/drawing/2014/main" id="{6B848C65-49E3-D544-96FB-B88DBF8AE3D5}"/>
+                      <a16:creationId xmlns:a16="http://schemas.microsoft.com/office/drawing/2014/main" id="{7A7A83AB-77C8-0D4B-91E9-593B978A361C}"/>
                     </a:ext>
                   </a:extLst>
                 </p:cNvPr>
@@ -3579,79 +4829,37 @@
               </p:nvSpPr>
               <p:spPr>
                 <a:xfrm>
-                  <a:off x="3221266" y="6050086"/>
-                  <a:ext cx="1236236" cy="369332"/>
+                  <a:off x="2608646" y="5605643"/>
+                  <a:ext cx="182880" cy="274320"/>
                 </a:xfrm>
                 <a:prstGeom prst="rect">
                   <a:avLst/>
                 </a:prstGeom>
-                <a:grpFill/>
+                <a:noFill/>
               </p:spPr>
               <p:txBody>
-                <a:bodyPr wrap="none" rtlCol="0">
+                <a:bodyPr wrap="square" lIns="0" tIns="0" rIns="0" bIns="0" rtlCol="0" anchor="ctr">
                   <a:spAutoFit/>
                 </a:bodyPr>
                 <a:lstStyle/>
                 <a:p>
+                  <a:pPr algn="ctr"/>
                   <a:r>
-                    <a:rPr lang="en-US" dirty="0">
+                    <a:rPr lang="en-US" i="1" dirty="0">
                       <a:latin typeface="Arial" panose="020B0604020202020204" pitchFamily="34" charset="0"/>
                       <a:cs typeface="Arial" panose="020B0604020202020204" pitchFamily="34" charset="0"/>
                     </a:rPr>
-                    <a:t>Rear pivot</a:t>
+                    <a:t>x</a:t>
                   </a:r>
                 </a:p>
               </p:txBody>
             </p:sp>
-            <p:cxnSp>
-              <p:nvCxnSpPr>
-                <p:cNvPr id="20" name="Straight Arrow Connector 19">
+            <p:sp>
+              <p:nvSpPr>
+                <p:cNvPr id="42" name="TextBox 41">
                   <a:extLst>
                     <a:ext uri="{FF2B5EF4-FFF2-40B4-BE49-F238E27FC236}">
-                      <a16:creationId xmlns:a16="http://schemas.microsoft.com/office/drawing/2014/main" id="{28F69CA5-DF22-A146-A87F-4285138FE14E}"/>
-                    </a:ext>
-                  </a:extLst>
-                </p:cNvPr>
-                <p:cNvCxnSpPr>
-                  <a:cxnSpLocks/>
-                  <a:stCxn id="19" idx="3"/>
-                </p:cNvCxnSpPr>
-                <p:nvPr/>
-              </p:nvCxnSpPr>
-              <p:spPr>
-                <a:xfrm flipV="1">
-                  <a:off x="4457502" y="6135369"/>
-                  <a:ext cx="1350632" cy="99383"/>
-                </a:xfrm>
-                <a:prstGeom prst="straightConnector1">
-                  <a:avLst/>
-                </a:prstGeom>
-                <a:grpFill/>
-                <a:ln>
-                  <a:tailEnd type="triangle"/>
-                </a:ln>
-              </p:spPr>
-              <p:style>
-                <a:lnRef idx="1">
-                  <a:schemeClr val="dk1"/>
-                </a:lnRef>
-                <a:fillRef idx="0">
-                  <a:schemeClr val="dk1"/>
-                </a:fillRef>
-                <a:effectRef idx="0">
-                  <a:schemeClr val="dk1"/>
-                </a:effectRef>
-                <a:fontRef idx="minor">
-                  <a:schemeClr val="tx1"/>
-                </a:fontRef>
-              </p:style>
-            </p:cxnSp>
-            <p:sp>
-              <p:nvSpPr>
-                <p:cNvPr id="22" name="TextBox 21">
-                  <a:extLst>
-                    <a:ext uri="{FF2B5EF4-FFF2-40B4-BE49-F238E27FC236}">
-                      <a16:creationId xmlns:a16="http://schemas.microsoft.com/office/drawing/2014/main" id="{A51D89F4-595D-884A-8871-25F3C418040E}"/>
+                      <a16:creationId xmlns:a16="http://schemas.microsoft.com/office/drawing/2014/main" id="{FBEAA0FA-51F9-B848-B2EF-FF38456D4D6F}"/>
                     </a:ext>
                   </a:extLst>
                 </p:cNvPr>
@@ -3660,931 +4868,312 @@
               </p:nvSpPr>
               <p:spPr>
                 <a:xfrm>
-                  <a:off x="2166440" y="435748"/>
-                  <a:ext cx="2629759" cy="1200329"/>
+                  <a:off x="2858605" y="6398947"/>
+                  <a:ext cx="182880" cy="274320"/>
                 </a:xfrm>
                 <a:prstGeom prst="rect">
                   <a:avLst/>
                 </a:prstGeom>
-                <a:grpFill/>
+                <a:noFill/>
               </p:spPr>
               <p:txBody>
-                <a:bodyPr wrap="none" rtlCol="0">
+                <a:bodyPr wrap="square" lIns="0" tIns="0" rIns="0" bIns="0" rtlCol="0" anchor="ctr">
                   <a:spAutoFit/>
                 </a:bodyPr>
                 <a:lstStyle/>
                 <a:p>
+                  <a:pPr algn="ctr"/>
                   <a:r>
-                    <a:rPr lang="en-US" dirty="0">
+                    <a:rPr lang="en-US" i="1" dirty="0">
                       <a:latin typeface="Arial" panose="020B0604020202020204" pitchFamily="34" charset="0"/>
                       <a:cs typeface="Arial" panose="020B0604020202020204" pitchFamily="34" charset="0"/>
                     </a:rPr>
-                    <a:t>Friction cord </a:t>
-                  </a:r>
-                </a:p>
-                <a:p>
-                  <a:r>
-                    <a:rPr lang="en-US" dirty="0">
-                      <a:latin typeface="Arial" panose="020B0604020202020204" pitchFamily="34" charset="0"/>
-                      <a:cs typeface="Arial" panose="020B0604020202020204" pitchFamily="34" charset="0"/>
-                    </a:rPr>
-                    <a:t>attached to </a:t>
-                  </a:r>
-                </a:p>
-                <a:p>
-                  <a:r>
-                    <a:rPr lang="en-US" dirty="0">
-                      <a:latin typeface="Arial" panose="020B0604020202020204" pitchFamily="34" charset="0"/>
-                      <a:cs typeface="Arial" panose="020B0604020202020204" pitchFamily="34" charset="0"/>
-                    </a:rPr>
-                    <a:t>hanging weight </a:t>
-                  </a:r>
-                </a:p>
-                <a:p>
-                  <a:r>
-                    <a:rPr lang="en-US" dirty="0">
-                      <a:latin typeface="Arial" panose="020B0604020202020204" pitchFamily="34" charset="0"/>
-                      <a:cs typeface="Arial" panose="020B0604020202020204" pitchFamily="34" charset="0"/>
-                    </a:rPr>
-                    <a:t>via wall-mounted pulley</a:t>
+                    <a:t>y</a:t>
                   </a:r>
                 </a:p>
               </p:txBody>
             </p:sp>
-            <p:cxnSp>
-              <p:nvCxnSpPr>
-                <p:cNvPr id="23" name="Straight Arrow Connector 22">
-                  <a:extLst>
-                    <a:ext uri="{FF2B5EF4-FFF2-40B4-BE49-F238E27FC236}">
-                      <a16:creationId xmlns:a16="http://schemas.microsoft.com/office/drawing/2014/main" id="{7909AB01-9488-FE46-A5B6-A609FC99D901}"/>
-                    </a:ext>
-                  </a:extLst>
-                </p:cNvPr>
-                <p:cNvCxnSpPr>
-                  <a:cxnSpLocks/>
-                  <a:stCxn id="22" idx="2"/>
-                  <a:endCxn id="9" idx="0"/>
-                </p:cNvCxnSpPr>
-                <p:nvPr/>
-              </p:nvCxnSpPr>
-              <p:spPr>
-                <a:xfrm flipH="1">
-                  <a:off x="3328550" y="1636077"/>
-                  <a:ext cx="152770" cy="706585"/>
-                </a:xfrm>
-                <a:prstGeom prst="straightConnector1">
-                  <a:avLst/>
-                </a:prstGeom>
-                <a:grpFill/>
-                <a:ln>
-                  <a:tailEnd type="triangle"/>
-                </a:ln>
-              </p:spPr>
-              <p:style>
-                <a:lnRef idx="1">
-                  <a:schemeClr val="dk1"/>
-                </a:lnRef>
-                <a:fillRef idx="0">
-                  <a:schemeClr val="dk1"/>
-                </a:fillRef>
-                <a:effectRef idx="0">
-                  <a:schemeClr val="dk1"/>
-                </a:effectRef>
-                <a:fontRef idx="minor">
-                  <a:schemeClr val="tx1"/>
-                </a:fontRef>
-              </p:style>
-            </p:cxnSp>
-            <p:sp>
-              <p:nvSpPr>
-                <p:cNvPr id="31" name="TextBox 30">
-                  <a:extLst>
-                    <a:ext uri="{FF2B5EF4-FFF2-40B4-BE49-F238E27FC236}">
-                      <a16:creationId xmlns:a16="http://schemas.microsoft.com/office/drawing/2014/main" id="{08F49B01-6AA3-B04B-8249-AB5F362EEECD}"/>
-                    </a:ext>
-                  </a:extLst>
-                </p:cNvPr>
-                <p:cNvSpPr txBox="1"/>
-                <p:nvPr/>
-              </p:nvSpPr>
-              <p:spPr>
-                <a:xfrm>
-                  <a:off x="3321935" y="2830520"/>
-                  <a:ext cx="1095172" cy="369332"/>
-                </a:xfrm>
-                <a:prstGeom prst="rect">
-                  <a:avLst/>
-                </a:prstGeom>
-                <a:grpFill/>
-              </p:spPr>
-              <p:txBody>
-                <a:bodyPr wrap="none" rtlCol="0">
-                  <a:spAutoFit/>
-                </a:bodyPr>
-                <a:lstStyle/>
-                <a:p>
-                  <a:r>
-                    <a:rPr lang="en-US" dirty="0">
-                      <a:latin typeface="Arial" panose="020B0604020202020204" pitchFamily="34" charset="0"/>
-                      <a:cs typeface="Arial" panose="020B0604020202020204" pitchFamily="34" charset="0"/>
-                    </a:rPr>
-                    <a:t>Flywheel</a:t>
-                  </a:r>
-                </a:p>
-              </p:txBody>
-            </p:sp>
-            <p:cxnSp>
-              <p:nvCxnSpPr>
-                <p:cNvPr id="32" name="Straight Arrow Connector 31">
-                  <a:extLst>
-                    <a:ext uri="{FF2B5EF4-FFF2-40B4-BE49-F238E27FC236}">
-                      <a16:creationId xmlns:a16="http://schemas.microsoft.com/office/drawing/2014/main" id="{6D86F9CA-5D41-9240-9292-6CB71D6922FB}"/>
-                    </a:ext>
-                  </a:extLst>
-                </p:cNvPr>
-                <p:cNvCxnSpPr>
-                  <a:cxnSpLocks/>
-                  <a:stCxn id="31" idx="3"/>
-                </p:cNvCxnSpPr>
-                <p:nvPr/>
-              </p:nvCxnSpPr>
-              <p:spPr>
-                <a:xfrm>
-                  <a:off x="4417107" y="3015186"/>
-                  <a:ext cx="1093044" cy="311565"/>
-                </a:xfrm>
-                <a:prstGeom prst="straightConnector1">
-                  <a:avLst/>
-                </a:prstGeom>
-                <a:grpFill/>
-                <a:ln>
-                  <a:tailEnd type="triangle"/>
-                </a:ln>
-              </p:spPr>
-              <p:style>
-                <a:lnRef idx="1">
-                  <a:schemeClr val="dk1"/>
-                </a:lnRef>
-                <a:fillRef idx="0">
-                  <a:schemeClr val="dk1"/>
-                </a:fillRef>
-                <a:effectRef idx="0">
-                  <a:schemeClr val="dk1"/>
-                </a:effectRef>
-                <a:fontRef idx="minor">
-                  <a:schemeClr val="tx1"/>
-                </a:fontRef>
-              </p:style>
-            </p:cxnSp>
-            <p:sp>
-              <p:nvSpPr>
-                <p:cNvPr id="35" name="TextBox 34">
-                  <a:extLst>
-                    <a:ext uri="{FF2B5EF4-FFF2-40B4-BE49-F238E27FC236}">
-                      <a16:creationId xmlns:a16="http://schemas.microsoft.com/office/drawing/2014/main" id="{9B2EF17C-6AC2-4046-913E-AD74CFF6FF2A}"/>
-                    </a:ext>
-                  </a:extLst>
-                </p:cNvPr>
-                <p:cNvSpPr txBox="1"/>
-                <p:nvPr/>
-              </p:nvSpPr>
-              <p:spPr>
-                <a:xfrm>
-                  <a:off x="8255931" y="3292592"/>
-                  <a:ext cx="1428596" cy="369332"/>
-                </a:xfrm>
-                <a:prstGeom prst="rect">
-                  <a:avLst/>
-                </a:prstGeom>
-                <a:grpFill/>
-              </p:spPr>
-              <p:txBody>
-                <a:bodyPr wrap="none" rtlCol="0">
-                  <a:spAutoFit/>
-                </a:bodyPr>
-                <a:lstStyle/>
-                <a:p>
-                  <a:r>
-                    <a:rPr lang="en-US" dirty="0" err="1">
-                      <a:latin typeface="Arial" panose="020B0604020202020204" pitchFamily="34" charset="0"/>
-                      <a:cs typeface="Arial" panose="020B0604020202020204" pitchFamily="34" charset="0"/>
-                    </a:rPr>
-                    <a:t>Powermeter</a:t>
-                  </a:r>
-                  <a:endParaRPr lang="en-US" dirty="0">
+          </p:grpSp>
+          <p:sp>
+            <p:nvSpPr>
+              <p:cNvPr id="45" name="TextBox 44">
+                <a:extLst>
+                  <a:ext uri="{FF2B5EF4-FFF2-40B4-BE49-F238E27FC236}">
+                    <a16:creationId xmlns:a16="http://schemas.microsoft.com/office/drawing/2014/main" id="{581422EC-5BBA-604D-B171-7FB42C654154}"/>
+                  </a:ext>
+                </a:extLst>
+              </p:cNvPr>
+              <p:cNvSpPr txBox="1"/>
+              <p:nvPr/>
+            </p:nvSpPr>
+            <p:spPr>
+              <a:xfrm rot="540000">
+                <a:off x="4169507" y="2395172"/>
+                <a:ext cx="408153" cy="276999"/>
+              </a:xfrm>
+              <a:prstGeom prst="rect">
+                <a:avLst/>
+              </a:prstGeom>
+              <a:noFill/>
+            </p:spPr>
+            <p:txBody>
+              <a:bodyPr wrap="square" lIns="0" tIns="0" rIns="0" bIns="0" rtlCol="0" anchor="ctr">
+                <a:spAutoFit/>
+              </a:bodyPr>
+              <a:lstStyle/>
+              <a:p>
+                <a:pPr algn="ctr"/>
+                <a:r>
+                  <a:rPr lang="en-US" i="1" dirty="0">
                     <a:latin typeface="Arial" panose="020B0604020202020204" pitchFamily="34" charset="0"/>
                     <a:cs typeface="Arial" panose="020B0604020202020204" pitchFamily="34" charset="0"/>
-                  </a:endParaRPr>
-                </a:p>
-              </p:txBody>
-            </p:sp>
-            <p:cxnSp>
-              <p:nvCxnSpPr>
-                <p:cNvPr id="36" name="Straight Arrow Connector 35">
-                  <a:extLst>
-                    <a:ext uri="{FF2B5EF4-FFF2-40B4-BE49-F238E27FC236}">
-                      <a16:creationId xmlns:a16="http://schemas.microsoft.com/office/drawing/2014/main" id="{8749F783-6602-4941-B723-08B1E100693D}"/>
-                    </a:ext>
-                  </a:extLst>
-                </p:cNvPr>
-                <p:cNvCxnSpPr>
-                  <a:cxnSpLocks/>
-                  <a:stCxn id="35" idx="1"/>
-                </p:cNvCxnSpPr>
-                <p:nvPr/>
-              </p:nvCxnSpPr>
-              <p:spPr>
-                <a:xfrm flipH="1">
-                  <a:off x="6885223" y="3477258"/>
-                  <a:ext cx="1370708" cy="369332"/>
-                </a:xfrm>
-                <a:prstGeom prst="straightConnector1">
-                  <a:avLst/>
-                </a:prstGeom>
-                <a:grpFill/>
-                <a:ln>
-                  <a:tailEnd type="triangle"/>
-                </a:ln>
-              </p:spPr>
-              <p:style>
-                <a:lnRef idx="1">
-                  <a:schemeClr val="dk1"/>
-                </a:lnRef>
-                <a:fillRef idx="0">
-                  <a:schemeClr val="dk1"/>
-                </a:fillRef>
-                <a:effectRef idx="0">
-                  <a:schemeClr val="dk1"/>
-                </a:effectRef>
-                <a:fontRef idx="minor">
-                  <a:schemeClr val="tx1"/>
-                </a:fontRef>
-              </p:style>
-            </p:cxnSp>
-            <p:sp>
-              <p:nvSpPr>
-                <p:cNvPr id="39" name="TextBox 38">
-                  <a:extLst>
-                    <a:ext uri="{FF2B5EF4-FFF2-40B4-BE49-F238E27FC236}">
-                      <a16:creationId xmlns:a16="http://schemas.microsoft.com/office/drawing/2014/main" id="{6E77C7CF-18CF-284B-9BC7-20F4BD5D5761}"/>
-                    </a:ext>
-                  </a:extLst>
-                </p:cNvPr>
-                <p:cNvSpPr txBox="1"/>
-                <p:nvPr/>
-              </p:nvSpPr>
-              <p:spPr>
-                <a:xfrm>
-                  <a:off x="7667141" y="2881772"/>
-                  <a:ext cx="607859" cy="369332"/>
-                </a:xfrm>
-                <a:prstGeom prst="rect">
-                  <a:avLst/>
-                </a:prstGeom>
-                <a:grpFill/>
-              </p:spPr>
-              <p:txBody>
-                <a:bodyPr wrap="none" rtlCol="0">
-                  <a:spAutoFit/>
-                </a:bodyPr>
-                <a:lstStyle/>
-                <a:p>
-                  <a:r>
-                    <a:rPr lang="en-US" dirty="0">
-                      <a:latin typeface="Arial" panose="020B0604020202020204" pitchFamily="34" charset="0"/>
-                      <a:cs typeface="Arial" panose="020B0604020202020204" pitchFamily="34" charset="0"/>
-                    </a:rPr>
-                    <a:t>IMU</a:t>
-                  </a:r>
-                </a:p>
-              </p:txBody>
-            </p:sp>
-            <p:cxnSp>
-              <p:nvCxnSpPr>
-                <p:cNvPr id="40" name="Straight Arrow Connector 39">
-                  <a:extLst>
-                    <a:ext uri="{FF2B5EF4-FFF2-40B4-BE49-F238E27FC236}">
-                      <a16:creationId xmlns:a16="http://schemas.microsoft.com/office/drawing/2014/main" id="{5B02735B-6E44-4642-8D64-94B5B810CA9A}"/>
-                    </a:ext>
-                  </a:extLst>
-                </p:cNvPr>
-                <p:cNvCxnSpPr>
-                  <a:cxnSpLocks/>
-                  <a:stCxn id="39" idx="1"/>
-                </p:cNvCxnSpPr>
-                <p:nvPr/>
-              </p:nvCxnSpPr>
-              <p:spPr>
-                <a:xfrm flipH="1">
-                  <a:off x="6703033" y="3066438"/>
-                  <a:ext cx="964108" cy="392835"/>
-                </a:xfrm>
-                <a:prstGeom prst="straightConnector1">
-                  <a:avLst/>
-                </a:prstGeom>
-                <a:grpFill/>
-                <a:ln>
-                  <a:tailEnd type="triangle"/>
-                </a:ln>
-              </p:spPr>
-              <p:style>
-                <a:lnRef idx="1">
-                  <a:schemeClr val="dk1"/>
-                </a:lnRef>
-                <a:fillRef idx="0">
-                  <a:schemeClr val="dk1"/>
-                </a:fillRef>
-                <a:effectRef idx="0">
-                  <a:schemeClr val="dk1"/>
-                </a:effectRef>
-                <a:fontRef idx="minor">
-                  <a:schemeClr val="tx1"/>
-                </a:fontRef>
-              </p:style>
-            </p:cxnSp>
-            <p:sp>
-              <p:nvSpPr>
-                <p:cNvPr id="43" name="TextBox 42">
-                  <a:extLst>
-                    <a:ext uri="{FF2B5EF4-FFF2-40B4-BE49-F238E27FC236}">
-                      <a16:creationId xmlns:a16="http://schemas.microsoft.com/office/drawing/2014/main" id="{C00C2080-FDCC-E440-9975-060B321398DD}"/>
-                    </a:ext>
-                  </a:extLst>
-                </p:cNvPr>
-                <p:cNvSpPr txBox="1"/>
-                <p:nvPr/>
-              </p:nvSpPr>
-              <p:spPr>
-                <a:xfrm>
-                  <a:off x="8539000" y="3984709"/>
-                  <a:ext cx="1274708" cy="369332"/>
-                </a:xfrm>
-                <a:prstGeom prst="rect">
-                  <a:avLst/>
-                </a:prstGeom>
-                <a:grpFill/>
-              </p:spPr>
-              <p:txBody>
-                <a:bodyPr wrap="none" rtlCol="0">
-                  <a:spAutoFit/>
-                </a:bodyPr>
-                <a:lstStyle/>
-                <a:p>
-                  <a:r>
-                    <a:rPr lang="en-US" dirty="0">
-                      <a:latin typeface="Arial" panose="020B0604020202020204" pitchFamily="34" charset="0"/>
-                      <a:cs typeface="Arial" panose="020B0604020202020204" pitchFamily="34" charset="0"/>
-                    </a:rPr>
-                    <a:t>Front pivot</a:t>
-                  </a:r>
-                </a:p>
-              </p:txBody>
-            </p:sp>
-            <p:cxnSp>
-              <p:nvCxnSpPr>
-                <p:cNvPr id="44" name="Straight Arrow Connector 43">
-                  <a:extLst>
-                    <a:ext uri="{FF2B5EF4-FFF2-40B4-BE49-F238E27FC236}">
-                      <a16:creationId xmlns:a16="http://schemas.microsoft.com/office/drawing/2014/main" id="{928E3A06-B6C6-E345-86FC-8855662CC835}"/>
-                    </a:ext>
-                  </a:extLst>
-                </p:cNvPr>
-                <p:cNvCxnSpPr>
-                  <a:cxnSpLocks/>
-                  <a:stCxn id="43" idx="1"/>
-                </p:cNvCxnSpPr>
-                <p:nvPr/>
-              </p:nvCxnSpPr>
-              <p:spPr>
-                <a:xfrm flipH="1">
-                  <a:off x="7197739" y="4169375"/>
-                  <a:ext cx="1341261" cy="438251"/>
-                </a:xfrm>
-                <a:prstGeom prst="straightConnector1">
-                  <a:avLst/>
-                </a:prstGeom>
-                <a:grpFill/>
-                <a:ln>
-                  <a:tailEnd type="triangle"/>
-                </a:ln>
-              </p:spPr>
-              <p:style>
-                <a:lnRef idx="1">
-                  <a:schemeClr val="dk1"/>
-                </a:lnRef>
-                <a:fillRef idx="0">
-                  <a:schemeClr val="dk1"/>
-                </a:fillRef>
-                <a:effectRef idx="0">
-                  <a:schemeClr val="dk1"/>
-                </a:effectRef>
-                <a:fontRef idx="minor">
-                  <a:schemeClr val="tx1"/>
-                </a:fontRef>
-              </p:style>
-            </p:cxnSp>
-            <p:sp>
-              <p:nvSpPr>
-                <p:cNvPr id="49" name="TextBox 48">
-                  <a:extLst>
-                    <a:ext uri="{FF2B5EF4-FFF2-40B4-BE49-F238E27FC236}">
-                      <a16:creationId xmlns:a16="http://schemas.microsoft.com/office/drawing/2014/main" id="{6D081479-574B-BB4A-AFD0-3B0DB51117F5}"/>
-                    </a:ext>
-                  </a:extLst>
-                </p:cNvPr>
-                <p:cNvSpPr txBox="1"/>
-                <p:nvPr/>
-              </p:nvSpPr>
-              <p:spPr>
-                <a:xfrm>
-                  <a:off x="8397251" y="5481713"/>
-                  <a:ext cx="1326004" cy="646331"/>
-                </a:xfrm>
-                <a:prstGeom prst="rect">
-                  <a:avLst/>
-                </a:prstGeom>
-                <a:grpFill/>
-              </p:spPr>
-              <p:txBody>
-                <a:bodyPr wrap="none" rtlCol="0">
-                  <a:spAutoFit/>
-                </a:bodyPr>
-                <a:lstStyle/>
-                <a:p>
-                  <a:r>
-                    <a:rPr lang="en-US" dirty="0">
-                      <a:latin typeface="Arial" panose="020B0604020202020204" pitchFamily="34" charset="0"/>
-                      <a:cs typeface="Arial" panose="020B0604020202020204" pitchFamily="34" charset="0"/>
-                    </a:rPr>
-                    <a:t>Ergometer </a:t>
-                  </a:r>
-                </a:p>
-                <a:p>
-                  <a:r>
-                    <a:rPr lang="en-US" dirty="0">
-                      <a:latin typeface="Arial" panose="020B0604020202020204" pitchFamily="34" charset="0"/>
-                      <a:cs typeface="Arial" panose="020B0604020202020204" pitchFamily="34" charset="0"/>
-                    </a:rPr>
-                    <a:t>frame</a:t>
-                  </a:r>
-                </a:p>
-              </p:txBody>
-            </p:sp>
-            <p:cxnSp>
-              <p:nvCxnSpPr>
-                <p:cNvPr id="53" name="Straight Arrow Connector 52">
-                  <a:extLst>
-                    <a:ext uri="{FF2B5EF4-FFF2-40B4-BE49-F238E27FC236}">
-                      <a16:creationId xmlns:a16="http://schemas.microsoft.com/office/drawing/2014/main" id="{898566B5-7BE5-AD48-94C4-29660FA1E5BD}"/>
-                    </a:ext>
-                  </a:extLst>
-                </p:cNvPr>
-                <p:cNvCxnSpPr>
-                  <a:cxnSpLocks/>
-                  <a:stCxn id="49" idx="1"/>
-                </p:cNvCxnSpPr>
-                <p:nvPr/>
-              </p:nvCxnSpPr>
-              <p:spPr>
-                <a:xfrm flipH="1" flipV="1">
-                  <a:off x="6163735" y="5115077"/>
-                  <a:ext cx="2233516" cy="689802"/>
-                </a:xfrm>
-                <a:prstGeom prst="straightConnector1">
-                  <a:avLst/>
-                </a:prstGeom>
-                <a:grpFill/>
-                <a:ln>
-                  <a:tailEnd type="triangle"/>
-                </a:ln>
-              </p:spPr>
-              <p:style>
-                <a:lnRef idx="1">
-                  <a:schemeClr val="dk1"/>
-                </a:lnRef>
-                <a:fillRef idx="0">
-                  <a:schemeClr val="dk1"/>
-                </a:fillRef>
-                <a:effectRef idx="0">
-                  <a:schemeClr val="dk1"/>
-                </a:effectRef>
-                <a:fontRef idx="minor">
-                  <a:schemeClr val="tx1"/>
-                </a:fontRef>
-              </p:style>
-            </p:cxnSp>
-          </p:grpSp>
+                  </a:rPr>
+                  <a:t>3 m</a:t>
+                </a:r>
+              </a:p>
+            </p:txBody>
+          </p:sp>
+          <p:cxnSp>
+            <p:nvCxnSpPr>
+              <p:cNvPr id="17" name="Straight Connector 16">
+                <a:extLst>
+                  <a:ext uri="{FF2B5EF4-FFF2-40B4-BE49-F238E27FC236}">
+                    <a16:creationId xmlns:a16="http://schemas.microsoft.com/office/drawing/2014/main" id="{64837C67-C126-4E4B-90AD-BD6F212C4E42}"/>
+                  </a:ext>
+                </a:extLst>
+              </p:cNvPr>
+              <p:cNvCxnSpPr>
+                <a:cxnSpLocks/>
+                <a:stCxn id="45" idx="3"/>
+              </p:cNvCxnSpPr>
+              <p:nvPr/>
+            </p:nvCxnSpPr>
+            <p:spPr>
+              <a:xfrm>
+                <a:off x="4575147" y="2565597"/>
+                <a:ext cx="1298293" cy="202782"/>
+              </a:xfrm>
+              <a:prstGeom prst="line">
+                <a:avLst/>
+              </a:prstGeom>
+            </p:spPr>
+            <p:style>
+              <a:lnRef idx="1">
+                <a:schemeClr val="dk1"/>
+              </a:lnRef>
+              <a:fillRef idx="0">
+                <a:schemeClr val="dk1"/>
+              </a:fillRef>
+              <a:effectRef idx="0">
+                <a:schemeClr val="dk1"/>
+              </a:effectRef>
+              <a:fontRef idx="minor">
+                <a:schemeClr val="tx1"/>
+              </a:fontRef>
+            </p:style>
+          </p:cxnSp>
+          <p:cxnSp>
+            <p:nvCxnSpPr>
+              <p:cNvPr id="46" name="Straight Connector 45">
+                <a:extLst>
+                  <a:ext uri="{FF2B5EF4-FFF2-40B4-BE49-F238E27FC236}">
+                    <a16:creationId xmlns:a16="http://schemas.microsoft.com/office/drawing/2014/main" id="{5C3A92D2-AE46-1042-9889-22D672C84ACF}"/>
+                  </a:ext>
+                </a:extLst>
+              </p:cNvPr>
+              <p:cNvCxnSpPr>
+                <a:cxnSpLocks/>
+                <a:endCxn id="45" idx="1"/>
+              </p:cNvCxnSpPr>
+              <p:nvPr/>
+            </p:nvCxnSpPr>
+            <p:spPr>
+              <a:xfrm>
+                <a:off x="2891392" y="2295610"/>
+                <a:ext cx="1280627" cy="206137"/>
+              </a:xfrm>
+              <a:prstGeom prst="line">
+                <a:avLst/>
+              </a:prstGeom>
+            </p:spPr>
+            <p:style>
+              <a:lnRef idx="1">
+                <a:schemeClr val="dk1"/>
+              </a:lnRef>
+              <a:fillRef idx="0">
+                <a:schemeClr val="dk1"/>
+              </a:fillRef>
+              <a:effectRef idx="0">
+                <a:schemeClr val="dk1"/>
+              </a:effectRef>
+              <a:fontRef idx="minor">
+                <a:schemeClr val="tx1"/>
+              </a:fontRef>
+            </p:style>
+          </p:cxnSp>
+          <p:cxnSp>
+            <p:nvCxnSpPr>
+              <p:cNvPr id="51" name="Straight Connector 50">
+                <a:extLst>
+                  <a:ext uri="{FF2B5EF4-FFF2-40B4-BE49-F238E27FC236}">
+                    <a16:creationId xmlns:a16="http://schemas.microsoft.com/office/drawing/2014/main" id="{7E912C93-04BF-D341-8814-54EE1584C9B7}"/>
+                  </a:ext>
+                </a:extLst>
+              </p:cNvPr>
+              <p:cNvCxnSpPr>
+                <a:cxnSpLocks/>
+              </p:cNvCxnSpPr>
+              <p:nvPr/>
+            </p:nvCxnSpPr>
+            <p:spPr>
+              <a:xfrm rot="21300000" flipH="1">
+                <a:off x="2880851" y="2247041"/>
+                <a:ext cx="27432" cy="91440"/>
+              </a:xfrm>
+              <a:prstGeom prst="line">
+                <a:avLst/>
+              </a:prstGeom>
+            </p:spPr>
+            <p:style>
+              <a:lnRef idx="1">
+                <a:schemeClr val="dk1"/>
+              </a:lnRef>
+              <a:fillRef idx="0">
+                <a:schemeClr val="dk1"/>
+              </a:fillRef>
+              <a:effectRef idx="0">
+                <a:schemeClr val="dk1"/>
+              </a:effectRef>
+              <a:fontRef idx="minor">
+                <a:schemeClr val="tx1"/>
+              </a:fontRef>
+            </p:style>
+          </p:cxnSp>
+          <p:cxnSp>
+            <p:nvCxnSpPr>
+              <p:cNvPr id="57" name="Straight Connector 56">
+                <a:extLst>
+                  <a:ext uri="{FF2B5EF4-FFF2-40B4-BE49-F238E27FC236}">
+                    <a16:creationId xmlns:a16="http://schemas.microsoft.com/office/drawing/2014/main" id="{6A80E704-0965-E940-8542-AAA6C2CF756E}"/>
+                  </a:ext>
+                </a:extLst>
+              </p:cNvPr>
+              <p:cNvCxnSpPr>
+                <a:cxnSpLocks/>
+              </p:cNvCxnSpPr>
+              <p:nvPr/>
+            </p:nvCxnSpPr>
+            <p:spPr>
+              <a:xfrm rot="21300000" flipH="1">
+                <a:off x="5857950" y="2722660"/>
+                <a:ext cx="27432" cy="91440"/>
+              </a:xfrm>
+              <a:prstGeom prst="line">
+                <a:avLst/>
+              </a:prstGeom>
+            </p:spPr>
+            <p:style>
+              <a:lnRef idx="1">
+                <a:schemeClr val="dk1"/>
+              </a:lnRef>
+              <a:fillRef idx="0">
+                <a:schemeClr val="dk1"/>
+              </a:fillRef>
+              <a:effectRef idx="0">
+                <a:schemeClr val="dk1"/>
+              </a:effectRef>
+              <a:fontRef idx="minor">
+                <a:schemeClr val="tx1"/>
+              </a:fontRef>
+            </p:style>
+          </p:cxnSp>
         </p:grpSp>
-        <p:sp>
-          <p:nvSpPr>
-            <p:cNvPr id="2" name="Oval 1">
+        <p:cxnSp>
+          <p:nvCxnSpPr>
+            <p:cNvPr id="72" name="Straight Connector 71">
               <a:extLst>
                 <a:ext uri="{FF2B5EF4-FFF2-40B4-BE49-F238E27FC236}">
-                  <a16:creationId xmlns:a16="http://schemas.microsoft.com/office/drawing/2014/main" id="{FA4453CB-3335-354A-A6D5-D3BF14347C8C}"/>
+                  <a16:creationId xmlns:a16="http://schemas.microsoft.com/office/drawing/2014/main" id="{C5D2854F-348D-EA42-A777-E10EA4AAA610}"/>
                 </a:ext>
               </a:extLst>
             </p:cNvPr>
-            <p:cNvSpPr/>
+            <p:cNvCxnSpPr>
+              <a:cxnSpLocks/>
+            </p:cNvCxnSpPr>
             <p:nvPr/>
-          </p:nvSpPr>
+          </p:nvCxnSpPr>
           <p:spPr>
-            <a:xfrm>
-              <a:off x="5765800" y="6089650"/>
-              <a:ext cx="45719" cy="45719"/>
+            <a:xfrm rot="2160000" flipH="1">
+              <a:off x="3019985" y="2469508"/>
+              <a:ext cx="0" cy="109728"/>
             </a:xfrm>
-            <a:prstGeom prst="ellipse">
+            <a:prstGeom prst="line">
               <a:avLst/>
             </a:prstGeom>
-            <a:solidFill>
-              <a:schemeClr val="tx1"/>
-            </a:solidFill>
-            <a:ln>
+            <a:ln w="38100" cmpd="dbl">
               <a:solidFill>
                 <a:schemeClr val="tx1"/>
               </a:solidFill>
             </a:ln>
           </p:spPr>
           <p:style>
-            <a:lnRef idx="2">
-              <a:schemeClr val="dk1">
-                <a:shade val="50000"/>
-              </a:schemeClr>
+            <a:lnRef idx="1">
+              <a:schemeClr val="accent1"/>
             </a:lnRef>
-            <a:fillRef idx="1">
-              <a:schemeClr val="dk1"/>
+            <a:fillRef idx="0">
+              <a:schemeClr val="accent1"/>
             </a:fillRef>
             <a:effectRef idx="0">
-              <a:schemeClr val="dk1"/>
+              <a:schemeClr val="accent1"/>
             </a:effectRef>
             <a:fontRef idx="minor">
-              <a:schemeClr val="lt1"/>
+              <a:schemeClr val="tx1"/>
             </a:fontRef>
           </p:style>
-          <p:txBody>
-            <a:bodyPr rtlCol="0" anchor="ctr"/>
-            <a:lstStyle/>
-            <a:p>
-              <a:pPr algn="ctr"/>
-              <a:endParaRPr lang="en-US"/>
-            </a:p>
-          </p:txBody>
-        </p:sp>
-        <p:sp>
-          <p:nvSpPr>
-            <p:cNvPr id="5" name="Can 4">
+        </p:cxnSp>
+        <p:cxnSp>
+          <p:nvCxnSpPr>
+            <p:cNvPr id="73" name="Straight Connector 72">
               <a:extLst>
                 <a:ext uri="{FF2B5EF4-FFF2-40B4-BE49-F238E27FC236}">
-                  <a16:creationId xmlns:a16="http://schemas.microsoft.com/office/drawing/2014/main" id="{AB3033C5-C6A1-6540-8210-EECC9C88CDE2}"/>
+                  <a16:creationId xmlns:a16="http://schemas.microsoft.com/office/drawing/2014/main" id="{C286F8BB-509A-2E45-AE13-656E35F6E94F}"/>
                 </a:ext>
               </a:extLst>
             </p:cNvPr>
-            <p:cNvSpPr/>
+            <p:cNvCxnSpPr>
+              <a:cxnSpLocks/>
+            </p:cNvCxnSpPr>
             <p:nvPr/>
-          </p:nvSpPr>
+          </p:nvCxnSpPr>
           <p:spPr>
-            <a:xfrm rot="5400000">
-              <a:off x="2386678" y="2595117"/>
-              <a:ext cx="630810" cy="311833"/>
+            <a:xfrm rot="2160000" flipH="1">
+              <a:off x="3019985" y="2259958"/>
+              <a:ext cx="0" cy="109728"/>
             </a:xfrm>
-            <a:prstGeom prst="can">
-              <a:avLst>
-                <a:gd name="adj" fmla="val 50000"/>
-              </a:avLst>
+            <a:prstGeom prst="line">
+              <a:avLst/>
             </a:prstGeom>
-            <a:noFill/>
-            <a:ln w="19050">
+            <a:ln w="38100" cmpd="dbl">
               <a:solidFill>
                 <a:schemeClr val="tx1"/>
               </a:solidFill>
             </a:ln>
           </p:spPr>
           <p:style>
-            <a:lnRef idx="2">
-              <a:schemeClr val="accent1">
-                <a:shade val="50000"/>
-              </a:schemeClr>
+            <a:lnRef idx="1">
+              <a:schemeClr val="accent1"/>
             </a:lnRef>
-            <a:fillRef idx="1">
+            <a:fillRef idx="0">
               <a:schemeClr val="accent1"/>
             </a:fillRef>
             <a:effectRef idx="0">
               <a:schemeClr val="accent1"/>
             </a:effectRef>
             <a:fontRef idx="minor">
-              <a:schemeClr val="lt1"/>
+              <a:schemeClr val="tx1"/>
             </a:fontRef>
           </p:style>
-          <p:txBody>
-            <a:bodyPr rtlCol="0" anchor="ctr"/>
-            <a:lstStyle/>
-            <a:p>
-              <a:pPr algn="ctr"/>
-              <a:endParaRPr lang="en-US"/>
-            </a:p>
-          </p:txBody>
-        </p:sp>
-        <p:sp>
-          <p:nvSpPr>
-            <p:cNvPr id="8" name="Freeform 7">
-              <a:extLst>
-                <a:ext uri="{FF2B5EF4-FFF2-40B4-BE49-F238E27FC236}">
-                  <a16:creationId xmlns:a16="http://schemas.microsoft.com/office/drawing/2014/main" id="{33193548-9B82-7549-A6A6-6AC5DEC75251}"/>
-                </a:ext>
-              </a:extLst>
-            </p:cNvPr>
-            <p:cNvSpPr/>
-            <p:nvPr/>
-          </p:nvSpPr>
-          <p:spPr>
-            <a:xfrm>
-              <a:off x="2623350" y="2377021"/>
-              <a:ext cx="1277318" cy="1228493"/>
-            </a:xfrm>
-            <a:custGeom>
-              <a:avLst/>
-              <a:gdLst>
-                <a:gd name="connsiteX0" fmla="*/ 1277318 w 1277318"/>
-                <a:gd name="connsiteY0" fmla="*/ 76812 h 1228493"/>
-                <a:gd name="connsiteX1" fmla="*/ 241384 w 1277318"/>
-                <a:gd name="connsiteY1" fmla="*/ 7364 h 1228493"/>
-                <a:gd name="connsiteX2" fmla="*/ 15678 w 1277318"/>
-                <a:gd name="connsiteY2" fmla="*/ 233070 h 1228493"/>
-                <a:gd name="connsiteX3" fmla="*/ 21465 w 1277318"/>
-                <a:gd name="connsiteY3" fmla="*/ 771293 h 1228493"/>
-                <a:gd name="connsiteX4" fmla="*/ 38827 w 1277318"/>
-                <a:gd name="connsiteY4" fmla="*/ 1228493 h 1228493"/>
-              </a:gdLst>
-              <a:ahLst/>
-              <a:cxnLst>
-                <a:cxn ang="0">
-                  <a:pos x="connsiteX0" y="connsiteY0"/>
-                </a:cxn>
-                <a:cxn ang="0">
-                  <a:pos x="connsiteX1" y="connsiteY1"/>
-                </a:cxn>
-                <a:cxn ang="0">
-                  <a:pos x="connsiteX2" y="connsiteY2"/>
-                </a:cxn>
-                <a:cxn ang="0">
-                  <a:pos x="connsiteX3" y="connsiteY3"/>
-                </a:cxn>
-                <a:cxn ang="0">
-                  <a:pos x="connsiteX4" y="connsiteY4"/>
-                </a:cxn>
-              </a:cxnLst>
-              <a:rect l="l" t="t" r="r" b="b"/>
-              <a:pathLst>
-                <a:path w="1277318" h="1228493">
-                  <a:moveTo>
-                    <a:pt x="1277318" y="76812"/>
-                  </a:moveTo>
-                  <a:cubicBezTo>
-                    <a:pt x="864487" y="29066"/>
-                    <a:pt x="451657" y="-18679"/>
-                    <a:pt x="241384" y="7364"/>
-                  </a:cubicBezTo>
-                  <a:cubicBezTo>
-                    <a:pt x="31111" y="33407"/>
-                    <a:pt x="52331" y="105749"/>
-                    <a:pt x="15678" y="233070"/>
-                  </a:cubicBezTo>
-                  <a:cubicBezTo>
-                    <a:pt x="-20975" y="360391"/>
-                    <a:pt x="17607" y="605389"/>
-                    <a:pt x="21465" y="771293"/>
-                  </a:cubicBezTo>
-                  <a:cubicBezTo>
-                    <a:pt x="25323" y="937197"/>
-                    <a:pt x="36898" y="1133967"/>
-                    <a:pt x="38827" y="1228493"/>
-                  </a:cubicBezTo>
-                </a:path>
-              </a:pathLst>
-            </a:custGeom>
-            <a:noFill/>
-            <a:ln>
-              <a:solidFill>
-                <a:schemeClr val="tx1"/>
-              </a:solidFill>
-            </a:ln>
-          </p:spPr>
-          <p:style>
-            <a:lnRef idx="2">
-              <a:schemeClr val="accent1">
-                <a:shade val="50000"/>
-              </a:schemeClr>
-            </a:lnRef>
-            <a:fillRef idx="1">
-              <a:schemeClr val="accent1"/>
-            </a:fillRef>
-            <a:effectRef idx="0">
-              <a:schemeClr val="accent1"/>
-            </a:effectRef>
-            <a:fontRef idx="minor">
-              <a:schemeClr val="lt1"/>
-            </a:fontRef>
-          </p:style>
-          <p:txBody>
-            <a:bodyPr rtlCol="0" anchor="ctr"/>
-            <a:lstStyle/>
-            <a:p>
-              <a:pPr algn="ctr"/>
-              <a:endParaRPr lang="en-US"/>
-            </a:p>
-          </p:txBody>
-        </p:sp>
-        <p:pic>
-          <p:nvPicPr>
-            <p:cNvPr id="9" name="Picture 8">
-              <a:extLst>
-                <a:ext uri="{FF2B5EF4-FFF2-40B4-BE49-F238E27FC236}">
-                  <a16:creationId xmlns:a16="http://schemas.microsoft.com/office/drawing/2014/main" id="{55610D85-376A-5F43-B8D4-8708EE1CF17C}"/>
-                </a:ext>
-              </a:extLst>
-            </p:cNvPr>
-            <p:cNvPicPr>
-              <a:picLocks noChangeAspect="1"/>
-            </p:cNvPicPr>
-            <p:nvPr/>
-          </p:nvPicPr>
-          <p:blipFill>
-            <a:blip r:embed="rId3"/>
-            <a:stretch>
-              <a:fillRect/>
-            </a:stretch>
-          </p:blipFill>
-          <p:spPr>
-            <a:xfrm>
-              <a:off x="2619466" y="2342663"/>
-              <a:ext cx="1282700" cy="1244600"/>
-            </a:xfrm>
-            <a:prstGeom prst="rect">
-              <a:avLst/>
-            </a:prstGeom>
-          </p:spPr>
-        </p:pic>
-        <p:sp>
-          <p:nvSpPr>
-            <p:cNvPr id="10" name="Trapezoid 9">
-              <a:extLst>
-                <a:ext uri="{FF2B5EF4-FFF2-40B4-BE49-F238E27FC236}">
-                  <a16:creationId xmlns:a16="http://schemas.microsoft.com/office/drawing/2014/main" id="{6DD0F687-F4FB-0A4C-84B1-F8E887748EA8}"/>
-                </a:ext>
-              </a:extLst>
-            </p:cNvPr>
-            <p:cNvSpPr/>
-            <p:nvPr/>
-          </p:nvSpPr>
-          <p:spPr>
-            <a:xfrm>
-              <a:off x="2427832" y="3599727"/>
-              <a:ext cx="479744" cy="446514"/>
-            </a:xfrm>
-            <a:prstGeom prst="trapezoid">
-              <a:avLst/>
-            </a:prstGeom>
-            <a:noFill/>
-            <a:ln w="19050">
-              <a:solidFill>
-                <a:schemeClr val="tx1"/>
-              </a:solidFill>
-            </a:ln>
-          </p:spPr>
-          <p:style>
-            <a:lnRef idx="2">
-              <a:schemeClr val="accent1">
-                <a:shade val="50000"/>
-              </a:schemeClr>
-            </a:lnRef>
-            <a:fillRef idx="1">
-              <a:schemeClr val="accent1"/>
-            </a:fillRef>
-            <a:effectRef idx="0">
-              <a:schemeClr val="accent1"/>
-            </a:effectRef>
-            <a:fontRef idx="minor">
-              <a:schemeClr val="lt1"/>
-            </a:fontRef>
-          </p:style>
-          <p:txBody>
-            <a:bodyPr rtlCol="0" anchor="ctr"/>
-            <a:lstStyle/>
-            <a:p>
-              <a:pPr algn="ctr"/>
-              <a:endParaRPr lang="en-US" dirty="0">
-                <a:ln>
-                  <a:solidFill>
-                    <a:schemeClr val="tx1"/>
-                  </a:solidFill>
-                </a:ln>
-                <a:solidFill>
-                  <a:schemeClr val="tx1"/>
-                </a:solidFill>
-                <a:latin typeface="Arial" panose="020B0604020202020204" pitchFamily="34" charset="0"/>
-                <a:cs typeface="Arial" panose="020B0604020202020204" pitchFamily="34" charset="0"/>
-              </a:endParaRPr>
-            </a:p>
-          </p:txBody>
-        </p:sp>
-        <p:sp>
-          <p:nvSpPr>
-            <p:cNvPr id="41" name="TextBox 40">
-              <a:extLst>
-                <a:ext uri="{FF2B5EF4-FFF2-40B4-BE49-F238E27FC236}">
-                  <a16:creationId xmlns:a16="http://schemas.microsoft.com/office/drawing/2014/main" id="{9B75EE3A-3EA0-5A43-BD49-93C7CF38A964}"/>
-                </a:ext>
-              </a:extLst>
-            </p:cNvPr>
-            <p:cNvSpPr txBox="1"/>
-            <p:nvPr/>
-          </p:nvSpPr>
-          <p:spPr>
-            <a:xfrm>
-              <a:off x="2575207" y="3708091"/>
-              <a:ext cx="184994" cy="276999"/>
-            </a:xfrm>
-            <a:prstGeom prst="rect">
-              <a:avLst/>
-            </a:prstGeom>
-            <a:solidFill>
-              <a:schemeClr val="bg1"/>
-            </a:solidFill>
-          </p:spPr>
-          <p:txBody>
-            <a:bodyPr wrap="square" lIns="0" tIns="0" rIns="0" bIns="0" rtlCol="0">
-              <a:spAutoFit/>
-            </a:bodyPr>
-            <a:lstStyle/>
-            <a:p>
-              <a:pPr algn="ctr"/>
-              <a:r>
-                <a:rPr lang="en-US" dirty="0" err="1">
-                  <a:latin typeface="Arial" panose="020B0604020202020204" pitchFamily="34" charset="0"/>
-                  <a:cs typeface="Arial" panose="020B0604020202020204" pitchFamily="34" charset="0"/>
-                </a:rPr>
-                <a:t>lb</a:t>
-              </a:r>
-              <a:endParaRPr lang="en-US" sz="1600" dirty="0">
-                <a:latin typeface="Arial" panose="020B0604020202020204" pitchFamily="34" charset="0"/>
-                <a:cs typeface="Arial" panose="020B0604020202020204" pitchFamily="34" charset="0"/>
-              </a:endParaRPr>
-            </a:p>
-          </p:txBody>
-        </p:sp>
-        <p:sp>
-          <p:nvSpPr>
-            <p:cNvPr id="52" name="Oval 51">
-              <a:extLst>
-                <a:ext uri="{FF2B5EF4-FFF2-40B4-BE49-F238E27FC236}">
-                  <a16:creationId xmlns:a16="http://schemas.microsoft.com/office/drawing/2014/main" id="{A7850DC4-63F5-E743-AED9-7186569FAE60}"/>
-                </a:ext>
-              </a:extLst>
-            </p:cNvPr>
-            <p:cNvSpPr/>
-            <p:nvPr/>
-          </p:nvSpPr>
-          <p:spPr>
-            <a:xfrm>
-              <a:off x="7080560" y="4570376"/>
-              <a:ext cx="27432" cy="27432"/>
-            </a:xfrm>
-            <a:prstGeom prst="ellipse">
-              <a:avLst/>
-            </a:prstGeom>
-            <a:solidFill>
-              <a:schemeClr val="tx1"/>
-            </a:solidFill>
-            <a:ln>
-              <a:solidFill>
-                <a:schemeClr val="tx1"/>
-              </a:solidFill>
-            </a:ln>
-          </p:spPr>
-          <p:style>
-            <a:lnRef idx="2">
-              <a:schemeClr val="dk1">
-                <a:shade val="50000"/>
-              </a:schemeClr>
-            </a:lnRef>
-            <a:fillRef idx="1">
-              <a:schemeClr val="dk1"/>
-            </a:fillRef>
-            <a:effectRef idx="0">
-              <a:schemeClr val="dk1"/>
-            </a:effectRef>
-            <a:fontRef idx="minor">
-              <a:schemeClr val="lt1"/>
-            </a:fontRef>
-          </p:style>
-          <p:txBody>
-            <a:bodyPr rtlCol="0" anchor="ctr"/>
-            <a:lstStyle/>
-            <a:p>
-              <a:pPr algn="ctr"/>
-              <a:endParaRPr lang="en-US"/>
-            </a:p>
-          </p:txBody>
-        </p:sp>
+        </p:cxnSp>
       </p:grpSp>
     </p:spTree>
     <p:extLst>

</xml_diff>

<commit_message>
modify lean figure script to include all cycle data
</commit_message>
<xml_diff>
--- a/docs/fig_setup_labelled.pptx
+++ b/docs/fig_setup_labelled.pptx
@@ -3774,10 +3774,10 @@
       </p:grpSpPr>
       <p:grpSp>
         <p:nvGrpSpPr>
-          <p:cNvPr id="27" name="Group 26">
-            <a:extLst>
-              <a:ext uri="{FF2B5EF4-FFF2-40B4-BE49-F238E27FC236}">
-                <a16:creationId xmlns:a16="http://schemas.microsoft.com/office/drawing/2014/main" id="{A1B80B8D-A43F-DD43-BB40-2529156CC9E9}"/>
+          <p:cNvPr id="16" name="Group 15">
+            <a:extLst>
+              <a:ext uri="{FF2B5EF4-FFF2-40B4-BE49-F238E27FC236}">
+                <a16:creationId xmlns:a16="http://schemas.microsoft.com/office/drawing/2014/main" id="{6B14298D-AF3B-1D4F-887D-E2B240387A08}"/>
               </a:ext>
             </a:extLst>
           </p:cNvPr>
@@ -3788,19 +3788,16 @@
           <a:xfrm>
             <a:off x="1750195" y="0"/>
             <a:ext cx="7995779" cy="6858001"/>
-            <a:chOff x="1750195" y="158751"/>
+            <a:chOff x="1750195" y="0"/>
             <a:chExt cx="7995779" cy="6858001"/>
           </a:xfrm>
-          <a:solidFill>
-            <a:schemeClr val="bg1"/>
-          </a:solidFill>
         </p:grpSpPr>
         <p:grpSp>
           <p:nvGrpSpPr>
-            <p:cNvPr id="74" name="Group 73">
+            <p:cNvPr id="68" name="Group 67">
               <a:extLst>
                 <a:ext uri="{FF2B5EF4-FFF2-40B4-BE49-F238E27FC236}">
-                  <a16:creationId xmlns:a16="http://schemas.microsoft.com/office/drawing/2014/main" id="{61710B90-1675-BE4B-8A50-AE0C1CC603B8}"/>
+                  <a16:creationId xmlns:a16="http://schemas.microsoft.com/office/drawing/2014/main" id="{AE5BC9BF-F9B2-BC4A-90AB-181A17970732}"/>
                 </a:ext>
               </a:extLst>
             </p:cNvPr>
@@ -3809,19 +3806,71 @@
           </p:nvGrpSpPr>
           <p:grpSpPr>
             <a:xfrm>
-              <a:off x="1750195" y="158751"/>
+              <a:off x="1750195" y="0"/>
               <a:ext cx="7995779" cy="6858001"/>
-              <a:chOff x="1750195" y="158751"/>
+              <a:chOff x="1817929" y="0"/>
               <a:chExt cx="7995779" cy="6858001"/>
             </a:xfrm>
-            <a:grpFill/>
+            <a:solidFill>
+              <a:schemeClr val="bg1"/>
+            </a:solidFill>
           </p:grpSpPr>
+          <p:sp>
+            <p:nvSpPr>
+              <p:cNvPr id="67" name="Rectangle 66">
+                <a:extLst>
+                  <a:ext uri="{FF2B5EF4-FFF2-40B4-BE49-F238E27FC236}">
+                    <a16:creationId xmlns:a16="http://schemas.microsoft.com/office/drawing/2014/main" id="{6622BC2C-8D37-4E49-BF65-54BF21E65C1E}"/>
+                  </a:ext>
+                </a:extLst>
+              </p:cNvPr>
+              <p:cNvSpPr/>
+              <p:nvPr/>
+            </p:nvSpPr>
+            <p:spPr>
+              <a:xfrm>
+                <a:off x="1817929" y="0"/>
+                <a:ext cx="7995779" cy="6858001"/>
+              </a:xfrm>
+              <a:prstGeom prst="rect">
+                <a:avLst/>
+              </a:prstGeom>
+              <a:solidFill>
+                <a:schemeClr val="bg1"/>
+              </a:solidFill>
+              <a:ln>
+                <a:noFill/>
+              </a:ln>
+            </p:spPr>
+            <p:style>
+              <a:lnRef idx="2">
+                <a:schemeClr val="dk1"/>
+              </a:lnRef>
+              <a:fillRef idx="1">
+                <a:schemeClr val="lt1"/>
+              </a:fillRef>
+              <a:effectRef idx="0">
+                <a:schemeClr val="dk1"/>
+              </a:effectRef>
+              <a:fontRef idx="minor">
+                <a:schemeClr val="dk1"/>
+              </a:fontRef>
+            </p:style>
+            <p:txBody>
+              <a:bodyPr rtlCol="0" anchor="ctr"/>
+              <a:lstStyle/>
+              <a:p>
+                <a:pPr algn="ctr"/>
+                <a:endParaRPr lang="en-US" dirty="0"/>
+              </a:p>
+            </p:txBody>
+          </p:sp>
           <p:grpSp>
             <p:nvGrpSpPr>
-              <p:cNvPr id="56" name="Group 55">
+              <p:cNvPr id="66" name="Group 65">
                 <a:extLst>
                   <a:ext uri="{FF2B5EF4-FFF2-40B4-BE49-F238E27FC236}">
-                    <a16:creationId xmlns:a16="http://schemas.microsoft.com/office/drawing/2014/main" id="{216EB7A8-692C-D14C-BAD4-1D012D03BF31}"/>
+                    <a16:creationId xmlns:a16="http://schemas.microsoft.com/office/drawing/2014/main" id="{6F389862-C04F-5A40-9753-0137FFF811B4}"/>
                   </a:ext>
                 </a:extLst>
               </p:cNvPr>
@@ -3830,1419 +3879,49 @@
             </p:nvGrpSpPr>
             <p:grpSpPr>
               <a:xfrm>
-                <a:off x="1750195" y="158751"/>
-                <a:ext cx="7995779" cy="6858001"/>
-                <a:chOff x="1750195" y="158751"/>
-                <a:chExt cx="7995779" cy="6858001"/>
+                <a:off x="2308214" y="0"/>
+                <a:ext cx="7505494" cy="6858000"/>
+                <a:chOff x="2308214" y="0"/>
+                <a:chExt cx="7505494" cy="6858000"/>
               </a:xfrm>
               <a:grpFill/>
             </p:grpSpPr>
-            <p:grpSp>
-              <p:nvGrpSpPr>
-                <p:cNvPr id="7" name="Group 6">
+            <p:pic>
+              <p:nvPicPr>
+                <p:cNvPr id="11" name="Picture 10">
                   <a:extLst>
                     <a:ext uri="{FF2B5EF4-FFF2-40B4-BE49-F238E27FC236}">
-                      <a16:creationId xmlns:a16="http://schemas.microsoft.com/office/drawing/2014/main" id="{33E61353-A506-FC43-A57F-C64BEF826D72}"/>
+                      <a16:creationId xmlns:a16="http://schemas.microsoft.com/office/drawing/2014/main" id="{B9F32238-2041-CF44-9D44-70D88D0E6B93}"/>
                     </a:ext>
                   </a:extLst>
                 </p:cNvPr>
-                <p:cNvGrpSpPr/>
+                <p:cNvPicPr>
+                  <a:picLocks noChangeAspect="1"/>
+                </p:cNvPicPr>
                 <p:nvPr/>
-              </p:nvGrpSpPr>
-              <p:grpSpPr>
+              </p:nvPicPr>
+              <p:blipFill>
+                <a:blip r:embed="rId3"/>
+                <a:srcRect/>
+                <a:stretch/>
+              </p:blipFill>
+              <p:spPr>
                 <a:xfrm>
-                  <a:off x="1750195" y="158751"/>
-                  <a:ext cx="7995779" cy="6858001"/>
-                  <a:chOff x="1750195" y="1"/>
-                  <a:chExt cx="7995779" cy="6858001"/>
+                  <a:off x="2308214" y="0"/>
+                  <a:ext cx="6089234" cy="6858000"/>
                 </a:xfrm>
+                <a:prstGeom prst="rect">
+                  <a:avLst/>
+                </a:prstGeom>
                 <a:grpFill/>
-              </p:grpSpPr>
-              <p:grpSp>
-                <p:nvGrpSpPr>
-                  <p:cNvPr id="37" name="Group 36">
-                    <a:extLst>
-                      <a:ext uri="{FF2B5EF4-FFF2-40B4-BE49-F238E27FC236}">
-                        <a16:creationId xmlns:a16="http://schemas.microsoft.com/office/drawing/2014/main" id="{49918DF2-B958-8740-9D3C-B8FFB9FEF6E7}"/>
-                      </a:ext>
-                    </a:extLst>
-                  </p:cNvPr>
-                  <p:cNvGrpSpPr/>
-                  <p:nvPr/>
-                </p:nvGrpSpPr>
-                <p:grpSpPr>
-                  <a:xfrm>
-                    <a:off x="1750195" y="1"/>
-                    <a:ext cx="7995779" cy="6858001"/>
-                    <a:chOff x="1750195" y="1"/>
-                    <a:chExt cx="7995779" cy="6858001"/>
-                  </a:xfrm>
-                  <a:grpFill/>
-                </p:grpSpPr>
-                <p:grpSp>
-                  <p:nvGrpSpPr>
-                    <p:cNvPr id="68" name="Group 67">
-                      <a:extLst>
-                        <a:ext uri="{FF2B5EF4-FFF2-40B4-BE49-F238E27FC236}">
-                          <a16:creationId xmlns:a16="http://schemas.microsoft.com/office/drawing/2014/main" id="{AE5BC9BF-F9B2-BC4A-90AB-181A17970732}"/>
-                        </a:ext>
-                      </a:extLst>
-                    </p:cNvPr>
-                    <p:cNvGrpSpPr/>
-                    <p:nvPr/>
-                  </p:nvGrpSpPr>
-                  <p:grpSpPr>
-                    <a:xfrm>
-                      <a:off x="1750195" y="1"/>
-                      <a:ext cx="7995779" cy="6858001"/>
-                      <a:chOff x="1817929" y="0"/>
-                      <a:chExt cx="7995779" cy="6858001"/>
-                    </a:xfrm>
-                    <a:grpFill/>
-                  </p:grpSpPr>
-                  <p:sp>
-                    <p:nvSpPr>
-                      <p:cNvPr id="67" name="Rectangle 66">
-                        <a:extLst>
-                          <a:ext uri="{FF2B5EF4-FFF2-40B4-BE49-F238E27FC236}">
-                            <a16:creationId xmlns:a16="http://schemas.microsoft.com/office/drawing/2014/main" id="{6622BC2C-8D37-4E49-BF65-54BF21E65C1E}"/>
-                          </a:ext>
-                        </a:extLst>
-                      </p:cNvPr>
-                      <p:cNvSpPr/>
-                      <p:nvPr/>
-                    </p:nvSpPr>
-                    <p:spPr>
-                      <a:xfrm>
-                        <a:off x="1817929" y="0"/>
-                        <a:ext cx="7995779" cy="6858001"/>
-                      </a:xfrm>
-                      <a:prstGeom prst="rect">
-                        <a:avLst/>
-                      </a:prstGeom>
-                      <a:solidFill>
-                        <a:schemeClr val="bg1"/>
-                      </a:solidFill>
-                      <a:ln>
-                        <a:noFill/>
-                      </a:ln>
-                    </p:spPr>
-                    <p:style>
-                      <a:lnRef idx="2">
-                        <a:schemeClr val="dk1"/>
-                      </a:lnRef>
-                      <a:fillRef idx="1">
-                        <a:schemeClr val="lt1"/>
-                      </a:fillRef>
-                      <a:effectRef idx="0">
-                        <a:schemeClr val="dk1"/>
-                      </a:effectRef>
-                      <a:fontRef idx="minor">
-                        <a:schemeClr val="dk1"/>
-                      </a:fontRef>
-                    </p:style>
-                    <p:txBody>
-                      <a:bodyPr rtlCol="0" anchor="ctr"/>
-                      <a:lstStyle/>
-                      <a:p>
-                        <a:pPr algn="ctr"/>
-                        <a:endParaRPr lang="en-US" dirty="0"/>
-                      </a:p>
-                    </p:txBody>
-                  </p:sp>
-                  <p:grpSp>
-                    <p:nvGrpSpPr>
-                      <p:cNvPr id="66" name="Group 65">
-                        <a:extLst>
-                          <a:ext uri="{FF2B5EF4-FFF2-40B4-BE49-F238E27FC236}">
-                            <a16:creationId xmlns:a16="http://schemas.microsoft.com/office/drawing/2014/main" id="{6F389862-C04F-5A40-9753-0137FFF811B4}"/>
-                          </a:ext>
-                        </a:extLst>
-                      </p:cNvPr>
-                      <p:cNvGrpSpPr/>
-                      <p:nvPr/>
-                    </p:nvGrpSpPr>
-                    <p:grpSpPr>
-                      <a:xfrm>
-                        <a:off x="2364222" y="0"/>
-                        <a:ext cx="7449486" cy="6858000"/>
-                        <a:chOff x="2364222" y="0"/>
-                        <a:chExt cx="7449486" cy="6858000"/>
-                      </a:xfrm>
-                      <a:grpFill/>
-                    </p:grpSpPr>
-                    <p:pic>
-                      <p:nvPicPr>
-                        <p:cNvPr id="11" name="Picture 10" descr="Diagram&#10;&#10;Description automatically generated">
-                          <a:extLst>
-                            <a:ext uri="{FF2B5EF4-FFF2-40B4-BE49-F238E27FC236}">
-                              <a16:creationId xmlns:a16="http://schemas.microsoft.com/office/drawing/2014/main" id="{B9F32238-2041-CF44-9D44-70D88D0E6B93}"/>
-                            </a:ext>
-                          </a:extLst>
-                        </p:cNvPr>
-                        <p:cNvPicPr>
-                          <a:picLocks noChangeAspect="1"/>
-                        </p:cNvPicPr>
-                        <p:nvPr/>
-                      </p:nvPicPr>
-                      <p:blipFill>
-                        <a:blip r:embed="rId3"/>
-                        <a:stretch>
-                          <a:fillRect/>
-                        </a:stretch>
-                      </p:blipFill>
-                      <p:spPr>
-                        <a:xfrm>
-                          <a:off x="3820148" y="0"/>
-                          <a:ext cx="4551703" cy="6858000"/>
-                        </a:xfrm>
-                        <a:prstGeom prst="rect">
-                          <a:avLst/>
-                        </a:prstGeom>
-                        <a:grpFill/>
-                      </p:spPr>
-                    </p:pic>
-                    <p:sp>
-                      <p:nvSpPr>
-                        <p:cNvPr id="12" name="TextBox 11">
-                          <a:extLst>
-                            <a:ext uri="{FF2B5EF4-FFF2-40B4-BE49-F238E27FC236}">
-                              <a16:creationId xmlns:a16="http://schemas.microsoft.com/office/drawing/2014/main" id="{13695F7E-29F2-674B-8510-D23971571FAE}"/>
-                            </a:ext>
-                          </a:extLst>
-                        </p:cNvPr>
-                        <p:cNvSpPr txBox="1"/>
-                        <p:nvPr/>
-                      </p:nvSpPr>
-                      <p:spPr>
-                        <a:xfrm>
-                          <a:off x="2364222" y="4486765"/>
-                          <a:ext cx="1197764" cy="646331"/>
-                        </a:xfrm>
-                        <a:prstGeom prst="rect">
-                          <a:avLst/>
-                        </a:prstGeom>
-                        <a:grpFill/>
-                      </p:spPr>
-                      <p:txBody>
-                        <a:bodyPr wrap="none" rtlCol="0">
-                          <a:spAutoFit/>
-                        </a:bodyPr>
-                        <a:lstStyle/>
-                        <a:p>
-                          <a:r>
-                            <a:rPr lang="en-US" dirty="0">
-                              <a:latin typeface="Arial" panose="020B0604020202020204" pitchFamily="34" charset="0"/>
-                              <a:cs typeface="Arial" panose="020B0604020202020204" pitchFamily="34" charset="0"/>
-                            </a:rPr>
-                            <a:t>Extension</a:t>
-                          </a:r>
-                        </a:p>
-                        <a:p>
-                          <a:r>
-                            <a:rPr lang="en-US" dirty="0">
-                              <a:latin typeface="Arial" panose="020B0604020202020204" pitchFamily="34" charset="0"/>
-                              <a:cs typeface="Arial" panose="020B0604020202020204" pitchFamily="34" charset="0"/>
-                            </a:rPr>
-                            <a:t>springs</a:t>
-                          </a:r>
-                        </a:p>
-                      </p:txBody>
-                    </p:sp>
-                    <p:cxnSp>
-                      <p:nvCxnSpPr>
-                        <p:cNvPr id="14" name="Straight Arrow Connector 13">
-                          <a:extLst>
-                            <a:ext uri="{FF2B5EF4-FFF2-40B4-BE49-F238E27FC236}">
-                              <a16:creationId xmlns:a16="http://schemas.microsoft.com/office/drawing/2014/main" id="{E0F818B4-0AEB-3148-8FF2-0C347D0C03DA}"/>
-                            </a:ext>
-                          </a:extLst>
-                        </p:cNvPr>
-                        <p:cNvCxnSpPr>
-                          <a:cxnSpLocks/>
-                          <a:stCxn id="12" idx="3"/>
-                        </p:cNvCxnSpPr>
-                        <p:nvPr/>
-                      </p:nvCxnSpPr>
-                      <p:spPr>
-                        <a:xfrm flipV="1">
-                          <a:off x="3561986" y="4570375"/>
-                          <a:ext cx="844838" cy="239556"/>
-                        </a:xfrm>
-                        <a:prstGeom prst="straightConnector1">
-                          <a:avLst/>
-                        </a:prstGeom>
-                        <a:grpFill/>
-                        <a:ln>
-                          <a:tailEnd type="triangle"/>
-                        </a:ln>
-                      </p:spPr>
-                      <p:style>
-                        <a:lnRef idx="1">
-                          <a:schemeClr val="dk1"/>
-                        </a:lnRef>
-                        <a:fillRef idx="0">
-                          <a:schemeClr val="dk1"/>
-                        </a:fillRef>
-                        <a:effectRef idx="0">
-                          <a:schemeClr val="dk1"/>
-                        </a:effectRef>
-                        <a:fontRef idx="minor">
-                          <a:schemeClr val="tx1"/>
-                        </a:fontRef>
-                      </p:style>
-                    </p:cxnSp>
-                    <p:sp>
-                      <p:nvSpPr>
-                        <p:cNvPr id="19" name="TextBox 18">
-                          <a:extLst>
-                            <a:ext uri="{FF2B5EF4-FFF2-40B4-BE49-F238E27FC236}">
-                              <a16:creationId xmlns:a16="http://schemas.microsoft.com/office/drawing/2014/main" id="{6B848C65-49E3-D544-96FB-B88DBF8AE3D5}"/>
-                            </a:ext>
-                          </a:extLst>
-                        </p:cNvPr>
-                        <p:cNvSpPr txBox="1"/>
-                        <p:nvPr/>
-                      </p:nvSpPr>
-                      <p:spPr>
-                        <a:xfrm>
-                          <a:off x="3221266" y="6050086"/>
-                          <a:ext cx="1236236" cy="369332"/>
-                        </a:xfrm>
-                        <a:prstGeom prst="rect">
-                          <a:avLst/>
-                        </a:prstGeom>
-                        <a:grpFill/>
-                      </p:spPr>
-                      <p:txBody>
-                        <a:bodyPr wrap="none" rtlCol="0">
-                          <a:spAutoFit/>
-                        </a:bodyPr>
-                        <a:lstStyle/>
-                        <a:p>
-                          <a:r>
-                            <a:rPr lang="en-US" dirty="0">
-                              <a:latin typeface="Arial" panose="020B0604020202020204" pitchFamily="34" charset="0"/>
-                              <a:cs typeface="Arial" panose="020B0604020202020204" pitchFamily="34" charset="0"/>
-                            </a:rPr>
-                            <a:t>Rear pivot</a:t>
-                          </a:r>
-                        </a:p>
-                      </p:txBody>
-                    </p:sp>
-                    <p:cxnSp>
-                      <p:nvCxnSpPr>
-                        <p:cNvPr id="20" name="Straight Arrow Connector 19">
-                          <a:extLst>
-                            <a:ext uri="{FF2B5EF4-FFF2-40B4-BE49-F238E27FC236}">
-                              <a16:creationId xmlns:a16="http://schemas.microsoft.com/office/drawing/2014/main" id="{28F69CA5-DF22-A146-A87F-4285138FE14E}"/>
-                            </a:ext>
-                          </a:extLst>
-                        </p:cNvPr>
-                        <p:cNvCxnSpPr>
-                          <a:cxnSpLocks/>
-                          <a:stCxn id="19" idx="3"/>
-                        </p:cNvCxnSpPr>
-                        <p:nvPr/>
-                      </p:nvCxnSpPr>
-                      <p:spPr>
-                        <a:xfrm flipV="1">
-                          <a:off x="4457502" y="6135369"/>
-                          <a:ext cx="1350632" cy="99383"/>
-                        </a:xfrm>
-                        <a:prstGeom prst="straightConnector1">
-                          <a:avLst/>
-                        </a:prstGeom>
-                        <a:grpFill/>
-                        <a:ln>
-                          <a:tailEnd type="triangle"/>
-                        </a:ln>
-                      </p:spPr>
-                      <p:style>
-                        <a:lnRef idx="1">
-                          <a:schemeClr val="dk1"/>
-                        </a:lnRef>
-                        <a:fillRef idx="0">
-                          <a:schemeClr val="dk1"/>
-                        </a:fillRef>
-                        <a:effectRef idx="0">
-                          <a:schemeClr val="dk1"/>
-                        </a:effectRef>
-                        <a:fontRef idx="minor">
-                          <a:schemeClr val="tx1"/>
-                        </a:fontRef>
-                      </p:style>
-                    </p:cxnSp>
-                    <p:sp>
-                      <p:nvSpPr>
-                        <p:cNvPr id="22" name="TextBox 21">
-                          <a:extLst>
-                            <a:ext uri="{FF2B5EF4-FFF2-40B4-BE49-F238E27FC236}">
-                              <a16:creationId xmlns:a16="http://schemas.microsoft.com/office/drawing/2014/main" id="{A51D89F4-595D-884A-8871-25F3C418040E}"/>
-                            </a:ext>
-                          </a:extLst>
-                        </p:cNvPr>
-                        <p:cNvSpPr txBox="1"/>
-                        <p:nvPr/>
-                      </p:nvSpPr>
-                      <p:spPr>
-                        <a:xfrm>
-                          <a:off x="4886211" y="1878979"/>
-                          <a:ext cx="736099" cy="369332"/>
-                        </a:xfrm>
-                        <a:prstGeom prst="rect">
-                          <a:avLst/>
-                        </a:prstGeom>
-                        <a:grpFill/>
-                      </p:spPr>
-                      <p:txBody>
-                        <a:bodyPr wrap="none" rtlCol="0">
-                          <a:spAutoFit/>
-                        </a:bodyPr>
-                        <a:lstStyle/>
-                        <a:p>
-                          <a:r>
-                            <a:rPr lang="en-US" dirty="0">
-                              <a:latin typeface="Arial" panose="020B0604020202020204" pitchFamily="34" charset="0"/>
-                              <a:cs typeface="Arial" panose="020B0604020202020204" pitchFamily="34" charset="0"/>
-                            </a:rPr>
-                            <a:t>Rope</a:t>
-                          </a:r>
-                        </a:p>
-                      </p:txBody>
-                    </p:sp>
-                    <p:cxnSp>
-                      <p:nvCxnSpPr>
-                        <p:cNvPr id="23" name="Straight Arrow Connector 22">
-                          <a:extLst>
-                            <a:ext uri="{FF2B5EF4-FFF2-40B4-BE49-F238E27FC236}">
-                              <a16:creationId xmlns:a16="http://schemas.microsoft.com/office/drawing/2014/main" id="{7909AB01-9488-FE46-A5B6-A609FC99D901}"/>
-                            </a:ext>
-                          </a:extLst>
-                        </p:cNvPr>
-                        <p:cNvCxnSpPr>
-                          <a:cxnSpLocks/>
-                          <a:stCxn id="22" idx="2"/>
-                        </p:cNvCxnSpPr>
-                        <p:nvPr/>
-                      </p:nvCxnSpPr>
-                      <p:spPr>
-                        <a:xfrm>
-                          <a:off x="5254261" y="2248311"/>
-                          <a:ext cx="150178" cy="361317"/>
-                        </a:xfrm>
-                        <a:prstGeom prst="straightConnector1">
-                          <a:avLst/>
-                        </a:prstGeom>
-                        <a:grpFill/>
-                        <a:ln>
-                          <a:tailEnd type="triangle"/>
-                        </a:ln>
-                      </p:spPr>
-                      <p:style>
-                        <a:lnRef idx="1">
-                          <a:schemeClr val="dk1"/>
-                        </a:lnRef>
-                        <a:fillRef idx="0">
-                          <a:schemeClr val="dk1"/>
-                        </a:fillRef>
-                        <a:effectRef idx="0">
-                          <a:schemeClr val="dk1"/>
-                        </a:effectRef>
-                        <a:fontRef idx="minor">
-                          <a:schemeClr val="tx1"/>
-                        </a:fontRef>
-                      </p:style>
-                    </p:cxnSp>
-                    <p:cxnSp>
-                      <p:nvCxnSpPr>
-                        <p:cNvPr id="32" name="Straight Arrow Connector 31">
-                          <a:extLst>
-                            <a:ext uri="{FF2B5EF4-FFF2-40B4-BE49-F238E27FC236}">
-                              <a16:creationId xmlns:a16="http://schemas.microsoft.com/office/drawing/2014/main" id="{6D86F9CA-5D41-9240-9292-6CB71D6922FB}"/>
-                            </a:ext>
-                          </a:extLst>
-                        </p:cNvPr>
-                        <p:cNvCxnSpPr>
-                          <a:cxnSpLocks/>
-                          <a:stCxn id="31" idx="3"/>
-                        </p:cNvCxnSpPr>
-                        <p:nvPr/>
-                      </p:nvCxnSpPr>
-                      <p:spPr>
-                        <a:xfrm>
-                          <a:off x="4438675" y="3086959"/>
-                          <a:ext cx="1067711" cy="308405"/>
-                        </a:xfrm>
-                        <a:prstGeom prst="straightConnector1">
-                          <a:avLst/>
-                        </a:prstGeom>
-                        <a:grpFill/>
-                        <a:ln>
-                          <a:tailEnd type="triangle"/>
-                        </a:ln>
-                      </p:spPr>
-                      <p:style>
-                        <a:lnRef idx="1">
-                          <a:schemeClr val="dk1"/>
-                        </a:lnRef>
-                        <a:fillRef idx="0">
-                          <a:schemeClr val="dk1"/>
-                        </a:fillRef>
-                        <a:effectRef idx="0">
-                          <a:schemeClr val="dk1"/>
-                        </a:effectRef>
-                        <a:fontRef idx="minor">
-                          <a:schemeClr val="tx1"/>
-                        </a:fontRef>
-                      </p:style>
-                    </p:cxnSp>
-                    <p:sp>
-                      <p:nvSpPr>
-                        <p:cNvPr id="35" name="TextBox 34">
-                          <a:extLst>
-                            <a:ext uri="{FF2B5EF4-FFF2-40B4-BE49-F238E27FC236}">
-                              <a16:creationId xmlns:a16="http://schemas.microsoft.com/office/drawing/2014/main" id="{9B2EF17C-6AC2-4046-913E-AD74CFF6FF2A}"/>
-                            </a:ext>
-                          </a:extLst>
-                        </p:cNvPr>
-                        <p:cNvSpPr txBox="1"/>
-                        <p:nvPr/>
-                      </p:nvSpPr>
-                      <p:spPr>
-                        <a:xfrm>
-                          <a:off x="8255931" y="3292592"/>
-                          <a:ext cx="1428596" cy="369332"/>
-                        </a:xfrm>
-                        <a:prstGeom prst="rect">
-                          <a:avLst/>
-                        </a:prstGeom>
-                        <a:grpFill/>
-                      </p:spPr>
-                      <p:txBody>
-                        <a:bodyPr wrap="none" rtlCol="0">
-                          <a:spAutoFit/>
-                        </a:bodyPr>
-                        <a:lstStyle/>
-                        <a:p>
-                          <a:r>
-                            <a:rPr lang="en-US" dirty="0" err="1">
-                              <a:latin typeface="Arial" panose="020B0604020202020204" pitchFamily="34" charset="0"/>
-                              <a:cs typeface="Arial" panose="020B0604020202020204" pitchFamily="34" charset="0"/>
-                            </a:rPr>
-                            <a:t>Powermeter</a:t>
-                          </a:r>
-                          <a:endParaRPr lang="en-US" dirty="0">
-                            <a:latin typeface="Arial" panose="020B0604020202020204" pitchFamily="34" charset="0"/>
-                            <a:cs typeface="Arial" panose="020B0604020202020204" pitchFamily="34" charset="0"/>
-                          </a:endParaRPr>
-                        </a:p>
-                      </p:txBody>
-                    </p:sp>
-                    <p:cxnSp>
-                      <p:nvCxnSpPr>
-                        <p:cNvPr id="36" name="Straight Arrow Connector 35">
-                          <a:extLst>
-                            <a:ext uri="{FF2B5EF4-FFF2-40B4-BE49-F238E27FC236}">
-                              <a16:creationId xmlns:a16="http://schemas.microsoft.com/office/drawing/2014/main" id="{8749F783-6602-4941-B723-08B1E100693D}"/>
-                            </a:ext>
-                          </a:extLst>
-                        </p:cNvPr>
-                        <p:cNvCxnSpPr>
-                          <a:cxnSpLocks/>
-                          <a:stCxn id="35" idx="1"/>
-                        </p:cNvCxnSpPr>
-                        <p:nvPr/>
-                      </p:nvCxnSpPr>
-                      <p:spPr>
-                        <a:xfrm flipH="1">
-                          <a:off x="6885223" y="3477258"/>
-                          <a:ext cx="1370708" cy="369332"/>
-                        </a:xfrm>
-                        <a:prstGeom prst="straightConnector1">
-                          <a:avLst/>
-                        </a:prstGeom>
-                        <a:grpFill/>
-                        <a:ln>
-                          <a:tailEnd type="triangle"/>
-                        </a:ln>
-                      </p:spPr>
-                      <p:style>
-                        <a:lnRef idx="1">
-                          <a:schemeClr val="dk1"/>
-                        </a:lnRef>
-                        <a:fillRef idx="0">
-                          <a:schemeClr val="dk1"/>
-                        </a:fillRef>
-                        <a:effectRef idx="0">
-                          <a:schemeClr val="dk1"/>
-                        </a:effectRef>
-                        <a:fontRef idx="minor">
-                          <a:schemeClr val="tx1"/>
-                        </a:fontRef>
-                      </p:style>
-                    </p:cxnSp>
-                    <p:sp>
-                      <p:nvSpPr>
-                        <p:cNvPr id="39" name="TextBox 38">
-                          <a:extLst>
-                            <a:ext uri="{FF2B5EF4-FFF2-40B4-BE49-F238E27FC236}">
-                              <a16:creationId xmlns:a16="http://schemas.microsoft.com/office/drawing/2014/main" id="{6E77C7CF-18CF-284B-9BC7-20F4BD5D5761}"/>
-                            </a:ext>
-                          </a:extLst>
-                        </p:cNvPr>
-                        <p:cNvSpPr txBox="1"/>
-                        <p:nvPr/>
-                      </p:nvSpPr>
-                      <p:spPr>
-                        <a:xfrm>
-                          <a:off x="7667141" y="2881772"/>
-                          <a:ext cx="607859" cy="369332"/>
-                        </a:xfrm>
-                        <a:prstGeom prst="rect">
-                          <a:avLst/>
-                        </a:prstGeom>
-                        <a:grpFill/>
-                      </p:spPr>
-                      <p:txBody>
-                        <a:bodyPr wrap="none" rtlCol="0">
-                          <a:spAutoFit/>
-                        </a:bodyPr>
-                        <a:lstStyle/>
-                        <a:p>
-                          <a:r>
-                            <a:rPr lang="en-US" dirty="0">
-                              <a:latin typeface="Arial" panose="020B0604020202020204" pitchFamily="34" charset="0"/>
-                              <a:cs typeface="Arial" panose="020B0604020202020204" pitchFamily="34" charset="0"/>
-                            </a:rPr>
-                            <a:t>IMU</a:t>
-                          </a:r>
-                        </a:p>
-                      </p:txBody>
-                    </p:sp>
-                    <p:cxnSp>
-                      <p:nvCxnSpPr>
-                        <p:cNvPr id="40" name="Straight Arrow Connector 39">
-                          <a:extLst>
-                            <a:ext uri="{FF2B5EF4-FFF2-40B4-BE49-F238E27FC236}">
-                              <a16:creationId xmlns:a16="http://schemas.microsoft.com/office/drawing/2014/main" id="{5B02735B-6E44-4642-8D64-94B5B810CA9A}"/>
-                            </a:ext>
-                          </a:extLst>
-                        </p:cNvPr>
-                        <p:cNvCxnSpPr>
-                          <a:cxnSpLocks/>
-                          <a:stCxn id="39" idx="1"/>
-                        </p:cNvCxnSpPr>
-                        <p:nvPr/>
-                      </p:nvCxnSpPr>
-                      <p:spPr>
-                        <a:xfrm flipH="1">
-                          <a:off x="6717947" y="3066438"/>
-                          <a:ext cx="949194" cy="350141"/>
-                        </a:xfrm>
-                        <a:prstGeom prst="straightConnector1">
-                          <a:avLst/>
-                        </a:prstGeom>
-                        <a:grpFill/>
-                        <a:ln>
-                          <a:tailEnd type="triangle"/>
-                        </a:ln>
-                      </p:spPr>
-                      <p:style>
-                        <a:lnRef idx="1">
-                          <a:schemeClr val="dk1"/>
-                        </a:lnRef>
-                        <a:fillRef idx="0">
-                          <a:schemeClr val="dk1"/>
-                        </a:fillRef>
-                        <a:effectRef idx="0">
-                          <a:schemeClr val="dk1"/>
-                        </a:effectRef>
-                        <a:fontRef idx="minor">
-                          <a:schemeClr val="tx1"/>
-                        </a:fontRef>
-                      </p:style>
-                    </p:cxnSp>
-                    <p:sp>
-                      <p:nvSpPr>
-                        <p:cNvPr id="43" name="TextBox 42">
-                          <a:extLst>
-                            <a:ext uri="{FF2B5EF4-FFF2-40B4-BE49-F238E27FC236}">
-                              <a16:creationId xmlns:a16="http://schemas.microsoft.com/office/drawing/2014/main" id="{C00C2080-FDCC-E440-9975-060B321398DD}"/>
-                            </a:ext>
-                          </a:extLst>
-                        </p:cNvPr>
-                        <p:cNvSpPr txBox="1"/>
-                        <p:nvPr/>
-                      </p:nvSpPr>
-                      <p:spPr>
-                        <a:xfrm>
-                          <a:off x="8539000" y="3984709"/>
-                          <a:ext cx="1274708" cy="369332"/>
-                        </a:xfrm>
-                        <a:prstGeom prst="rect">
-                          <a:avLst/>
-                        </a:prstGeom>
-                        <a:grpFill/>
-                      </p:spPr>
-                      <p:txBody>
-                        <a:bodyPr wrap="none" rtlCol="0">
-                          <a:spAutoFit/>
-                        </a:bodyPr>
-                        <a:lstStyle/>
-                        <a:p>
-                          <a:r>
-                            <a:rPr lang="en-US" dirty="0">
-                              <a:latin typeface="Arial" panose="020B0604020202020204" pitchFamily="34" charset="0"/>
-                              <a:cs typeface="Arial" panose="020B0604020202020204" pitchFamily="34" charset="0"/>
-                            </a:rPr>
-                            <a:t>Front pivot</a:t>
-                          </a:r>
-                        </a:p>
-                      </p:txBody>
-                    </p:sp>
-                    <p:cxnSp>
-                      <p:nvCxnSpPr>
-                        <p:cNvPr id="44" name="Straight Arrow Connector 43">
-                          <a:extLst>
-                            <a:ext uri="{FF2B5EF4-FFF2-40B4-BE49-F238E27FC236}">
-                              <a16:creationId xmlns:a16="http://schemas.microsoft.com/office/drawing/2014/main" id="{928E3A06-B6C6-E345-86FC-8855662CC835}"/>
-                            </a:ext>
-                          </a:extLst>
-                        </p:cNvPr>
-                        <p:cNvCxnSpPr>
-                          <a:cxnSpLocks/>
-                          <a:stCxn id="43" idx="1"/>
-                        </p:cNvCxnSpPr>
-                        <p:nvPr/>
-                      </p:nvCxnSpPr>
-                      <p:spPr>
-                        <a:xfrm flipH="1">
-                          <a:off x="7210318" y="4169375"/>
-                          <a:ext cx="1328682" cy="401000"/>
-                        </a:xfrm>
-                        <a:prstGeom prst="straightConnector1">
-                          <a:avLst/>
-                        </a:prstGeom>
-                        <a:grpFill/>
-                        <a:ln>
-                          <a:tailEnd type="triangle"/>
-                        </a:ln>
-                      </p:spPr>
-                      <p:style>
-                        <a:lnRef idx="1">
-                          <a:schemeClr val="dk1"/>
-                        </a:lnRef>
-                        <a:fillRef idx="0">
-                          <a:schemeClr val="dk1"/>
-                        </a:fillRef>
-                        <a:effectRef idx="0">
-                          <a:schemeClr val="dk1"/>
-                        </a:effectRef>
-                        <a:fontRef idx="minor">
-                          <a:schemeClr val="tx1"/>
-                        </a:fontRef>
-                      </p:style>
-                    </p:cxnSp>
-                    <p:sp>
-                      <p:nvSpPr>
-                        <p:cNvPr id="31" name="TextBox 30">
-                          <a:extLst>
-                            <a:ext uri="{FF2B5EF4-FFF2-40B4-BE49-F238E27FC236}">
-                              <a16:creationId xmlns:a16="http://schemas.microsoft.com/office/drawing/2014/main" id="{08F49B01-6AA3-B04B-8249-AB5F362EEECD}"/>
-                            </a:ext>
-                          </a:extLst>
-                        </p:cNvPr>
-                        <p:cNvSpPr txBox="1"/>
-                        <p:nvPr/>
-                      </p:nvSpPr>
-                      <p:spPr>
-                        <a:xfrm>
-                          <a:off x="3343503" y="2902293"/>
-                          <a:ext cx="1095172" cy="369332"/>
-                        </a:xfrm>
-                        <a:prstGeom prst="rect">
-                          <a:avLst/>
-                        </a:prstGeom>
-                        <a:grpFill/>
-                      </p:spPr>
-                      <p:txBody>
-                        <a:bodyPr wrap="none" rtlCol="0">
-                          <a:spAutoFit/>
-                        </a:bodyPr>
-                        <a:lstStyle/>
-                        <a:p>
-                          <a:r>
-                            <a:rPr lang="en-US" dirty="0">
-                              <a:latin typeface="Arial" panose="020B0604020202020204" pitchFamily="34" charset="0"/>
-                              <a:cs typeface="Arial" panose="020B0604020202020204" pitchFamily="34" charset="0"/>
-                            </a:rPr>
-                            <a:t>Flywheel</a:t>
-                          </a:r>
-                        </a:p>
-                      </p:txBody>
-                    </p:sp>
-                  </p:grpSp>
-                </p:grpSp>
-                <p:sp>
-                  <p:nvSpPr>
-                    <p:cNvPr id="2" name="Oval 1">
-                      <a:extLst>
-                        <a:ext uri="{FF2B5EF4-FFF2-40B4-BE49-F238E27FC236}">
-                          <a16:creationId xmlns:a16="http://schemas.microsoft.com/office/drawing/2014/main" id="{FA4453CB-3335-354A-A6D5-D3BF14347C8C}"/>
-                        </a:ext>
-                      </a:extLst>
-                    </p:cNvPr>
-                    <p:cNvSpPr/>
-                    <p:nvPr/>
-                  </p:nvSpPr>
-                  <p:spPr>
-                    <a:xfrm>
-                      <a:off x="5765800" y="6089650"/>
-                      <a:ext cx="45719" cy="45719"/>
-                    </a:xfrm>
-                    <a:prstGeom prst="ellipse">
-                      <a:avLst/>
-                    </a:prstGeom>
-                    <a:grpFill/>
-                    <a:ln>
-                      <a:solidFill>
-                        <a:schemeClr val="tx1"/>
-                      </a:solidFill>
-                    </a:ln>
-                  </p:spPr>
-                  <p:style>
-                    <a:lnRef idx="2">
-                      <a:schemeClr val="dk1">
-                        <a:shade val="50000"/>
-                      </a:schemeClr>
-                    </a:lnRef>
-                    <a:fillRef idx="1">
-                      <a:schemeClr val="dk1"/>
-                    </a:fillRef>
-                    <a:effectRef idx="0">
-                      <a:schemeClr val="dk1"/>
-                    </a:effectRef>
-                    <a:fontRef idx="minor">
-                      <a:schemeClr val="lt1"/>
-                    </a:fontRef>
-                  </p:style>
-                  <p:txBody>
-                    <a:bodyPr rtlCol="0" anchor="ctr"/>
-                    <a:lstStyle/>
-                    <a:p>
-                      <a:pPr algn="ctr"/>
-                      <a:endParaRPr lang="en-US"/>
-                    </a:p>
-                  </p:txBody>
-                </p:sp>
-                <p:sp>
-                  <p:nvSpPr>
-                    <p:cNvPr id="8" name="Freeform 7">
-                      <a:extLst>
-                        <a:ext uri="{FF2B5EF4-FFF2-40B4-BE49-F238E27FC236}">
-                          <a16:creationId xmlns:a16="http://schemas.microsoft.com/office/drawing/2014/main" id="{33193548-9B82-7549-A6A6-6AC5DEC75251}"/>
-                        </a:ext>
-                      </a:extLst>
-                    </p:cNvPr>
-                    <p:cNvSpPr/>
-                    <p:nvPr/>
-                  </p:nvSpPr>
-                  <p:spPr>
-                    <a:xfrm>
-                      <a:off x="2623350" y="2377021"/>
-                      <a:ext cx="1277318" cy="1228493"/>
-                    </a:xfrm>
-                    <a:custGeom>
-                      <a:avLst/>
-                      <a:gdLst>
-                        <a:gd name="connsiteX0" fmla="*/ 1277318 w 1277318"/>
-                        <a:gd name="connsiteY0" fmla="*/ 76812 h 1228493"/>
-                        <a:gd name="connsiteX1" fmla="*/ 241384 w 1277318"/>
-                        <a:gd name="connsiteY1" fmla="*/ 7364 h 1228493"/>
-                        <a:gd name="connsiteX2" fmla="*/ 15678 w 1277318"/>
-                        <a:gd name="connsiteY2" fmla="*/ 233070 h 1228493"/>
-                        <a:gd name="connsiteX3" fmla="*/ 21465 w 1277318"/>
-                        <a:gd name="connsiteY3" fmla="*/ 771293 h 1228493"/>
-                        <a:gd name="connsiteX4" fmla="*/ 38827 w 1277318"/>
-                        <a:gd name="connsiteY4" fmla="*/ 1228493 h 1228493"/>
-                      </a:gdLst>
-                      <a:ahLst/>
-                      <a:cxnLst>
-                        <a:cxn ang="0">
-                          <a:pos x="connsiteX0" y="connsiteY0"/>
-                        </a:cxn>
-                        <a:cxn ang="0">
-                          <a:pos x="connsiteX1" y="connsiteY1"/>
-                        </a:cxn>
-                        <a:cxn ang="0">
-                          <a:pos x="connsiteX2" y="connsiteY2"/>
-                        </a:cxn>
-                        <a:cxn ang="0">
-                          <a:pos x="connsiteX3" y="connsiteY3"/>
-                        </a:cxn>
-                        <a:cxn ang="0">
-                          <a:pos x="connsiteX4" y="connsiteY4"/>
-                        </a:cxn>
-                      </a:cxnLst>
-                      <a:rect l="l" t="t" r="r" b="b"/>
-                      <a:pathLst>
-                        <a:path w="1277318" h="1228493">
-                          <a:moveTo>
-                            <a:pt x="1277318" y="76812"/>
-                          </a:moveTo>
-                          <a:cubicBezTo>
-                            <a:pt x="864487" y="29066"/>
-                            <a:pt x="451657" y="-18679"/>
-                            <a:pt x="241384" y="7364"/>
-                          </a:cubicBezTo>
-                          <a:cubicBezTo>
-                            <a:pt x="31111" y="33407"/>
-                            <a:pt x="52331" y="105749"/>
-                            <a:pt x="15678" y="233070"/>
-                          </a:cubicBezTo>
-                          <a:cubicBezTo>
-                            <a:pt x="-20975" y="360391"/>
-                            <a:pt x="17607" y="605389"/>
-                            <a:pt x="21465" y="771293"/>
-                          </a:cubicBezTo>
-                          <a:cubicBezTo>
-                            <a:pt x="25323" y="937197"/>
-                            <a:pt x="36898" y="1133967"/>
-                            <a:pt x="38827" y="1228493"/>
-                          </a:cubicBezTo>
-                        </a:path>
-                      </a:pathLst>
-                    </a:custGeom>
-                    <a:grpFill/>
-                    <a:ln>
-                      <a:solidFill>
-                        <a:schemeClr val="tx1"/>
-                      </a:solidFill>
-                    </a:ln>
-                  </p:spPr>
-                  <p:style>
-                    <a:lnRef idx="2">
-                      <a:schemeClr val="accent1">
-                        <a:shade val="50000"/>
-                      </a:schemeClr>
-                    </a:lnRef>
-                    <a:fillRef idx="1">
-                      <a:schemeClr val="accent1"/>
-                    </a:fillRef>
-                    <a:effectRef idx="0">
-                      <a:schemeClr val="accent1"/>
-                    </a:effectRef>
-                    <a:fontRef idx="minor">
-                      <a:schemeClr val="lt1"/>
-                    </a:fontRef>
-                  </p:style>
-                  <p:txBody>
-                    <a:bodyPr rtlCol="0" anchor="ctr"/>
-                    <a:lstStyle/>
-                    <a:p>
-                      <a:pPr algn="ctr"/>
-                      <a:endParaRPr lang="en-US"/>
-                    </a:p>
-                  </p:txBody>
-                </p:sp>
-                <p:pic>
-                  <p:nvPicPr>
-                    <p:cNvPr id="9" name="Picture 8">
-                      <a:extLst>
-                        <a:ext uri="{FF2B5EF4-FFF2-40B4-BE49-F238E27FC236}">
-                          <a16:creationId xmlns:a16="http://schemas.microsoft.com/office/drawing/2014/main" id="{55610D85-376A-5F43-B8D4-8708EE1CF17C}"/>
-                        </a:ext>
-                      </a:extLst>
-                    </p:cNvPr>
-                    <p:cNvPicPr>
-                      <a:picLocks noChangeAspect="1"/>
-                    </p:cNvPicPr>
-                    <p:nvPr/>
-                  </p:nvPicPr>
-                  <p:blipFill>
-                    <a:blip r:embed="rId4"/>
-                    <a:stretch>
-                      <a:fillRect/>
-                    </a:stretch>
-                  </p:blipFill>
-                  <p:spPr>
-                    <a:xfrm>
-                      <a:off x="2619466" y="2342663"/>
-                      <a:ext cx="1282700" cy="1244600"/>
-                    </a:xfrm>
-                    <a:prstGeom prst="rect">
-                      <a:avLst/>
-                    </a:prstGeom>
-                    <a:noFill/>
-                  </p:spPr>
-                </p:pic>
-                <p:sp>
-                  <p:nvSpPr>
-                    <p:cNvPr id="10" name="Trapezoid 9">
-                      <a:extLst>
-                        <a:ext uri="{FF2B5EF4-FFF2-40B4-BE49-F238E27FC236}">
-                          <a16:creationId xmlns:a16="http://schemas.microsoft.com/office/drawing/2014/main" id="{6DD0F687-F4FB-0A4C-84B1-F8E887748EA8}"/>
-                        </a:ext>
-                      </a:extLst>
-                    </p:cNvPr>
-                    <p:cNvSpPr/>
-                    <p:nvPr/>
-                  </p:nvSpPr>
-                  <p:spPr>
-                    <a:xfrm>
-                      <a:off x="2384643" y="3605514"/>
-                      <a:ext cx="559904" cy="446514"/>
-                    </a:xfrm>
-                    <a:prstGeom prst="trapezoid">
-                      <a:avLst/>
-                    </a:prstGeom>
-                    <a:grpFill/>
-                    <a:ln w="19050">
-                      <a:solidFill>
-                        <a:schemeClr val="tx1"/>
-                      </a:solidFill>
-                    </a:ln>
-                  </p:spPr>
-                  <p:style>
-                    <a:lnRef idx="2">
-                      <a:schemeClr val="accent1">
-                        <a:shade val="50000"/>
-                      </a:schemeClr>
-                    </a:lnRef>
-                    <a:fillRef idx="1">
-                      <a:schemeClr val="accent1"/>
-                    </a:fillRef>
-                    <a:effectRef idx="0">
-                      <a:schemeClr val="accent1"/>
-                    </a:effectRef>
-                    <a:fontRef idx="minor">
-                      <a:schemeClr val="lt1"/>
-                    </a:fontRef>
-                  </p:style>
-                  <p:txBody>
-                    <a:bodyPr rtlCol="0" anchor="ctr"/>
-                    <a:lstStyle/>
-                    <a:p>
-                      <a:pPr algn="ctr"/>
-                      <a:endParaRPr lang="en-US" dirty="0">
-                        <a:ln>
-                          <a:solidFill>
-                            <a:schemeClr val="tx1"/>
-                          </a:solidFill>
-                        </a:ln>
-                        <a:solidFill>
-                          <a:schemeClr val="tx1"/>
-                        </a:solidFill>
-                        <a:latin typeface="Arial" panose="020B0604020202020204" pitchFamily="34" charset="0"/>
-                        <a:cs typeface="Arial" panose="020B0604020202020204" pitchFamily="34" charset="0"/>
-                      </a:endParaRPr>
-                    </a:p>
-                  </p:txBody>
-                </p:sp>
-                <p:sp>
-                  <p:nvSpPr>
-                    <p:cNvPr id="41" name="TextBox 40">
-                      <a:extLst>
-                        <a:ext uri="{FF2B5EF4-FFF2-40B4-BE49-F238E27FC236}">
-                          <a16:creationId xmlns:a16="http://schemas.microsoft.com/office/drawing/2014/main" id="{9B75EE3A-3EA0-5A43-BD49-93C7CF38A964}"/>
-                        </a:ext>
-                      </a:extLst>
-                    </p:cNvPr>
-                    <p:cNvSpPr txBox="1"/>
-                    <p:nvPr/>
-                  </p:nvSpPr>
-                  <p:spPr>
-                    <a:xfrm>
-                      <a:off x="2523198" y="3709488"/>
-                      <a:ext cx="282793" cy="246221"/>
-                    </a:xfrm>
-                    <a:prstGeom prst="rect">
-                      <a:avLst/>
-                    </a:prstGeom>
-                    <a:grpFill/>
-                  </p:spPr>
-                  <p:txBody>
-                    <a:bodyPr wrap="square" lIns="0" tIns="0" rIns="0" bIns="0" rtlCol="0">
-                      <a:spAutoFit/>
-                    </a:bodyPr>
-                    <a:lstStyle/>
-                    <a:p>
-                      <a:pPr algn="ctr"/>
-                      <a:r>
-                        <a:rPr lang="en-US" sz="1600" dirty="0">
-                          <a:latin typeface="Arial" panose="020B0604020202020204" pitchFamily="34" charset="0"/>
-                          <a:cs typeface="Arial" panose="020B0604020202020204" pitchFamily="34" charset="0"/>
-                        </a:rPr>
-                        <a:t>m</a:t>
-                      </a:r>
-                    </a:p>
-                  </p:txBody>
-                </p:sp>
-                <p:sp>
-                  <p:nvSpPr>
-                    <p:cNvPr id="52" name="Oval 51">
-                      <a:extLst>
-                        <a:ext uri="{FF2B5EF4-FFF2-40B4-BE49-F238E27FC236}">
-                          <a16:creationId xmlns:a16="http://schemas.microsoft.com/office/drawing/2014/main" id="{A7850DC4-63F5-E743-AED9-7186569FAE60}"/>
-                        </a:ext>
-                      </a:extLst>
-                    </p:cNvPr>
-                    <p:cNvSpPr/>
-                    <p:nvPr/>
-                  </p:nvSpPr>
-                  <p:spPr>
-                    <a:xfrm>
-                      <a:off x="7080560" y="4570376"/>
-                      <a:ext cx="27432" cy="27432"/>
-                    </a:xfrm>
-                    <a:prstGeom prst="ellipse">
-                      <a:avLst/>
-                    </a:prstGeom>
-                    <a:grpFill/>
-                    <a:ln>
-                      <a:solidFill>
-                        <a:schemeClr val="tx1"/>
-                      </a:solidFill>
-                    </a:ln>
-                  </p:spPr>
-                  <p:style>
-                    <a:lnRef idx="2">
-                      <a:schemeClr val="dk1">
-                        <a:shade val="50000"/>
-                      </a:schemeClr>
-                    </a:lnRef>
-                    <a:fillRef idx="1">
-                      <a:schemeClr val="dk1"/>
-                    </a:fillRef>
-                    <a:effectRef idx="0">
-                      <a:schemeClr val="dk1"/>
-                    </a:effectRef>
-                    <a:fontRef idx="minor">
-                      <a:schemeClr val="lt1"/>
-                    </a:fontRef>
-                  </p:style>
-                  <p:txBody>
-                    <a:bodyPr rtlCol="0" anchor="ctr"/>
-                    <a:lstStyle/>
-                    <a:p>
-                      <a:pPr algn="ctr"/>
-                      <a:endParaRPr lang="en-US"/>
-                    </a:p>
-                  </p:txBody>
-                </p:sp>
-                <p:sp>
-                  <p:nvSpPr>
-                    <p:cNvPr id="5" name="Can 4">
-                      <a:extLst>
-                        <a:ext uri="{FF2B5EF4-FFF2-40B4-BE49-F238E27FC236}">
-                          <a16:creationId xmlns:a16="http://schemas.microsoft.com/office/drawing/2014/main" id="{AB3033C5-C6A1-6540-8210-EECC9C88CDE2}"/>
-                        </a:ext>
-                      </a:extLst>
-                    </p:cNvPr>
-                    <p:cNvSpPr/>
-                    <p:nvPr/>
-                  </p:nvSpPr>
-                  <p:spPr>
-                    <a:xfrm rot="5400000">
-                      <a:off x="2413786" y="2568009"/>
-                      <a:ext cx="630810" cy="366049"/>
-                    </a:xfrm>
-                    <a:prstGeom prst="can">
-                      <a:avLst>
-                        <a:gd name="adj" fmla="val 50000"/>
-                      </a:avLst>
-                    </a:prstGeom>
-                    <a:noFill/>
-                    <a:ln w="19050">
-                      <a:solidFill>
-                        <a:schemeClr val="tx1"/>
-                      </a:solidFill>
-                    </a:ln>
-                  </p:spPr>
-                  <p:style>
-                    <a:lnRef idx="2">
-                      <a:schemeClr val="accent1">
-                        <a:shade val="50000"/>
-                      </a:schemeClr>
-                    </a:lnRef>
-                    <a:fillRef idx="1">
-                      <a:schemeClr val="accent1"/>
-                    </a:fillRef>
-                    <a:effectRef idx="0">
-                      <a:schemeClr val="accent1"/>
-                    </a:effectRef>
-                    <a:fontRef idx="minor">
-                      <a:schemeClr val="lt1"/>
-                    </a:fontRef>
-                  </p:style>
-                  <p:txBody>
-                    <a:bodyPr rtlCol="0" anchor="ctr"/>
-                    <a:lstStyle/>
-                    <a:p>
-                      <a:pPr algn="ctr"/>
-                      <a:endParaRPr lang="en-US"/>
-                    </a:p>
-                  </p:txBody>
-                </p:sp>
-              </p:grpSp>
-              <p:cxnSp>
-                <p:nvCxnSpPr>
-                  <p:cNvPr id="4" name="Straight Arrow Connector 3">
-                    <a:extLst>
-                      <a:ext uri="{FF2B5EF4-FFF2-40B4-BE49-F238E27FC236}">
-                        <a16:creationId xmlns:a16="http://schemas.microsoft.com/office/drawing/2014/main" id="{9D8CBA5D-B6FB-3A4F-88EA-EE198B562F9F}"/>
-                      </a:ext>
-                    </a:extLst>
-                  </p:cNvPr>
-                  <p:cNvCxnSpPr/>
-                  <p:nvPr/>
-                </p:nvCxnSpPr>
-                <p:spPr>
-                  <a:xfrm flipV="1">
-                    <a:off x="2226627" y="5733043"/>
-                    <a:ext cx="0" cy="653143"/>
-                  </a:xfrm>
-                  <a:prstGeom prst="straightConnector1">
-                    <a:avLst/>
-                  </a:prstGeom>
-                  <a:grpFill/>
-                  <a:ln w="12700">
-                    <a:solidFill>
-                      <a:schemeClr val="tx1"/>
-                    </a:solidFill>
-                    <a:tailEnd type="triangle"/>
-                  </a:ln>
-                </p:spPr>
-                <p:style>
-                  <a:lnRef idx="1">
-                    <a:schemeClr val="accent6"/>
-                  </a:lnRef>
-                  <a:fillRef idx="0">
-                    <a:schemeClr val="accent6"/>
-                  </a:fillRef>
-                  <a:effectRef idx="0">
-                    <a:schemeClr val="accent6"/>
-                  </a:effectRef>
-                  <a:fontRef idx="minor">
-                    <a:schemeClr val="tx1"/>
-                  </a:fontRef>
-                </p:style>
-              </p:cxnSp>
-              <p:cxnSp>
-                <p:nvCxnSpPr>
-                  <p:cNvPr id="33" name="Straight Arrow Connector 32">
-                    <a:extLst>
-                      <a:ext uri="{FF2B5EF4-FFF2-40B4-BE49-F238E27FC236}">
-                        <a16:creationId xmlns:a16="http://schemas.microsoft.com/office/drawing/2014/main" id="{CA8025B3-8BDB-8949-952E-355AA97F675A}"/>
-                      </a:ext>
-                    </a:extLst>
-                  </p:cNvPr>
-                  <p:cNvCxnSpPr>
-                    <a:cxnSpLocks/>
-                  </p:cNvCxnSpPr>
-                  <p:nvPr/>
-                </p:nvCxnSpPr>
-                <p:spPr>
-                  <a:xfrm rot="6180000" flipV="1">
-                    <a:off x="2543139" y="6136105"/>
-                    <a:ext cx="0" cy="653143"/>
-                  </a:xfrm>
-                  <a:prstGeom prst="straightConnector1">
-                    <a:avLst/>
-                  </a:prstGeom>
-                  <a:grpFill/>
-                  <a:ln w="12700">
-                    <a:solidFill>
-                      <a:schemeClr val="tx1"/>
-                    </a:solidFill>
-                    <a:tailEnd type="triangle"/>
-                  </a:ln>
-                </p:spPr>
-                <p:style>
-                  <a:lnRef idx="1">
-                    <a:schemeClr val="accent1"/>
-                  </a:lnRef>
-                  <a:fillRef idx="0">
-                    <a:schemeClr val="accent1"/>
-                  </a:fillRef>
-                  <a:effectRef idx="0">
-                    <a:schemeClr val="accent1"/>
-                  </a:effectRef>
-                  <a:fontRef idx="minor">
-                    <a:schemeClr val="tx1"/>
-                  </a:fontRef>
-                </p:style>
-              </p:cxnSp>
-              <p:cxnSp>
-                <p:nvCxnSpPr>
-                  <p:cNvPr id="34" name="Straight Arrow Connector 33">
-                    <a:extLst>
-                      <a:ext uri="{FF2B5EF4-FFF2-40B4-BE49-F238E27FC236}">
-                        <a16:creationId xmlns:a16="http://schemas.microsoft.com/office/drawing/2014/main" id="{F83542F5-AAF6-3D46-8EFE-0F99D1BF40A8}"/>
-                      </a:ext>
-                    </a:extLst>
-                  </p:cNvPr>
-                  <p:cNvCxnSpPr>
-                    <a:cxnSpLocks/>
-                  </p:cNvCxnSpPr>
-                  <p:nvPr/>
-                </p:nvCxnSpPr>
-                <p:spPr>
-                  <a:xfrm rot="2340000" flipV="1">
-                    <a:off x="2436367" y="5805623"/>
-                    <a:ext cx="0" cy="653143"/>
-                  </a:xfrm>
-                  <a:prstGeom prst="straightConnector1">
-                    <a:avLst/>
-                  </a:prstGeom>
-                  <a:grpFill/>
-                  <a:ln w="12700">
-                    <a:solidFill>
-                      <a:schemeClr val="tx1"/>
-                    </a:solidFill>
-                    <a:tailEnd type="triangle"/>
-                  </a:ln>
-                </p:spPr>
-                <p:style>
-                  <a:lnRef idx="1">
-                    <a:schemeClr val="accent1"/>
-                  </a:lnRef>
-                  <a:fillRef idx="0">
-                    <a:schemeClr val="accent1"/>
-                  </a:fillRef>
-                  <a:effectRef idx="0">
-                    <a:schemeClr val="accent1"/>
-                  </a:effectRef>
-                  <a:fontRef idx="minor">
-                    <a:schemeClr val="tx1"/>
-                  </a:fontRef>
-                </p:style>
-              </p:cxnSp>
-              <p:sp>
-                <p:nvSpPr>
-                  <p:cNvPr id="6" name="TextBox 5">
-                    <a:extLst>
-                      <a:ext uri="{FF2B5EF4-FFF2-40B4-BE49-F238E27FC236}">
-                        <a16:creationId xmlns:a16="http://schemas.microsoft.com/office/drawing/2014/main" id="{72988D4B-99B3-5348-ADEE-906E3D77AD68}"/>
-                      </a:ext>
-                    </a:extLst>
-                  </p:cNvPr>
-                  <p:cNvSpPr txBox="1"/>
-                  <p:nvPr/>
-                </p:nvSpPr>
-                <p:spPr>
-                  <a:xfrm>
-                    <a:off x="2133497" y="5457111"/>
-                    <a:ext cx="182880" cy="274320"/>
-                  </a:xfrm>
-                  <a:prstGeom prst="rect">
-                    <a:avLst/>
-                  </a:prstGeom>
-                  <a:grpFill/>
-                </p:spPr>
-                <p:txBody>
-                  <a:bodyPr wrap="square" lIns="0" tIns="0" rIns="0" bIns="0" rtlCol="0" anchor="ctr">
-                    <a:spAutoFit/>
-                  </a:bodyPr>
-                  <a:lstStyle/>
-                  <a:p>
-                    <a:pPr algn="ctr"/>
-                    <a:r>
-                      <a:rPr lang="en-US" i="1" dirty="0">
-                        <a:latin typeface="Arial" panose="020B0604020202020204" pitchFamily="34" charset="0"/>
-                        <a:cs typeface="Arial" panose="020B0604020202020204" pitchFamily="34" charset="0"/>
-                      </a:rPr>
-                      <a:t>z</a:t>
-                    </a:r>
-                  </a:p>
-                </p:txBody>
-              </p:sp>
-              <p:sp>
-                <p:nvSpPr>
-                  <p:cNvPr id="38" name="TextBox 37">
-                    <a:extLst>
-                      <a:ext uri="{FF2B5EF4-FFF2-40B4-BE49-F238E27FC236}">
-                        <a16:creationId xmlns:a16="http://schemas.microsoft.com/office/drawing/2014/main" id="{7A7A83AB-77C8-0D4B-91E9-593B978A361C}"/>
-                      </a:ext>
-                    </a:extLst>
-                  </p:cNvPr>
-                  <p:cNvSpPr txBox="1"/>
-                  <p:nvPr/>
-                </p:nvSpPr>
-                <p:spPr>
-                  <a:xfrm>
-                    <a:off x="2608646" y="5605643"/>
-                    <a:ext cx="182880" cy="274320"/>
-                  </a:xfrm>
-                  <a:prstGeom prst="rect">
-                    <a:avLst/>
-                  </a:prstGeom>
-                  <a:grpFill/>
-                </p:spPr>
-                <p:txBody>
-                  <a:bodyPr wrap="square" lIns="0" tIns="0" rIns="0" bIns="0" rtlCol="0" anchor="ctr">
-                    <a:spAutoFit/>
-                  </a:bodyPr>
-                  <a:lstStyle/>
-                  <a:p>
-                    <a:pPr algn="ctr"/>
-                    <a:r>
-                      <a:rPr lang="en-US" i="1" dirty="0">
-                        <a:latin typeface="Arial" panose="020B0604020202020204" pitchFamily="34" charset="0"/>
-                        <a:cs typeface="Arial" panose="020B0604020202020204" pitchFamily="34" charset="0"/>
-                      </a:rPr>
-                      <a:t>x</a:t>
-                    </a:r>
-                  </a:p>
-                </p:txBody>
-              </p:sp>
-              <p:sp>
-                <p:nvSpPr>
-                  <p:cNvPr id="42" name="TextBox 41">
-                    <a:extLst>
-                      <a:ext uri="{FF2B5EF4-FFF2-40B4-BE49-F238E27FC236}">
-                        <a16:creationId xmlns:a16="http://schemas.microsoft.com/office/drawing/2014/main" id="{FBEAA0FA-51F9-B848-B2EF-FF38456D4D6F}"/>
-                      </a:ext>
-                    </a:extLst>
-                  </p:cNvPr>
-                  <p:cNvSpPr txBox="1"/>
-                  <p:nvPr/>
-                </p:nvSpPr>
-                <p:spPr>
-                  <a:xfrm>
-                    <a:off x="2858605" y="6398947"/>
-                    <a:ext cx="182880" cy="274320"/>
-                  </a:xfrm>
-                  <a:prstGeom prst="rect">
-                    <a:avLst/>
-                  </a:prstGeom>
-                  <a:grpFill/>
-                </p:spPr>
-                <p:txBody>
-                  <a:bodyPr wrap="square" lIns="0" tIns="0" rIns="0" bIns="0" rtlCol="0" anchor="ctr">
-                    <a:spAutoFit/>
-                  </a:bodyPr>
-                  <a:lstStyle/>
-                  <a:p>
-                    <a:pPr algn="ctr"/>
-                    <a:r>
-                      <a:rPr lang="en-US" i="1" dirty="0">
-                        <a:latin typeface="Arial" panose="020B0604020202020204" pitchFamily="34" charset="0"/>
-                        <a:cs typeface="Arial" panose="020B0604020202020204" pitchFamily="34" charset="0"/>
-                      </a:rPr>
-                      <a:t>y</a:t>
-                    </a:r>
-                  </a:p>
-                </p:txBody>
-              </p:sp>
-            </p:grpSp>
+              </p:spPr>
+            </p:pic>
             <p:sp>
               <p:nvSpPr>
-                <p:cNvPr id="45" name="TextBox 44">
+                <p:cNvPr id="12" name="TextBox 11">
                   <a:extLst>
                     <a:ext uri="{FF2B5EF4-FFF2-40B4-BE49-F238E27FC236}">
-                      <a16:creationId xmlns:a16="http://schemas.microsoft.com/office/drawing/2014/main" id="{581422EC-5BBA-604D-B171-7FB42C654154}"/>
+                      <a16:creationId xmlns:a16="http://schemas.microsoft.com/office/drawing/2014/main" id="{13695F7E-29F2-674B-8510-D23971571FAE}"/>
                     </a:ext>
                   </a:extLst>
                 </p:cNvPr>
@@ -5250,58 +3929,229 @@
                 <p:nvPr/>
               </p:nvSpPr>
               <p:spPr>
-                <a:xfrm rot="540000">
-                  <a:off x="4169507" y="2371847"/>
-                  <a:ext cx="408153" cy="276999"/>
+                <a:xfrm>
+                  <a:off x="2364222" y="4486765"/>
+                  <a:ext cx="1197764" cy="646331"/>
                 </a:xfrm>
                 <a:prstGeom prst="rect">
                   <a:avLst/>
                 </a:prstGeom>
-                <a:solidFill>
-                  <a:schemeClr val="bg1"/>
-                </a:solidFill>
+                <a:grpFill/>
               </p:spPr>
               <p:txBody>
-                <a:bodyPr wrap="square" lIns="0" tIns="0" rIns="0" bIns="0" rtlCol="0" anchor="ctr">
+                <a:bodyPr wrap="none" rtlCol="0">
                   <a:spAutoFit/>
                 </a:bodyPr>
                 <a:lstStyle/>
                 <a:p>
-                  <a:pPr algn="ctr"/>
                   <a:r>
-                    <a:rPr lang="en-US" i="1" dirty="0">
+                    <a:rPr lang="en-US" dirty="0">
                       <a:latin typeface="Arial" panose="020B0604020202020204" pitchFamily="34" charset="0"/>
                       <a:cs typeface="Arial" panose="020B0604020202020204" pitchFamily="34" charset="0"/>
                     </a:rPr>
-                    <a:t>3 m</a:t>
+                    <a:t>Extension</a:t>
+                  </a:r>
+                </a:p>
+                <a:p>
+                  <a:r>
+                    <a:rPr lang="en-US" dirty="0">
+                      <a:latin typeface="Arial" panose="020B0604020202020204" pitchFamily="34" charset="0"/>
+                      <a:cs typeface="Arial" panose="020B0604020202020204" pitchFamily="34" charset="0"/>
+                    </a:rPr>
+                    <a:t>springs</a:t>
                   </a:r>
                 </a:p>
               </p:txBody>
             </p:sp>
             <p:cxnSp>
               <p:nvCxnSpPr>
-                <p:cNvPr id="17" name="Straight Connector 16">
+                <p:cNvPr id="14" name="Straight Arrow Connector 13">
                   <a:extLst>
                     <a:ext uri="{FF2B5EF4-FFF2-40B4-BE49-F238E27FC236}">
-                      <a16:creationId xmlns:a16="http://schemas.microsoft.com/office/drawing/2014/main" id="{64837C67-C126-4E4B-90AD-BD6F212C4E42}"/>
+                      <a16:creationId xmlns:a16="http://schemas.microsoft.com/office/drawing/2014/main" id="{E0F818B4-0AEB-3148-8FF2-0C347D0C03DA}"/>
                     </a:ext>
                   </a:extLst>
                 </p:cNvPr>
                 <p:cNvCxnSpPr>
                   <a:cxnSpLocks/>
-                  <a:stCxn id="45" idx="3"/>
+                  <a:stCxn id="12" idx="3"/>
+                </p:cNvCxnSpPr>
+                <p:nvPr/>
+              </p:nvCxnSpPr>
+              <p:spPr>
+                <a:xfrm flipV="1">
+                  <a:off x="3561986" y="4570375"/>
+                  <a:ext cx="844838" cy="239556"/>
+                </a:xfrm>
+                <a:prstGeom prst="straightConnector1">
+                  <a:avLst/>
+                </a:prstGeom>
+                <a:grpFill/>
+                <a:ln>
+                  <a:tailEnd type="triangle"/>
+                </a:ln>
+              </p:spPr>
+              <p:style>
+                <a:lnRef idx="1">
+                  <a:schemeClr val="dk1"/>
+                </a:lnRef>
+                <a:fillRef idx="0">
+                  <a:schemeClr val="dk1"/>
+                </a:fillRef>
+                <a:effectRef idx="0">
+                  <a:schemeClr val="dk1"/>
+                </a:effectRef>
+                <a:fontRef idx="minor">
+                  <a:schemeClr val="tx1"/>
+                </a:fontRef>
+              </p:style>
+            </p:cxnSp>
+            <p:sp>
+              <p:nvSpPr>
+                <p:cNvPr id="19" name="TextBox 18">
+                  <a:extLst>
+                    <a:ext uri="{FF2B5EF4-FFF2-40B4-BE49-F238E27FC236}">
+                      <a16:creationId xmlns:a16="http://schemas.microsoft.com/office/drawing/2014/main" id="{6B848C65-49E3-D544-96FB-B88DBF8AE3D5}"/>
+                    </a:ext>
+                  </a:extLst>
+                </p:cNvPr>
+                <p:cNvSpPr txBox="1"/>
+                <p:nvPr/>
+              </p:nvSpPr>
+              <p:spPr>
+                <a:xfrm>
+                  <a:off x="3221266" y="6050086"/>
+                  <a:ext cx="1236236" cy="369332"/>
+                </a:xfrm>
+                <a:prstGeom prst="rect">
+                  <a:avLst/>
+                </a:prstGeom>
+                <a:grpFill/>
+              </p:spPr>
+              <p:txBody>
+                <a:bodyPr wrap="none" rtlCol="0">
+                  <a:spAutoFit/>
+                </a:bodyPr>
+                <a:lstStyle/>
+                <a:p>
+                  <a:r>
+                    <a:rPr lang="en-US" dirty="0">
+                      <a:latin typeface="Arial" panose="020B0604020202020204" pitchFamily="34" charset="0"/>
+                      <a:cs typeface="Arial" panose="020B0604020202020204" pitchFamily="34" charset="0"/>
+                    </a:rPr>
+                    <a:t>Rear pivot</a:t>
+                  </a:r>
+                </a:p>
+              </p:txBody>
+            </p:sp>
+            <p:cxnSp>
+              <p:nvCxnSpPr>
+                <p:cNvPr id="20" name="Straight Arrow Connector 19">
+                  <a:extLst>
+                    <a:ext uri="{FF2B5EF4-FFF2-40B4-BE49-F238E27FC236}">
+                      <a16:creationId xmlns:a16="http://schemas.microsoft.com/office/drawing/2014/main" id="{28F69CA5-DF22-A146-A87F-4285138FE14E}"/>
+                    </a:ext>
+                  </a:extLst>
+                </p:cNvPr>
+                <p:cNvCxnSpPr>
+                  <a:cxnSpLocks/>
+                  <a:stCxn id="19" idx="3"/>
+                </p:cNvCxnSpPr>
+                <p:nvPr/>
+              </p:nvCxnSpPr>
+              <p:spPr>
+                <a:xfrm flipV="1">
+                  <a:off x="4457502" y="6135369"/>
+                  <a:ext cx="1350632" cy="99383"/>
+                </a:xfrm>
+                <a:prstGeom prst="straightConnector1">
+                  <a:avLst/>
+                </a:prstGeom>
+                <a:grpFill/>
+                <a:ln>
+                  <a:tailEnd type="triangle"/>
+                </a:ln>
+              </p:spPr>
+              <p:style>
+                <a:lnRef idx="1">
+                  <a:schemeClr val="dk1"/>
+                </a:lnRef>
+                <a:fillRef idx="0">
+                  <a:schemeClr val="dk1"/>
+                </a:fillRef>
+                <a:effectRef idx="0">
+                  <a:schemeClr val="dk1"/>
+                </a:effectRef>
+                <a:fontRef idx="minor">
+                  <a:schemeClr val="tx1"/>
+                </a:fontRef>
+              </p:style>
+            </p:cxnSp>
+            <p:sp>
+              <p:nvSpPr>
+                <p:cNvPr id="22" name="TextBox 21">
+                  <a:extLst>
+                    <a:ext uri="{FF2B5EF4-FFF2-40B4-BE49-F238E27FC236}">
+                      <a16:creationId xmlns:a16="http://schemas.microsoft.com/office/drawing/2014/main" id="{A51D89F4-595D-884A-8871-25F3C418040E}"/>
+                    </a:ext>
+                  </a:extLst>
+                </p:cNvPr>
+                <p:cNvSpPr txBox="1"/>
+                <p:nvPr/>
+              </p:nvSpPr>
+              <p:spPr>
+                <a:xfrm>
+                  <a:off x="4886211" y="1878979"/>
+                  <a:ext cx="736099" cy="369332"/>
+                </a:xfrm>
+                <a:prstGeom prst="rect">
+                  <a:avLst/>
+                </a:prstGeom>
+                <a:grpFill/>
+              </p:spPr>
+              <p:txBody>
+                <a:bodyPr wrap="none" rtlCol="0">
+                  <a:spAutoFit/>
+                </a:bodyPr>
+                <a:lstStyle/>
+                <a:p>
+                  <a:r>
+                    <a:rPr lang="en-US" dirty="0">
+                      <a:latin typeface="Arial" panose="020B0604020202020204" pitchFamily="34" charset="0"/>
+                      <a:cs typeface="Arial" panose="020B0604020202020204" pitchFamily="34" charset="0"/>
+                    </a:rPr>
+                    <a:t>Rope</a:t>
+                  </a:r>
+                </a:p>
+              </p:txBody>
+            </p:sp>
+            <p:cxnSp>
+              <p:nvCxnSpPr>
+                <p:cNvPr id="23" name="Straight Arrow Connector 22">
+                  <a:extLst>
+                    <a:ext uri="{FF2B5EF4-FFF2-40B4-BE49-F238E27FC236}">
+                      <a16:creationId xmlns:a16="http://schemas.microsoft.com/office/drawing/2014/main" id="{7909AB01-9488-FE46-A5B6-A609FC99D901}"/>
+                    </a:ext>
+                  </a:extLst>
+                </p:cNvPr>
+                <p:cNvCxnSpPr>
+                  <a:cxnSpLocks/>
+                  <a:stCxn id="22" idx="2"/>
                 </p:cNvCxnSpPr>
                 <p:nvPr/>
               </p:nvCxnSpPr>
               <p:spPr>
                 <a:xfrm>
-                  <a:off x="4575147" y="2542272"/>
-                  <a:ext cx="1298293" cy="202782"/>
+                  <a:off x="5254261" y="2248311"/>
+                  <a:ext cx="150178" cy="361317"/>
                 </a:xfrm>
-                <a:prstGeom prst="line">
+                <a:prstGeom prst="straightConnector1">
                   <a:avLst/>
                 </a:prstGeom>
                 <a:grpFill/>
+                <a:ln>
+                  <a:tailEnd type="triangle"/>
+                </a:ln>
               </p:spPr>
               <p:style>
                 <a:lnRef idx="1">
@@ -5320,28 +4170,31 @@
             </p:cxnSp>
             <p:cxnSp>
               <p:nvCxnSpPr>
-                <p:cNvPr id="46" name="Straight Connector 45">
+                <p:cNvPr id="32" name="Straight Arrow Connector 31">
                   <a:extLst>
                     <a:ext uri="{FF2B5EF4-FFF2-40B4-BE49-F238E27FC236}">
-                      <a16:creationId xmlns:a16="http://schemas.microsoft.com/office/drawing/2014/main" id="{5C3A92D2-AE46-1042-9889-22D672C84ACF}"/>
+                      <a16:creationId xmlns:a16="http://schemas.microsoft.com/office/drawing/2014/main" id="{6D86F9CA-5D41-9240-9292-6CB71D6922FB}"/>
                     </a:ext>
                   </a:extLst>
                 </p:cNvPr>
                 <p:cNvCxnSpPr>
                   <a:cxnSpLocks/>
-                  <a:endCxn id="45" idx="1"/>
+                  <a:stCxn id="31" idx="3"/>
                 </p:cNvCxnSpPr>
                 <p:nvPr/>
               </p:nvCxnSpPr>
               <p:spPr>
                 <a:xfrm>
-                  <a:off x="2891392" y="2272285"/>
-                  <a:ext cx="1280627" cy="206137"/>
+                  <a:off x="4438675" y="3086959"/>
+                  <a:ext cx="1067711" cy="308405"/>
                 </a:xfrm>
-                <a:prstGeom prst="line">
+                <a:prstGeom prst="straightConnector1">
                   <a:avLst/>
                 </a:prstGeom>
                 <a:grpFill/>
+                <a:ln>
+                  <a:tailEnd type="triangle"/>
+                </a:ln>
               </p:spPr>
               <p:style>
                 <a:lnRef idx="1">
@@ -5358,29 +4211,75 @@
                 </a:fontRef>
               </p:style>
             </p:cxnSp>
+            <p:sp>
+              <p:nvSpPr>
+                <p:cNvPr id="35" name="TextBox 34">
+                  <a:extLst>
+                    <a:ext uri="{FF2B5EF4-FFF2-40B4-BE49-F238E27FC236}">
+                      <a16:creationId xmlns:a16="http://schemas.microsoft.com/office/drawing/2014/main" id="{9B2EF17C-6AC2-4046-913E-AD74CFF6FF2A}"/>
+                    </a:ext>
+                  </a:extLst>
+                </p:cNvPr>
+                <p:cNvSpPr txBox="1"/>
+                <p:nvPr/>
+              </p:nvSpPr>
+              <p:spPr>
+                <a:xfrm>
+                  <a:off x="8255931" y="3292592"/>
+                  <a:ext cx="1428596" cy="369332"/>
+                </a:xfrm>
+                <a:prstGeom prst="rect">
+                  <a:avLst/>
+                </a:prstGeom>
+                <a:grpFill/>
+              </p:spPr>
+              <p:txBody>
+                <a:bodyPr wrap="none" rtlCol="0">
+                  <a:spAutoFit/>
+                </a:bodyPr>
+                <a:lstStyle/>
+                <a:p>
+                  <a:r>
+                    <a:rPr lang="en-US" dirty="0" err="1">
+                      <a:latin typeface="Arial" panose="020B0604020202020204" pitchFamily="34" charset="0"/>
+                      <a:cs typeface="Arial" panose="020B0604020202020204" pitchFamily="34" charset="0"/>
+                    </a:rPr>
+                    <a:t>Powermeter</a:t>
+                  </a:r>
+                  <a:endParaRPr lang="en-US" dirty="0">
+                    <a:latin typeface="Arial" panose="020B0604020202020204" pitchFamily="34" charset="0"/>
+                    <a:cs typeface="Arial" panose="020B0604020202020204" pitchFamily="34" charset="0"/>
+                  </a:endParaRPr>
+                </a:p>
+              </p:txBody>
+            </p:sp>
             <p:cxnSp>
               <p:nvCxnSpPr>
-                <p:cNvPr id="51" name="Straight Connector 50">
+                <p:cNvPr id="36" name="Straight Arrow Connector 35">
                   <a:extLst>
                     <a:ext uri="{FF2B5EF4-FFF2-40B4-BE49-F238E27FC236}">
-                      <a16:creationId xmlns:a16="http://schemas.microsoft.com/office/drawing/2014/main" id="{7E912C93-04BF-D341-8814-54EE1584C9B7}"/>
+                      <a16:creationId xmlns:a16="http://schemas.microsoft.com/office/drawing/2014/main" id="{8749F783-6602-4941-B723-08B1E100693D}"/>
                     </a:ext>
                   </a:extLst>
                 </p:cNvPr>
                 <p:cNvCxnSpPr>
                   <a:cxnSpLocks/>
+                  <a:stCxn id="35" idx="1"/>
                 </p:cNvCxnSpPr>
                 <p:nvPr/>
               </p:nvCxnSpPr>
               <p:spPr>
-                <a:xfrm rot="21300000" flipH="1">
-                  <a:off x="2880851" y="2223716"/>
-                  <a:ext cx="27432" cy="91440"/>
+                <a:xfrm flipH="1">
+                  <a:off x="6885223" y="3477258"/>
+                  <a:ext cx="1370708" cy="369332"/>
                 </a:xfrm>
-                <a:prstGeom prst="line">
+                <a:prstGeom prst="straightConnector1">
                   <a:avLst/>
                 </a:prstGeom>
                 <a:grpFill/>
+                <a:ln>
+                  <a:tailEnd type="triangle"/>
+                </a:ln>
               </p:spPr>
               <p:style>
                 <a:lnRef idx="1">
@@ -5397,29 +4296,71 @@
                 </a:fontRef>
               </p:style>
             </p:cxnSp>
+            <p:sp>
+              <p:nvSpPr>
+                <p:cNvPr id="39" name="TextBox 38">
+                  <a:extLst>
+                    <a:ext uri="{FF2B5EF4-FFF2-40B4-BE49-F238E27FC236}">
+                      <a16:creationId xmlns:a16="http://schemas.microsoft.com/office/drawing/2014/main" id="{6E77C7CF-18CF-284B-9BC7-20F4BD5D5761}"/>
+                    </a:ext>
+                  </a:extLst>
+                </p:cNvPr>
+                <p:cNvSpPr txBox="1"/>
+                <p:nvPr/>
+              </p:nvSpPr>
+              <p:spPr>
+                <a:xfrm>
+                  <a:off x="7667141" y="2881772"/>
+                  <a:ext cx="607859" cy="369332"/>
+                </a:xfrm>
+                <a:prstGeom prst="rect">
+                  <a:avLst/>
+                </a:prstGeom>
+                <a:grpFill/>
+              </p:spPr>
+              <p:txBody>
+                <a:bodyPr wrap="none" rtlCol="0">
+                  <a:spAutoFit/>
+                </a:bodyPr>
+                <a:lstStyle/>
+                <a:p>
+                  <a:r>
+                    <a:rPr lang="en-US" dirty="0">
+                      <a:latin typeface="Arial" panose="020B0604020202020204" pitchFamily="34" charset="0"/>
+                      <a:cs typeface="Arial" panose="020B0604020202020204" pitchFamily="34" charset="0"/>
+                    </a:rPr>
+                    <a:t>IMU</a:t>
+                  </a:r>
+                </a:p>
+              </p:txBody>
+            </p:sp>
             <p:cxnSp>
               <p:nvCxnSpPr>
-                <p:cNvPr id="57" name="Straight Connector 56">
+                <p:cNvPr id="40" name="Straight Arrow Connector 39">
                   <a:extLst>
                     <a:ext uri="{FF2B5EF4-FFF2-40B4-BE49-F238E27FC236}">
-                      <a16:creationId xmlns:a16="http://schemas.microsoft.com/office/drawing/2014/main" id="{6A80E704-0965-E940-8542-AAA6C2CF756E}"/>
+                      <a16:creationId xmlns:a16="http://schemas.microsoft.com/office/drawing/2014/main" id="{5B02735B-6E44-4642-8D64-94B5B810CA9A}"/>
                     </a:ext>
                   </a:extLst>
                 </p:cNvPr>
                 <p:cNvCxnSpPr>
                   <a:cxnSpLocks/>
+                  <a:stCxn id="39" idx="1"/>
                 </p:cNvCxnSpPr>
                 <p:nvPr/>
               </p:nvCxnSpPr>
               <p:spPr>
-                <a:xfrm rot="21300000" flipH="1">
-                  <a:off x="5857950" y="2699335"/>
-                  <a:ext cx="27432" cy="91440"/>
+                <a:xfrm flipH="1">
+                  <a:off x="6717947" y="3066438"/>
+                  <a:ext cx="949194" cy="350141"/>
                 </a:xfrm>
-                <a:prstGeom prst="line">
+                <a:prstGeom prst="straightConnector1">
                   <a:avLst/>
                 </a:prstGeom>
                 <a:grpFill/>
+                <a:ln>
+                  <a:tailEnd type="triangle"/>
+                </a:ln>
               </p:spPr>
               <p:style>
                 <a:lnRef idx="1">
@@ -5436,96 +4377,789 @@
                 </a:fontRef>
               </p:style>
             </p:cxnSp>
+            <p:sp>
+              <p:nvSpPr>
+                <p:cNvPr id="43" name="TextBox 42">
+                  <a:extLst>
+                    <a:ext uri="{FF2B5EF4-FFF2-40B4-BE49-F238E27FC236}">
+                      <a16:creationId xmlns:a16="http://schemas.microsoft.com/office/drawing/2014/main" id="{C00C2080-FDCC-E440-9975-060B321398DD}"/>
+                    </a:ext>
+                  </a:extLst>
+                </p:cNvPr>
+                <p:cNvSpPr txBox="1"/>
+                <p:nvPr/>
+              </p:nvSpPr>
+              <p:spPr>
+                <a:xfrm>
+                  <a:off x="8539000" y="3984709"/>
+                  <a:ext cx="1274708" cy="369332"/>
+                </a:xfrm>
+                <a:prstGeom prst="rect">
+                  <a:avLst/>
+                </a:prstGeom>
+                <a:grpFill/>
+              </p:spPr>
+              <p:txBody>
+                <a:bodyPr wrap="none" rtlCol="0">
+                  <a:spAutoFit/>
+                </a:bodyPr>
+                <a:lstStyle/>
+                <a:p>
+                  <a:r>
+                    <a:rPr lang="en-US" dirty="0">
+                      <a:latin typeface="Arial" panose="020B0604020202020204" pitchFamily="34" charset="0"/>
+                      <a:cs typeface="Arial" panose="020B0604020202020204" pitchFamily="34" charset="0"/>
+                    </a:rPr>
+                    <a:t>Front pivot</a:t>
+                  </a:r>
+                </a:p>
+              </p:txBody>
+            </p:sp>
+            <p:cxnSp>
+              <p:nvCxnSpPr>
+                <p:cNvPr id="44" name="Straight Arrow Connector 43">
+                  <a:extLst>
+                    <a:ext uri="{FF2B5EF4-FFF2-40B4-BE49-F238E27FC236}">
+                      <a16:creationId xmlns:a16="http://schemas.microsoft.com/office/drawing/2014/main" id="{928E3A06-B6C6-E345-86FC-8855662CC835}"/>
+                    </a:ext>
+                  </a:extLst>
+                </p:cNvPr>
+                <p:cNvCxnSpPr>
+                  <a:cxnSpLocks/>
+                  <a:stCxn id="43" idx="1"/>
+                </p:cNvCxnSpPr>
+                <p:nvPr/>
+              </p:nvCxnSpPr>
+              <p:spPr>
+                <a:xfrm flipH="1">
+                  <a:off x="7210318" y="4169375"/>
+                  <a:ext cx="1328682" cy="401000"/>
+                </a:xfrm>
+                <a:prstGeom prst="straightConnector1">
+                  <a:avLst/>
+                </a:prstGeom>
+                <a:grpFill/>
+                <a:ln>
+                  <a:tailEnd type="triangle"/>
+                </a:ln>
+              </p:spPr>
+              <p:style>
+                <a:lnRef idx="1">
+                  <a:schemeClr val="dk1"/>
+                </a:lnRef>
+                <a:fillRef idx="0">
+                  <a:schemeClr val="dk1"/>
+                </a:fillRef>
+                <a:effectRef idx="0">
+                  <a:schemeClr val="dk1"/>
+                </a:effectRef>
+                <a:fontRef idx="minor">
+                  <a:schemeClr val="tx1"/>
+                </a:fontRef>
+              </p:style>
+            </p:cxnSp>
+            <p:sp>
+              <p:nvSpPr>
+                <p:cNvPr id="31" name="TextBox 30">
+                  <a:extLst>
+                    <a:ext uri="{FF2B5EF4-FFF2-40B4-BE49-F238E27FC236}">
+                      <a16:creationId xmlns:a16="http://schemas.microsoft.com/office/drawing/2014/main" id="{08F49B01-6AA3-B04B-8249-AB5F362EEECD}"/>
+                    </a:ext>
+                  </a:extLst>
+                </p:cNvPr>
+                <p:cNvSpPr txBox="1"/>
+                <p:nvPr/>
+              </p:nvSpPr>
+              <p:spPr>
+                <a:xfrm>
+                  <a:off x="3343503" y="2902293"/>
+                  <a:ext cx="1095172" cy="369332"/>
+                </a:xfrm>
+                <a:prstGeom prst="rect">
+                  <a:avLst/>
+                </a:prstGeom>
+                <a:grpFill/>
+              </p:spPr>
+              <p:txBody>
+                <a:bodyPr wrap="none" rtlCol="0">
+                  <a:spAutoFit/>
+                </a:bodyPr>
+                <a:lstStyle/>
+                <a:p>
+                  <a:r>
+                    <a:rPr lang="en-US" dirty="0">
+                      <a:latin typeface="Arial" panose="020B0604020202020204" pitchFamily="34" charset="0"/>
+                      <a:cs typeface="Arial" panose="020B0604020202020204" pitchFamily="34" charset="0"/>
+                    </a:rPr>
+                    <a:t>Flywheel</a:t>
+                  </a:r>
+                </a:p>
+              </p:txBody>
+            </p:sp>
           </p:grpSp>
-          <p:cxnSp>
-            <p:nvCxnSpPr>
-              <p:cNvPr id="72" name="Straight Connector 71">
-                <a:extLst>
-                  <a:ext uri="{FF2B5EF4-FFF2-40B4-BE49-F238E27FC236}">
-                    <a16:creationId xmlns:a16="http://schemas.microsoft.com/office/drawing/2014/main" id="{C5D2854F-348D-EA42-A777-E10EA4AAA610}"/>
-                  </a:ext>
-                </a:extLst>
-              </p:cNvPr>
-              <p:cNvCxnSpPr>
-                <a:cxnSpLocks/>
-              </p:cNvCxnSpPr>
-              <p:nvPr/>
-            </p:nvCxnSpPr>
-            <p:spPr>
-              <a:xfrm rot="2160000" flipH="1">
-                <a:off x="3019985" y="2469508"/>
-                <a:ext cx="0" cy="109728"/>
-              </a:xfrm>
-              <a:prstGeom prst="line">
-                <a:avLst/>
-              </a:prstGeom>
-              <a:grpFill/>
-              <a:ln w="38100" cmpd="dbl">
-                <a:solidFill>
-                  <a:schemeClr val="tx1"/>
-                </a:solidFill>
-              </a:ln>
-            </p:spPr>
-            <p:style>
-              <a:lnRef idx="1">
-                <a:schemeClr val="accent1"/>
-              </a:lnRef>
-              <a:fillRef idx="0">
-                <a:schemeClr val="accent1"/>
-              </a:fillRef>
-              <a:effectRef idx="0">
-                <a:schemeClr val="accent1"/>
-              </a:effectRef>
-              <a:fontRef idx="minor">
+        </p:grpSp>
+        <p:sp>
+          <p:nvSpPr>
+            <p:cNvPr id="2" name="Oval 1">
+              <a:extLst>
+                <a:ext uri="{FF2B5EF4-FFF2-40B4-BE49-F238E27FC236}">
+                  <a16:creationId xmlns:a16="http://schemas.microsoft.com/office/drawing/2014/main" id="{FA4453CB-3335-354A-A6D5-D3BF14347C8C}"/>
+                </a:ext>
+              </a:extLst>
+            </p:cNvPr>
+            <p:cNvSpPr/>
+            <p:nvPr/>
+          </p:nvSpPr>
+          <p:spPr>
+            <a:xfrm>
+              <a:off x="5765800" y="6089649"/>
+              <a:ext cx="45719" cy="45719"/>
+            </a:xfrm>
+            <a:prstGeom prst="ellipse">
+              <a:avLst/>
+            </a:prstGeom>
+            <a:solidFill>
+              <a:schemeClr val="bg1"/>
+            </a:solidFill>
+            <a:ln>
+              <a:solidFill>
                 <a:schemeClr val="tx1"/>
-              </a:fontRef>
-            </p:style>
-          </p:cxnSp>
-          <p:cxnSp>
-            <p:nvCxnSpPr>
-              <p:cNvPr id="73" name="Straight Connector 72">
-                <a:extLst>
-                  <a:ext uri="{FF2B5EF4-FFF2-40B4-BE49-F238E27FC236}">
-                    <a16:creationId xmlns:a16="http://schemas.microsoft.com/office/drawing/2014/main" id="{C286F8BB-509A-2E45-AE13-656E35F6E94F}"/>
-                  </a:ext>
-                </a:extLst>
-              </p:cNvPr>
-              <p:cNvCxnSpPr>
-                <a:cxnSpLocks/>
-              </p:cNvCxnSpPr>
-              <p:nvPr/>
-            </p:nvCxnSpPr>
-            <p:spPr>
-              <a:xfrm rot="2160000" flipH="1">
-                <a:off x="3019985" y="2259958"/>
-                <a:ext cx="0" cy="109728"/>
-              </a:xfrm>
-              <a:prstGeom prst="line">
-                <a:avLst/>
-              </a:prstGeom>
-              <a:grpFill/>
-              <a:ln w="38100" cmpd="dbl">
-                <a:solidFill>
-                  <a:schemeClr val="tx1"/>
-                </a:solidFill>
-              </a:ln>
-            </p:spPr>
-            <p:style>
-              <a:lnRef idx="1">
-                <a:schemeClr val="accent1"/>
-              </a:lnRef>
-              <a:fillRef idx="0">
-                <a:schemeClr val="accent1"/>
-              </a:fillRef>
-              <a:effectRef idx="0">
-                <a:schemeClr val="accent1"/>
-              </a:effectRef>
-              <a:fontRef idx="minor">
+              </a:solidFill>
+            </a:ln>
+          </p:spPr>
+          <p:style>
+            <a:lnRef idx="2">
+              <a:schemeClr val="dk1">
+                <a:shade val="50000"/>
+              </a:schemeClr>
+            </a:lnRef>
+            <a:fillRef idx="1">
+              <a:schemeClr val="dk1"/>
+            </a:fillRef>
+            <a:effectRef idx="0">
+              <a:schemeClr val="dk1"/>
+            </a:effectRef>
+            <a:fontRef idx="minor">
+              <a:schemeClr val="lt1"/>
+            </a:fontRef>
+          </p:style>
+          <p:txBody>
+            <a:bodyPr rtlCol="0" anchor="ctr"/>
+            <a:lstStyle/>
+            <a:p>
+              <a:pPr algn="ctr"/>
+              <a:endParaRPr lang="en-US"/>
+            </a:p>
+          </p:txBody>
+        </p:sp>
+        <p:sp>
+          <p:nvSpPr>
+            <p:cNvPr id="41" name="TextBox 40">
+              <a:extLst>
+                <a:ext uri="{FF2B5EF4-FFF2-40B4-BE49-F238E27FC236}">
+                  <a16:creationId xmlns:a16="http://schemas.microsoft.com/office/drawing/2014/main" id="{9B75EE3A-3EA0-5A43-BD49-93C7CF38A964}"/>
+                </a:ext>
+              </a:extLst>
+            </p:cNvPr>
+            <p:cNvSpPr txBox="1"/>
+            <p:nvPr/>
+          </p:nvSpPr>
+          <p:spPr>
+            <a:xfrm>
+              <a:off x="2617977" y="3294585"/>
+              <a:ext cx="282793" cy="246221"/>
+            </a:xfrm>
+            <a:prstGeom prst="rect">
+              <a:avLst/>
+            </a:prstGeom>
+            <a:noFill/>
+          </p:spPr>
+          <p:txBody>
+            <a:bodyPr wrap="square" lIns="0" tIns="0" rIns="0" bIns="0" rtlCol="0">
+              <a:spAutoFit/>
+            </a:bodyPr>
+            <a:lstStyle/>
+            <a:p>
+              <a:pPr algn="ctr"/>
+              <a:r>
+                <a:rPr lang="en-US" sz="1600" dirty="0">
+                  <a:latin typeface="Arial" panose="020B0604020202020204" pitchFamily="34" charset="0"/>
+                  <a:cs typeface="Arial" panose="020B0604020202020204" pitchFamily="34" charset="0"/>
+                </a:rPr>
+                <a:t>w</a:t>
+              </a:r>
+            </a:p>
+          </p:txBody>
+        </p:sp>
+        <p:sp>
+          <p:nvSpPr>
+            <p:cNvPr id="52" name="Oval 51">
+              <a:extLst>
+                <a:ext uri="{FF2B5EF4-FFF2-40B4-BE49-F238E27FC236}">
+                  <a16:creationId xmlns:a16="http://schemas.microsoft.com/office/drawing/2014/main" id="{A7850DC4-63F5-E743-AED9-7186569FAE60}"/>
+                </a:ext>
+              </a:extLst>
+            </p:cNvPr>
+            <p:cNvSpPr/>
+            <p:nvPr/>
+          </p:nvSpPr>
+          <p:spPr>
+            <a:xfrm>
+              <a:off x="7080560" y="4570375"/>
+              <a:ext cx="27432" cy="27432"/>
+            </a:xfrm>
+            <a:prstGeom prst="ellipse">
+              <a:avLst/>
+            </a:prstGeom>
+            <a:solidFill>
+              <a:schemeClr val="bg1"/>
+            </a:solidFill>
+            <a:ln>
+              <a:solidFill>
                 <a:schemeClr val="tx1"/>
-              </a:fontRef>
-            </p:style>
-          </p:cxnSp>
-        </p:grpSp>
+              </a:solidFill>
+            </a:ln>
+          </p:spPr>
+          <p:style>
+            <a:lnRef idx="2">
+              <a:schemeClr val="dk1">
+                <a:shade val="50000"/>
+              </a:schemeClr>
+            </a:lnRef>
+            <a:fillRef idx="1">
+              <a:schemeClr val="dk1"/>
+            </a:fillRef>
+            <a:effectRef idx="0">
+              <a:schemeClr val="dk1"/>
+            </a:effectRef>
+            <a:fontRef idx="minor">
+              <a:schemeClr val="lt1"/>
+            </a:fontRef>
+          </p:style>
+          <p:txBody>
+            <a:bodyPr rtlCol="0" anchor="ctr"/>
+            <a:lstStyle/>
+            <a:p>
+              <a:pPr algn="ctr"/>
+              <a:endParaRPr lang="en-US"/>
+            </a:p>
+          </p:txBody>
+        </p:sp>
+        <p:cxnSp>
+          <p:nvCxnSpPr>
+            <p:cNvPr id="4" name="Straight Arrow Connector 3">
+              <a:extLst>
+                <a:ext uri="{FF2B5EF4-FFF2-40B4-BE49-F238E27FC236}">
+                  <a16:creationId xmlns:a16="http://schemas.microsoft.com/office/drawing/2014/main" id="{9D8CBA5D-B6FB-3A4F-88EA-EE198B562F9F}"/>
+                </a:ext>
+              </a:extLst>
+            </p:cNvPr>
+            <p:cNvCxnSpPr/>
+            <p:nvPr/>
+          </p:nvCxnSpPr>
+          <p:spPr>
+            <a:xfrm flipV="1">
+              <a:off x="2226627" y="5733042"/>
+              <a:ext cx="0" cy="653143"/>
+            </a:xfrm>
+            <a:prstGeom prst="straightConnector1">
+              <a:avLst/>
+            </a:prstGeom>
+            <a:solidFill>
+              <a:schemeClr val="bg1"/>
+            </a:solidFill>
+            <a:ln w="12700">
+              <a:solidFill>
+                <a:schemeClr val="tx1"/>
+              </a:solidFill>
+              <a:tailEnd type="triangle"/>
+            </a:ln>
+          </p:spPr>
+          <p:style>
+            <a:lnRef idx="1">
+              <a:schemeClr val="accent6"/>
+            </a:lnRef>
+            <a:fillRef idx="0">
+              <a:schemeClr val="accent6"/>
+            </a:fillRef>
+            <a:effectRef idx="0">
+              <a:schemeClr val="accent6"/>
+            </a:effectRef>
+            <a:fontRef idx="minor">
+              <a:schemeClr val="tx1"/>
+            </a:fontRef>
+          </p:style>
+        </p:cxnSp>
+        <p:cxnSp>
+          <p:nvCxnSpPr>
+            <p:cNvPr id="33" name="Straight Arrow Connector 32">
+              <a:extLst>
+                <a:ext uri="{FF2B5EF4-FFF2-40B4-BE49-F238E27FC236}">
+                  <a16:creationId xmlns:a16="http://schemas.microsoft.com/office/drawing/2014/main" id="{CA8025B3-8BDB-8949-952E-355AA97F675A}"/>
+                </a:ext>
+              </a:extLst>
+            </p:cNvPr>
+            <p:cNvCxnSpPr>
+              <a:cxnSpLocks/>
+            </p:cNvCxnSpPr>
+            <p:nvPr/>
+          </p:nvCxnSpPr>
+          <p:spPr>
+            <a:xfrm rot="6180000" flipV="1">
+              <a:off x="2543139" y="6136104"/>
+              <a:ext cx="0" cy="653143"/>
+            </a:xfrm>
+            <a:prstGeom prst="straightConnector1">
+              <a:avLst/>
+            </a:prstGeom>
+            <a:solidFill>
+              <a:schemeClr val="bg1"/>
+            </a:solidFill>
+            <a:ln w="12700">
+              <a:solidFill>
+                <a:schemeClr val="tx1"/>
+              </a:solidFill>
+              <a:tailEnd type="triangle"/>
+            </a:ln>
+          </p:spPr>
+          <p:style>
+            <a:lnRef idx="1">
+              <a:schemeClr val="accent1"/>
+            </a:lnRef>
+            <a:fillRef idx="0">
+              <a:schemeClr val="accent1"/>
+            </a:fillRef>
+            <a:effectRef idx="0">
+              <a:schemeClr val="accent1"/>
+            </a:effectRef>
+            <a:fontRef idx="minor">
+              <a:schemeClr val="tx1"/>
+            </a:fontRef>
+          </p:style>
+        </p:cxnSp>
+        <p:cxnSp>
+          <p:nvCxnSpPr>
+            <p:cNvPr id="34" name="Straight Arrow Connector 33">
+              <a:extLst>
+                <a:ext uri="{FF2B5EF4-FFF2-40B4-BE49-F238E27FC236}">
+                  <a16:creationId xmlns:a16="http://schemas.microsoft.com/office/drawing/2014/main" id="{F83542F5-AAF6-3D46-8EFE-0F99D1BF40A8}"/>
+                </a:ext>
+              </a:extLst>
+            </p:cNvPr>
+            <p:cNvCxnSpPr>
+              <a:cxnSpLocks/>
+            </p:cNvCxnSpPr>
+            <p:nvPr/>
+          </p:nvCxnSpPr>
+          <p:spPr>
+            <a:xfrm rot="2340000" flipV="1">
+              <a:off x="2436367" y="5805622"/>
+              <a:ext cx="0" cy="653143"/>
+            </a:xfrm>
+            <a:prstGeom prst="straightConnector1">
+              <a:avLst/>
+            </a:prstGeom>
+            <a:solidFill>
+              <a:schemeClr val="bg1"/>
+            </a:solidFill>
+            <a:ln w="12700">
+              <a:solidFill>
+                <a:schemeClr val="tx1"/>
+              </a:solidFill>
+              <a:tailEnd type="triangle"/>
+            </a:ln>
+          </p:spPr>
+          <p:style>
+            <a:lnRef idx="1">
+              <a:schemeClr val="accent1"/>
+            </a:lnRef>
+            <a:fillRef idx="0">
+              <a:schemeClr val="accent1"/>
+            </a:fillRef>
+            <a:effectRef idx="0">
+              <a:schemeClr val="accent1"/>
+            </a:effectRef>
+            <a:fontRef idx="minor">
+              <a:schemeClr val="tx1"/>
+            </a:fontRef>
+          </p:style>
+        </p:cxnSp>
+        <p:sp>
+          <p:nvSpPr>
+            <p:cNvPr id="6" name="TextBox 5">
+              <a:extLst>
+                <a:ext uri="{FF2B5EF4-FFF2-40B4-BE49-F238E27FC236}">
+                  <a16:creationId xmlns:a16="http://schemas.microsoft.com/office/drawing/2014/main" id="{72988D4B-99B3-5348-ADEE-906E3D77AD68}"/>
+                </a:ext>
+              </a:extLst>
+            </p:cNvPr>
+            <p:cNvSpPr txBox="1"/>
+            <p:nvPr/>
+          </p:nvSpPr>
+          <p:spPr>
+            <a:xfrm>
+              <a:off x="2133497" y="5457110"/>
+              <a:ext cx="182880" cy="274320"/>
+            </a:xfrm>
+            <a:prstGeom prst="rect">
+              <a:avLst/>
+            </a:prstGeom>
+            <a:solidFill>
+              <a:schemeClr val="bg1"/>
+            </a:solidFill>
+          </p:spPr>
+          <p:txBody>
+            <a:bodyPr wrap="square" lIns="0" tIns="0" rIns="0" bIns="0" rtlCol="0" anchor="ctr">
+              <a:spAutoFit/>
+            </a:bodyPr>
+            <a:lstStyle/>
+            <a:p>
+              <a:pPr algn="ctr"/>
+              <a:r>
+                <a:rPr lang="en-US" i="1" dirty="0">
+                  <a:latin typeface="Arial" panose="020B0604020202020204" pitchFamily="34" charset="0"/>
+                  <a:cs typeface="Arial" panose="020B0604020202020204" pitchFamily="34" charset="0"/>
+                </a:rPr>
+                <a:t>z</a:t>
+              </a:r>
+            </a:p>
+          </p:txBody>
+        </p:sp>
+        <p:sp>
+          <p:nvSpPr>
+            <p:cNvPr id="38" name="TextBox 37">
+              <a:extLst>
+                <a:ext uri="{FF2B5EF4-FFF2-40B4-BE49-F238E27FC236}">
+                  <a16:creationId xmlns:a16="http://schemas.microsoft.com/office/drawing/2014/main" id="{7A7A83AB-77C8-0D4B-91E9-593B978A361C}"/>
+                </a:ext>
+              </a:extLst>
+            </p:cNvPr>
+            <p:cNvSpPr txBox="1"/>
+            <p:nvPr/>
+          </p:nvSpPr>
+          <p:spPr>
+            <a:xfrm>
+              <a:off x="2608646" y="5605642"/>
+              <a:ext cx="182880" cy="274320"/>
+            </a:xfrm>
+            <a:prstGeom prst="rect">
+              <a:avLst/>
+            </a:prstGeom>
+            <a:solidFill>
+              <a:schemeClr val="bg1"/>
+            </a:solidFill>
+          </p:spPr>
+          <p:txBody>
+            <a:bodyPr wrap="square" lIns="0" tIns="0" rIns="0" bIns="0" rtlCol="0" anchor="ctr">
+              <a:spAutoFit/>
+            </a:bodyPr>
+            <a:lstStyle/>
+            <a:p>
+              <a:pPr algn="ctr"/>
+              <a:r>
+                <a:rPr lang="en-US" i="1" dirty="0">
+                  <a:latin typeface="Arial" panose="020B0604020202020204" pitchFamily="34" charset="0"/>
+                  <a:cs typeface="Arial" panose="020B0604020202020204" pitchFamily="34" charset="0"/>
+                </a:rPr>
+                <a:t>x</a:t>
+              </a:r>
+            </a:p>
+          </p:txBody>
+        </p:sp>
+        <p:sp>
+          <p:nvSpPr>
+            <p:cNvPr id="42" name="TextBox 41">
+              <a:extLst>
+                <a:ext uri="{FF2B5EF4-FFF2-40B4-BE49-F238E27FC236}">
+                  <a16:creationId xmlns:a16="http://schemas.microsoft.com/office/drawing/2014/main" id="{FBEAA0FA-51F9-B848-B2EF-FF38456D4D6F}"/>
+                </a:ext>
+              </a:extLst>
+            </p:cNvPr>
+            <p:cNvSpPr txBox="1"/>
+            <p:nvPr/>
+          </p:nvSpPr>
+          <p:spPr>
+            <a:xfrm>
+              <a:off x="2858605" y="6398946"/>
+              <a:ext cx="182880" cy="274320"/>
+            </a:xfrm>
+            <a:prstGeom prst="rect">
+              <a:avLst/>
+            </a:prstGeom>
+            <a:solidFill>
+              <a:schemeClr val="bg1"/>
+            </a:solidFill>
+          </p:spPr>
+          <p:txBody>
+            <a:bodyPr wrap="square" lIns="0" tIns="0" rIns="0" bIns="0" rtlCol="0" anchor="ctr">
+              <a:spAutoFit/>
+            </a:bodyPr>
+            <a:lstStyle/>
+            <a:p>
+              <a:pPr algn="ctr"/>
+              <a:r>
+                <a:rPr lang="en-US" i="1" dirty="0">
+                  <a:latin typeface="Arial" panose="020B0604020202020204" pitchFamily="34" charset="0"/>
+                  <a:cs typeface="Arial" panose="020B0604020202020204" pitchFamily="34" charset="0"/>
+                </a:rPr>
+                <a:t>y</a:t>
+              </a:r>
+            </a:p>
+          </p:txBody>
+        </p:sp>
+        <p:sp>
+          <p:nvSpPr>
+            <p:cNvPr id="45" name="TextBox 44">
+              <a:extLst>
+                <a:ext uri="{FF2B5EF4-FFF2-40B4-BE49-F238E27FC236}">
+                  <a16:creationId xmlns:a16="http://schemas.microsoft.com/office/drawing/2014/main" id="{581422EC-5BBA-604D-B171-7FB42C654154}"/>
+                </a:ext>
+              </a:extLst>
+            </p:cNvPr>
+            <p:cNvSpPr txBox="1"/>
+            <p:nvPr/>
+          </p:nvSpPr>
+          <p:spPr>
+            <a:xfrm rot="540000">
+              <a:off x="4169507" y="2213096"/>
+              <a:ext cx="408153" cy="276999"/>
+            </a:xfrm>
+            <a:prstGeom prst="rect">
+              <a:avLst/>
+            </a:prstGeom>
+            <a:solidFill>
+              <a:schemeClr val="bg1"/>
+            </a:solidFill>
+          </p:spPr>
+          <p:txBody>
+            <a:bodyPr wrap="square" lIns="0" tIns="0" rIns="0" bIns="0" rtlCol="0" anchor="ctr">
+              <a:spAutoFit/>
+            </a:bodyPr>
+            <a:lstStyle/>
+            <a:p>
+              <a:pPr algn="ctr"/>
+              <a:r>
+                <a:rPr lang="en-US" i="1" dirty="0">
+                  <a:latin typeface="Arial" panose="020B0604020202020204" pitchFamily="34" charset="0"/>
+                  <a:cs typeface="Arial" panose="020B0604020202020204" pitchFamily="34" charset="0"/>
+                </a:rPr>
+                <a:t>3 m</a:t>
+              </a:r>
+            </a:p>
+          </p:txBody>
+        </p:sp>
+        <p:cxnSp>
+          <p:nvCxnSpPr>
+            <p:cNvPr id="17" name="Straight Connector 16">
+              <a:extLst>
+                <a:ext uri="{FF2B5EF4-FFF2-40B4-BE49-F238E27FC236}">
+                  <a16:creationId xmlns:a16="http://schemas.microsoft.com/office/drawing/2014/main" id="{64837C67-C126-4E4B-90AD-BD6F212C4E42}"/>
+                </a:ext>
+              </a:extLst>
+            </p:cNvPr>
+            <p:cNvCxnSpPr>
+              <a:cxnSpLocks/>
+              <a:stCxn id="45" idx="3"/>
+            </p:cNvCxnSpPr>
+            <p:nvPr/>
+          </p:nvCxnSpPr>
+          <p:spPr>
+            <a:xfrm>
+              <a:off x="4575147" y="2383521"/>
+              <a:ext cx="1298293" cy="202782"/>
+            </a:xfrm>
+            <a:prstGeom prst="line">
+              <a:avLst/>
+            </a:prstGeom>
+            <a:solidFill>
+              <a:schemeClr val="bg1"/>
+            </a:solidFill>
+          </p:spPr>
+          <p:style>
+            <a:lnRef idx="1">
+              <a:schemeClr val="dk1"/>
+            </a:lnRef>
+            <a:fillRef idx="0">
+              <a:schemeClr val="dk1"/>
+            </a:fillRef>
+            <a:effectRef idx="0">
+              <a:schemeClr val="dk1"/>
+            </a:effectRef>
+            <a:fontRef idx="minor">
+              <a:schemeClr val="tx1"/>
+            </a:fontRef>
+          </p:style>
+        </p:cxnSp>
+        <p:cxnSp>
+          <p:nvCxnSpPr>
+            <p:cNvPr id="46" name="Straight Connector 45">
+              <a:extLst>
+                <a:ext uri="{FF2B5EF4-FFF2-40B4-BE49-F238E27FC236}">
+                  <a16:creationId xmlns:a16="http://schemas.microsoft.com/office/drawing/2014/main" id="{5C3A92D2-AE46-1042-9889-22D672C84ACF}"/>
+                </a:ext>
+              </a:extLst>
+            </p:cNvPr>
+            <p:cNvCxnSpPr>
+              <a:cxnSpLocks/>
+              <a:endCxn id="45" idx="1"/>
+            </p:cNvCxnSpPr>
+            <p:nvPr/>
+          </p:nvCxnSpPr>
+          <p:spPr>
+            <a:xfrm>
+              <a:off x="2891392" y="2113534"/>
+              <a:ext cx="1280627" cy="206137"/>
+            </a:xfrm>
+            <a:prstGeom prst="line">
+              <a:avLst/>
+            </a:prstGeom>
+            <a:solidFill>
+              <a:schemeClr val="bg1"/>
+            </a:solidFill>
+          </p:spPr>
+          <p:style>
+            <a:lnRef idx="1">
+              <a:schemeClr val="dk1"/>
+            </a:lnRef>
+            <a:fillRef idx="0">
+              <a:schemeClr val="dk1"/>
+            </a:fillRef>
+            <a:effectRef idx="0">
+              <a:schemeClr val="dk1"/>
+            </a:effectRef>
+            <a:fontRef idx="minor">
+              <a:schemeClr val="tx1"/>
+            </a:fontRef>
+          </p:style>
+        </p:cxnSp>
+        <p:cxnSp>
+          <p:nvCxnSpPr>
+            <p:cNvPr id="51" name="Straight Connector 50">
+              <a:extLst>
+                <a:ext uri="{FF2B5EF4-FFF2-40B4-BE49-F238E27FC236}">
+                  <a16:creationId xmlns:a16="http://schemas.microsoft.com/office/drawing/2014/main" id="{7E912C93-04BF-D341-8814-54EE1584C9B7}"/>
+                </a:ext>
+              </a:extLst>
+            </p:cNvPr>
+            <p:cNvCxnSpPr>
+              <a:cxnSpLocks/>
+            </p:cNvCxnSpPr>
+            <p:nvPr/>
+          </p:nvCxnSpPr>
+          <p:spPr>
+            <a:xfrm rot="21300000" flipH="1">
+              <a:off x="2880851" y="2064965"/>
+              <a:ext cx="27432" cy="91440"/>
+            </a:xfrm>
+            <a:prstGeom prst="line">
+              <a:avLst/>
+            </a:prstGeom>
+            <a:solidFill>
+              <a:schemeClr val="bg1"/>
+            </a:solidFill>
+          </p:spPr>
+          <p:style>
+            <a:lnRef idx="1">
+              <a:schemeClr val="dk1"/>
+            </a:lnRef>
+            <a:fillRef idx="0">
+              <a:schemeClr val="dk1"/>
+            </a:fillRef>
+            <a:effectRef idx="0">
+              <a:schemeClr val="dk1"/>
+            </a:effectRef>
+            <a:fontRef idx="minor">
+              <a:schemeClr val="tx1"/>
+            </a:fontRef>
+          </p:style>
+        </p:cxnSp>
+        <p:cxnSp>
+          <p:nvCxnSpPr>
+            <p:cNvPr id="57" name="Straight Connector 56">
+              <a:extLst>
+                <a:ext uri="{FF2B5EF4-FFF2-40B4-BE49-F238E27FC236}">
+                  <a16:creationId xmlns:a16="http://schemas.microsoft.com/office/drawing/2014/main" id="{6A80E704-0965-E940-8542-AAA6C2CF756E}"/>
+                </a:ext>
+              </a:extLst>
+            </p:cNvPr>
+            <p:cNvCxnSpPr>
+              <a:cxnSpLocks/>
+            </p:cNvCxnSpPr>
+            <p:nvPr/>
+          </p:nvCxnSpPr>
+          <p:spPr>
+            <a:xfrm rot="21300000" flipH="1">
+              <a:off x="5857950" y="2540584"/>
+              <a:ext cx="27432" cy="91440"/>
+            </a:xfrm>
+            <a:prstGeom prst="line">
+              <a:avLst/>
+            </a:prstGeom>
+            <a:solidFill>
+              <a:schemeClr val="bg1"/>
+            </a:solidFill>
+          </p:spPr>
+          <p:style>
+            <a:lnRef idx="1">
+              <a:schemeClr val="dk1"/>
+            </a:lnRef>
+            <a:fillRef idx="0">
+              <a:schemeClr val="dk1"/>
+            </a:fillRef>
+            <a:effectRef idx="0">
+              <a:schemeClr val="dk1"/>
+            </a:effectRef>
+            <a:fontRef idx="minor">
+              <a:schemeClr val="tx1"/>
+            </a:fontRef>
+          </p:style>
+        </p:cxnSp>
+        <p:cxnSp>
+          <p:nvCxnSpPr>
+            <p:cNvPr id="73" name="Straight Connector 72">
+              <a:extLst>
+                <a:ext uri="{FF2B5EF4-FFF2-40B4-BE49-F238E27FC236}">
+                  <a16:creationId xmlns:a16="http://schemas.microsoft.com/office/drawing/2014/main" id="{C286F8BB-509A-2E45-AE13-656E35F6E94F}"/>
+                </a:ext>
+              </a:extLst>
+            </p:cNvPr>
+            <p:cNvCxnSpPr>
+              <a:cxnSpLocks/>
+            </p:cNvCxnSpPr>
+            <p:nvPr/>
+          </p:nvCxnSpPr>
+          <p:spPr>
+            <a:xfrm rot="-180000" flipH="1">
+              <a:off x="3287352" y="2127400"/>
+              <a:ext cx="34149" cy="97381"/>
+            </a:xfrm>
+            <a:prstGeom prst="line">
+              <a:avLst/>
+            </a:prstGeom>
+            <a:solidFill>
+              <a:schemeClr val="bg1"/>
+            </a:solidFill>
+            <a:ln w="50800" cmpd="dbl">
+              <a:solidFill>
+                <a:schemeClr val="tx1"/>
+              </a:solidFill>
+            </a:ln>
+          </p:spPr>
+          <p:style>
+            <a:lnRef idx="1">
+              <a:schemeClr val="accent1"/>
+            </a:lnRef>
+            <a:fillRef idx="0">
+              <a:schemeClr val="accent1"/>
+            </a:fillRef>
+            <a:effectRef idx="0">
+              <a:schemeClr val="accent1"/>
+            </a:effectRef>
+            <a:fontRef idx="minor">
+              <a:schemeClr val="tx1"/>
+            </a:fontRef>
+          </p:style>
+        </p:cxnSp>
         <p:sp>
           <p:nvSpPr>
             <p:cNvPr id="50" name="TextBox 49">
@@ -5540,13 +5174,15 @@
           </p:nvSpPr>
           <p:spPr>
             <a:xfrm>
-              <a:off x="1750195" y="1419000"/>
+              <a:off x="1750195" y="1260249"/>
               <a:ext cx="2330510" cy="553998"/>
             </a:xfrm>
             <a:prstGeom prst="rect">
               <a:avLst/>
             </a:prstGeom>
-            <a:grpFill/>
+            <a:solidFill>
+              <a:schemeClr val="bg1"/>
+            </a:solidFill>
           </p:spPr>
           <p:txBody>
             <a:bodyPr wrap="none" rtlCol="0">
@@ -5603,13 +5239,15 @@
           </p:nvCxnSpPr>
           <p:spPr>
             <a:xfrm>
-              <a:off x="2641886" y="2033472"/>
-              <a:ext cx="0" cy="499075"/>
+              <a:off x="2536836" y="1814247"/>
+              <a:ext cx="163250" cy="434064"/>
             </a:xfrm>
             <a:prstGeom prst="straightConnector1">
               <a:avLst/>
             </a:prstGeom>
-            <a:grpFill/>
+            <a:solidFill>
+              <a:schemeClr val="bg1"/>
+            </a:solidFill>
             <a:ln>
               <a:tailEnd type="triangle"/>
             </a:ln>
@@ -5645,7 +5283,7 @@
           </p:nvSpPr>
           <p:spPr>
             <a:xfrm>
-              <a:off x="5641680" y="6135334"/>
+              <a:off x="5641680" y="5976583"/>
               <a:ext cx="293958" cy="293958"/>
             </a:xfrm>
             <a:prstGeom prst="arc">
@@ -5700,7 +5338,7 @@
           </p:nvSpPr>
           <p:spPr>
             <a:xfrm>
-              <a:off x="5350656" y="6417858"/>
+              <a:off x="5350656" y="6259107"/>
               <a:ext cx="873957" cy="461665"/>
             </a:xfrm>
             <a:prstGeom prst="rect">

</xml_diff>

<commit_message>
create ISB 2021 abstract
</commit_message>
<xml_diff>
--- a/docs/fig_setup_labelled.pptx
+++ b/docs/fig_setup_labelled.pptx
@@ -197,7 +197,7 @@
           <a:p>
             <a:fld id="{90098D28-D976-AF4F-AEE9-2471F02EB2DB}" type="datetimeFigureOut">
               <a:rPr lang="en-US" smtClean="0"/>
-              <a:t>12/8/20</a:t>
+              <a:t>12/11/20</a:t>
             </a:fld>
             <a:endParaRPr lang="en-US"/>
           </a:p>
@@ -695,7 +695,7 @@
           <a:p>
             <a:fld id="{7AB5CAF8-9327-F54B-8A6F-A50D5568BC9E}" type="datetimeFigureOut">
               <a:rPr lang="en-US" smtClean="0"/>
-              <a:t>12/8/20</a:t>
+              <a:t>12/11/20</a:t>
             </a:fld>
             <a:endParaRPr lang="en-US"/>
           </a:p>
@@ -893,7 +893,7 @@
           <a:p>
             <a:fld id="{7AB5CAF8-9327-F54B-8A6F-A50D5568BC9E}" type="datetimeFigureOut">
               <a:rPr lang="en-US" smtClean="0"/>
-              <a:t>12/8/20</a:t>
+              <a:t>12/11/20</a:t>
             </a:fld>
             <a:endParaRPr lang="en-US"/>
           </a:p>
@@ -1101,7 +1101,7 @@
           <a:p>
             <a:fld id="{7AB5CAF8-9327-F54B-8A6F-A50D5568BC9E}" type="datetimeFigureOut">
               <a:rPr lang="en-US" smtClean="0"/>
-              <a:t>12/8/20</a:t>
+              <a:t>12/11/20</a:t>
             </a:fld>
             <a:endParaRPr lang="en-US"/>
           </a:p>
@@ -1299,7 +1299,7 @@
           <a:p>
             <a:fld id="{7AB5CAF8-9327-F54B-8A6F-A50D5568BC9E}" type="datetimeFigureOut">
               <a:rPr lang="en-US" smtClean="0"/>
-              <a:t>12/8/20</a:t>
+              <a:t>12/11/20</a:t>
             </a:fld>
             <a:endParaRPr lang="en-US"/>
           </a:p>
@@ -1574,7 +1574,7 @@
           <a:p>
             <a:fld id="{7AB5CAF8-9327-F54B-8A6F-A50D5568BC9E}" type="datetimeFigureOut">
               <a:rPr lang="en-US" smtClean="0"/>
-              <a:t>12/8/20</a:t>
+              <a:t>12/11/20</a:t>
             </a:fld>
             <a:endParaRPr lang="en-US"/>
           </a:p>
@@ -1839,7 +1839,7 @@
           <a:p>
             <a:fld id="{7AB5CAF8-9327-F54B-8A6F-A50D5568BC9E}" type="datetimeFigureOut">
               <a:rPr lang="en-US" smtClean="0"/>
-              <a:t>12/8/20</a:t>
+              <a:t>12/11/20</a:t>
             </a:fld>
             <a:endParaRPr lang="en-US"/>
           </a:p>
@@ -2251,7 +2251,7 @@
           <a:p>
             <a:fld id="{7AB5CAF8-9327-F54B-8A6F-A50D5568BC9E}" type="datetimeFigureOut">
               <a:rPr lang="en-US" smtClean="0"/>
-              <a:t>12/8/20</a:t>
+              <a:t>12/11/20</a:t>
             </a:fld>
             <a:endParaRPr lang="en-US"/>
           </a:p>
@@ -2392,7 +2392,7 @@
           <a:p>
             <a:fld id="{7AB5CAF8-9327-F54B-8A6F-A50D5568BC9E}" type="datetimeFigureOut">
               <a:rPr lang="en-US" smtClean="0"/>
-              <a:t>12/8/20</a:t>
+              <a:t>12/11/20</a:t>
             </a:fld>
             <a:endParaRPr lang="en-US"/>
           </a:p>
@@ -2505,7 +2505,7 @@
           <a:p>
             <a:fld id="{7AB5CAF8-9327-F54B-8A6F-A50D5568BC9E}" type="datetimeFigureOut">
               <a:rPr lang="en-US" smtClean="0"/>
-              <a:t>12/8/20</a:t>
+              <a:t>12/11/20</a:t>
             </a:fld>
             <a:endParaRPr lang="en-US"/>
           </a:p>
@@ -2816,7 +2816,7 @@
           <a:p>
             <a:fld id="{7AB5CAF8-9327-F54B-8A6F-A50D5568BC9E}" type="datetimeFigureOut">
               <a:rPr lang="en-US" smtClean="0"/>
-              <a:t>12/8/20</a:t>
+              <a:t>12/11/20</a:t>
             </a:fld>
             <a:endParaRPr lang="en-US"/>
           </a:p>
@@ -3104,7 +3104,7 @@
           <a:p>
             <a:fld id="{7AB5CAF8-9327-F54B-8A6F-A50D5568BC9E}" type="datetimeFigureOut">
               <a:rPr lang="en-US" smtClean="0"/>
-              <a:t>12/8/20</a:t>
+              <a:t>12/11/20</a:t>
             </a:fld>
             <a:endParaRPr lang="en-US"/>
           </a:p>
@@ -3345,7 +3345,7 @@
           <a:p>
             <a:fld id="{7AB5CAF8-9327-F54B-8A6F-A50D5568BC9E}" type="datetimeFigureOut">
               <a:rPr lang="en-US" smtClean="0"/>
-              <a:t>12/8/20</a:t>
+              <a:t>12/11/20</a:t>
             </a:fld>
             <a:endParaRPr lang="en-US"/>
           </a:p>
@@ -4582,12 +4582,16 @@
             <a:p>
               <a:pPr algn="ctr"/>
               <a:r>
-                <a:rPr lang="en-US" sz="1600" dirty="0">
+                <a:rPr lang="en-US" sz="1600" dirty="0" err="1">
                   <a:latin typeface="Arial" panose="020B0604020202020204" pitchFamily="34" charset="0"/>
                   <a:cs typeface="Arial" panose="020B0604020202020204" pitchFamily="34" charset="0"/>
                 </a:rPr>
-                <a:t>w</a:t>
+                <a:t>wt</a:t>
               </a:r>
+              <a:endParaRPr lang="en-US" sz="1600" dirty="0">
+                <a:latin typeface="Arial" panose="020B0604020202020204" pitchFamily="34" charset="0"/>
+                <a:cs typeface="Arial" panose="020B0604020202020204" pitchFamily="34" charset="0"/>
+              </a:endParaRPr>
             </a:p>
           </p:txBody>
         </p:sp>

</xml_diff>